<commit_message>
- Fix the page numbers.
</commit_message>
<xml_diff>
--- a/Final_Project/DAM - Final Project Presentation.pptx
+++ b/Final_Project/DAM - Final Project Presentation.pptx
@@ -22,10 +22,12 @@
     <p:sldId id="271" r:id="rId16"/>
     <p:sldId id="272" r:id="rId17"/>
     <p:sldId id="275" r:id="rId18"/>
-    <p:sldId id="278" r:id="rId19"/>
-    <p:sldId id="280" r:id="rId20"/>
-    <p:sldId id="276" r:id="rId21"/>
-    <p:sldId id="277" r:id="rId22"/>
+    <p:sldId id="282" r:id="rId19"/>
+    <p:sldId id="278" r:id="rId20"/>
+    <p:sldId id="280" r:id="rId21"/>
+    <p:sldId id="276" r:id="rId22"/>
+    <p:sldId id="277" r:id="rId23"/>
+    <p:sldId id="281" r:id="rId24"/>
   </p:sldIdLst>
   <p:sldSz cx="12192000" cy="6858000"/>
   <p:notesSz cx="6858000" cy="9144000"/>
@@ -135,7 +137,8 @@
 <file path=ppt/revisionInfo.xml><?xml version="1.0" encoding="utf-8"?>
 <p1510:revInfo xmlns:a="http://schemas.openxmlformats.org/drawingml/2006/main" xmlns:r="http://schemas.openxmlformats.org/officeDocument/2006/relationships" xmlns:p1510="http://schemas.microsoft.com/office/powerpoint/2015/10/main">
   <p1510:revLst>
-    <p1510:client id="{4170EDE1-74A4-3671-8BFC-743D95BFCA69}" v="666" dt="2023-12-19T20:31:00.374"/>
+    <p1510:client id="{2F33739F-3E8E-4E4D-BD9C-119954084C7B}" v="67" dt="2023-12-19T20:40:22.215"/>
+    <p1510:client id="{4170EDE1-74A4-3671-8BFC-743D95BFCA69}" v="953" dt="2023-12-19T20:39:41.310"/>
     <p1510:client id="{49D9C7F2-D204-F334-2A7E-24D61547E2EB}" v="2074" dt="2023-12-19T17:24:42.592"/>
   </p1510:revLst>
 </p1510:revInfo>
@@ -4272,7 +4275,31 @@
                 <a:latin typeface="Calibri Light"/>
                 <a:cs typeface="Calibri"/>
               </a:rPr>
-              <a:t>Net Sales Vs. Gross Margin </a:t>
+              <a:t>Net Sales </a:t>
+            </a:r>
+            <a:r>
+              <a:rPr lang="en-US" sz="2800" b="1">
+                <a:solidFill>
+                  <a:schemeClr val="accent1">
+                    <a:lumMod val="50000"/>
+                  </a:schemeClr>
+                </a:solidFill>
+                <a:latin typeface="Calibri Light"/>
+                <a:cs typeface="Calibri"/>
+              </a:rPr>
+              <a:t>vs </a:t>
+            </a:r>
+            <a:r>
+              <a:rPr lang="en-US" sz="2800" b="1" dirty="0">
+                <a:solidFill>
+                  <a:schemeClr val="accent1">
+                    <a:lumMod val="50000"/>
+                  </a:schemeClr>
+                </a:solidFill>
+                <a:latin typeface="Calibri Light"/>
+                <a:cs typeface="Calibri"/>
+              </a:rPr>
+              <a:t>Gross Margin </a:t>
             </a:r>
             <a:endParaRPr lang="en-US" dirty="0">
               <a:solidFill>
@@ -5080,7 +5107,7 @@
         <p:spPr>
           <a:xfrm>
             <a:off x="301762" y="1415715"/>
-            <a:ext cx="5624291" cy="954107"/>
+            <a:ext cx="5624291" cy="1384995"/>
           </a:xfrm>
           <a:prstGeom prst="rect">
             <a:avLst/>
@@ -5223,8 +5250,51 @@
                 <a:latin typeface="Calibri Light"/>
                 <a:cs typeface="Calibri"/>
               </a:rPr>
-              <a:t>Market Vs Product Categories </a:t>
-            </a:r>
+              <a:t>Market </a:t>
+            </a:r>
+            <a:r>
+              <a:rPr lang="en-US" sz="2800" b="1">
+                <a:solidFill>
+                  <a:schemeClr val="accent1">
+                    <a:lumMod val="50000"/>
+                  </a:schemeClr>
+                </a:solidFill>
+                <a:latin typeface="Calibri Light"/>
+                <a:cs typeface="Calibri"/>
+              </a:rPr>
+              <a:t>vs </a:t>
+            </a:r>
+            <a:endParaRPr lang="en-US" sz="2800" b="1">
+              <a:solidFill>
+                <a:schemeClr val="accent1">
+                  <a:lumMod val="50000"/>
+                </a:schemeClr>
+              </a:solidFill>
+              <a:latin typeface="Calibri Light"/>
+              <a:ea typeface="Calibri Light"/>
+              <a:cs typeface="Calibri"/>
+            </a:endParaRPr>
+          </a:p>
+          <a:p>
+            <a:r>
+              <a:rPr lang="en-US" sz="2800" b="1" dirty="0">
+                <a:solidFill>
+                  <a:schemeClr val="accent1">
+                    <a:lumMod val="50000"/>
+                  </a:schemeClr>
+                </a:solidFill>
+                <a:latin typeface="Calibri Light"/>
+                <a:cs typeface="Calibri"/>
+              </a:rPr>
+              <a:t>Product Categories </a:t>
+            </a:r>
+            <a:endParaRPr lang="en-US">
+              <a:solidFill>
+                <a:schemeClr val="accent1">
+                  <a:lumMod val="50000"/>
+                </a:schemeClr>
+              </a:solidFill>
+            </a:endParaRPr>
           </a:p>
         </p:txBody>
       </p:sp>
@@ -10927,7 +10997,7 @@
         <p:cNvPr id="1" name="">
           <a:extLst>
             <a:ext uri="{FF2B5EF4-FFF2-40B4-BE49-F238E27FC236}">
-              <a16:creationId xmlns:a16="http://schemas.microsoft.com/office/drawing/2014/main" id="{CCC87344-BF7F-FBDE-7736-2C6112A2C414}"/>
+              <a16:creationId xmlns:a16="http://schemas.microsoft.com/office/drawing/2014/main" id="{A042555D-9C68-CFC2-C383-56EC2ED515E5}"/>
             </a:ext>
           </a:extLst>
         </p:cNvPr>
@@ -10947,7 +11017,7 @@
           <p:cNvPr id="8" name="Rectangle 7">
             <a:extLst>
               <a:ext uri="{FF2B5EF4-FFF2-40B4-BE49-F238E27FC236}">
-                <a16:creationId xmlns:a16="http://schemas.microsoft.com/office/drawing/2014/main" id="{2DED5100-35A2-D094-4BC6-94A6D6E6D536}"/>
+                <a16:creationId xmlns:a16="http://schemas.microsoft.com/office/drawing/2014/main" id="{8BB33486-EE71-4481-F524-43E549EC59EC}"/>
               </a:ext>
               <a:ext uri="{C183D7F6-B498-43B3-948B-1728B52AA6E4}">
                 <adec:decorative xmlns:adec="http://schemas.microsoft.com/office/drawing/2017/decorative" val="1"/>
@@ -11023,7 +11093,7 @@
           <p:cNvPr id="10" name="Rectangle 9">
             <a:extLst>
               <a:ext uri="{FF2B5EF4-FFF2-40B4-BE49-F238E27FC236}">
-                <a16:creationId xmlns:a16="http://schemas.microsoft.com/office/drawing/2014/main" id="{87C3CFF3-8CF4-D314-ED0A-1447CE78D38E}"/>
+                <a16:creationId xmlns:a16="http://schemas.microsoft.com/office/drawing/2014/main" id="{C95F2E77-1653-3FA4-B241-D9C480B96FE4}"/>
               </a:ext>
               <a:ext uri="{C183D7F6-B498-43B3-948B-1728B52AA6E4}">
                 <adec:decorative xmlns:adec="http://schemas.microsoft.com/office/drawing/2017/decorative" val="1"/>
@@ -11094,7 +11164,7 @@
           <p:cNvPr id="12" name="Rectangle 11">
             <a:extLst>
               <a:ext uri="{FF2B5EF4-FFF2-40B4-BE49-F238E27FC236}">
-                <a16:creationId xmlns:a16="http://schemas.microsoft.com/office/drawing/2014/main" id="{607B374D-1702-FE25-1394-7233A63779ED}"/>
+                <a16:creationId xmlns:a16="http://schemas.microsoft.com/office/drawing/2014/main" id="{A364AA3B-7814-DC61-C10B-137A06EA2562}"/>
               </a:ext>
               <a:ext uri="{C183D7F6-B498-43B3-948B-1728B52AA6E4}">
                 <adec:decorative xmlns:adec="http://schemas.microsoft.com/office/drawing/2017/decorative" val="1"/>
@@ -11169,7 +11239,7 @@
           <p:cNvPr id="7" name="TextBox 1">
             <a:extLst>
               <a:ext uri="{FF2B5EF4-FFF2-40B4-BE49-F238E27FC236}">
-                <a16:creationId xmlns:a16="http://schemas.microsoft.com/office/drawing/2014/main" id="{96161D42-65B5-26D7-34C9-91A33598B02B}"/>
+                <a16:creationId xmlns:a16="http://schemas.microsoft.com/office/drawing/2014/main" id="{65F7487D-05E7-39D3-A9D0-2C9C45944042}"/>
               </a:ext>
             </a:extLst>
           </p:cNvPr>
@@ -11297,9 +11367,8 @@
                 <a:latin typeface="Calibri Light"/>
                 <a:cs typeface="Calibri"/>
               </a:rPr>
-              <a:t>Conclusion</a:t>
-            </a:r>
-            <a:endParaRPr lang="en-US" dirty="0"/>
+              <a:t>Challanges</a:t>
+            </a:r>
           </a:p>
         </p:txBody>
       </p:sp>
@@ -11308,7 +11377,7 @@
           <p:cNvPr id="11" name="Straight Arrow Connector 10">
             <a:extLst>
               <a:ext uri="{FF2B5EF4-FFF2-40B4-BE49-F238E27FC236}">
-                <a16:creationId xmlns:a16="http://schemas.microsoft.com/office/drawing/2014/main" id="{7F6B01D3-B239-A897-336C-2CE56946361B}"/>
+                <a16:creationId xmlns:a16="http://schemas.microsoft.com/office/drawing/2014/main" id="{E0AACB9E-E0FB-2EFA-B7A8-0FA82856AEBF}"/>
               </a:ext>
             </a:extLst>
           </p:cNvPr>
@@ -11344,7 +11413,7 @@
           <p:cNvPr id="14" name="Slide Number Placeholder 13">
             <a:extLst>
               <a:ext uri="{FF2B5EF4-FFF2-40B4-BE49-F238E27FC236}">
-                <a16:creationId xmlns:a16="http://schemas.microsoft.com/office/drawing/2014/main" id="{2B2D7DB0-3B6B-1BEB-6303-FAEAE8232301}"/>
+                <a16:creationId xmlns:a16="http://schemas.microsoft.com/office/drawing/2014/main" id="{0B6C20E2-F65F-CE41-5F46-1694B9F476C8}"/>
               </a:ext>
             </a:extLst>
           </p:cNvPr>
@@ -11377,7 +11446,7 @@
           <p:cNvPr id="3" name="TextBox 2">
             <a:extLst>
               <a:ext uri="{FF2B5EF4-FFF2-40B4-BE49-F238E27FC236}">
-                <a16:creationId xmlns:a16="http://schemas.microsoft.com/office/drawing/2014/main" id="{6E9DC346-8D60-3D12-FAD3-E55A8F518A4F}"/>
+                <a16:creationId xmlns:a16="http://schemas.microsoft.com/office/drawing/2014/main" id="{4AA7F27E-9EFD-1C96-9442-C5B48C8B9E36}"/>
               </a:ext>
             </a:extLst>
           </p:cNvPr>
@@ -11387,7 +11456,7 @@
         <p:spPr>
           <a:xfrm>
             <a:off x="156086" y="1449333"/>
-            <a:ext cx="11687851" cy="4093428"/>
+            <a:ext cx="11687851" cy="2246769"/>
           </a:xfrm>
           <a:prstGeom prst="rect">
             <a:avLst/>
@@ -11497,15 +11566,89 @@
             </a:lvl9pPr>
           </a:lstStyle>
           <a:p>
-            <a:pPr algn="just"/>
+            <a:pPr marL="342900" indent="-342900" algn="just">
+              <a:buFont typeface="Arial"/>
+              <a:buChar char="•"/>
+            </a:pPr>
             <a:r>
               <a:rPr lang="en-US" sz="2000" dirty="0">
                 <a:ea typeface="+mn-lt"/>
                 <a:cs typeface="+mn-lt"/>
               </a:rPr>
-              <a:t>Financial analysis (2018-2022) highlights consistent sales growth, improved profitability, and regional variations. Key products, customers, and divisions impact sales and profits, with Brick &amp; Mortar and Retailer channels dominating.</a:t>
+              <a:t>My </a:t>
+            </a:r>
+            <a:r>
+              <a:rPr lang="en-US" sz="2000" dirty="0" err="1">
+                <a:ea typeface="+mn-lt"/>
+                <a:cs typeface="+mn-lt"/>
+              </a:rPr>
+              <a:t>Sql</a:t>
+            </a:r>
+            <a:r>
+              <a:rPr lang="en-US" sz="2000" dirty="0">
+                <a:ea typeface="+mn-lt"/>
+                <a:cs typeface="+mn-lt"/>
+              </a:rPr>
+              <a:t> to Postgres Data Migration</a:t>
             </a:r>
             <a:endParaRPr lang="en-US" sz="2000" dirty="0">
+              <a:cs typeface="Calibri"/>
+            </a:endParaRPr>
+          </a:p>
+          <a:p>
+            <a:pPr marL="342900" indent="-342900" algn="just">
+              <a:buFont typeface="Arial"/>
+              <a:buChar char="•"/>
+            </a:pPr>
+            <a:endParaRPr lang="en-US" sz="2000" dirty="0">
+              <a:cs typeface="Calibri"/>
+            </a:endParaRPr>
+          </a:p>
+          <a:p>
+            <a:pPr marL="342900" indent="-342900" algn="just">
+              <a:buFont typeface="Arial"/>
+              <a:buChar char="•"/>
+            </a:pPr>
+            <a:r>
+              <a:rPr lang="en-US" sz="2000" dirty="0">
+                <a:ea typeface="+mn-lt"/>
+                <a:cs typeface="+mn-lt"/>
+              </a:rPr>
+              <a:t>Seasonal Trends using Weather API</a:t>
+            </a:r>
+            <a:endParaRPr lang="en-US" sz="2000" dirty="0">
+              <a:cs typeface="Calibri"/>
+            </a:endParaRPr>
+          </a:p>
+          <a:p>
+            <a:pPr marL="342900" indent="-342900" algn="just">
+              <a:buFont typeface="Arial"/>
+              <a:buChar char="•"/>
+            </a:pPr>
+            <a:endParaRPr lang="en-US" sz="2000" dirty="0">
+              <a:cs typeface="Calibri"/>
+            </a:endParaRPr>
+          </a:p>
+          <a:p>
+            <a:pPr marL="342900" indent="-342900" algn="just">
+              <a:buFont typeface="Arial"/>
+              <a:buChar char="•"/>
+            </a:pPr>
+            <a:r>
+              <a:rPr lang="en-US" sz="2000" dirty="0">
+                <a:cs typeface="Calibri"/>
+              </a:rPr>
+              <a:t>Domain Knowledge regarding sales </a:t>
+            </a:r>
+          </a:p>
+          <a:p>
+            <a:pPr marL="342900" indent="-342900" algn="just">
+              <a:buFont typeface="Arial"/>
+              <a:buChar char="•"/>
+            </a:pPr>
+            <a:endParaRPr lang="en-US" sz="2000" dirty="0">
+              <a:latin typeface="Calibri"/>
+              <a:ea typeface="Fira Code Retina"/>
               <a:cs typeface="Calibri"/>
             </a:endParaRPr>
           </a:p>
@@ -11515,83 +11658,12 @@
               <a:cs typeface="Calibri"/>
             </a:endParaRPr>
           </a:p>
-          <a:p>
-            <a:pPr algn="just"/>
-            <a:r>
-              <a:rPr lang="en-US" sz="2000" dirty="0">
-                <a:ea typeface="+mn-lt"/>
-                <a:cs typeface="+mn-lt"/>
-              </a:rPr>
-              <a:t>Budget sales analysis emphasizes leadership markets (USA, India) and influential customers (Amazon, </a:t>
-            </a:r>
-            <a:r>
-              <a:rPr lang="en-US" sz="2000" dirty="0" err="1">
-                <a:ea typeface="+mn-lt"/>
-                <a:cs typeface="+mn-lt"/>
-              </a:rPr>
-              <a:t>AltiQ</a:t>
-            </a:r>
-            <a:r>
-              <a:rPr lang="en-US" sz="2000" dirty="0">
-                <a:ea typeface="+mn-lt"/>
-                <a:cs typeface="+mn-lt"/>
-              </a:rPr>
-              <a:t> Exclusive). We prioritized top-performing product categories for strategic budget allocation.</a:t>
-            </a:r>
-            <a:endParaRPr lang="en-US" sz="2000" dirty="0">
-              <a:cs typeface="Calibri"/>
-            </a:endParaRPr>
-          </a:p>
-          <a:p>
-            <a:pPr algn="just"/>
-            <a:endParaRPr lang="en-US" sz="2000" dirty="0">
-              <a:cs typeface="Calibri"/>
-            </a:endParaRPr>
-          </a:p>
-          <a:p>
-            <a:pPr algn="just"/>
-            <a:r>
-              <a:rPr lang="en-US" sz="2000" dirty="0">
-                <a:ea typeface="+mn-lt"/>
-                <a:cs typeface="+mn-lt"/>
-              </a:rPr>
-              <a:t>For seasonal trends, we could not derive the outcomes based on the weather API results and the dataset. But we tried to provide high level insights based on our research.</a:t>
-            </a:r>
-            <a:endParaRPr lang="en-US" dirty="0"/>
-          </a:p>
-          <a:p>
-            <a:pPr algn="just"/>
-            <a:endParaRPr lang="en-US" sz="2000" dirty="0">
-              <a:cs typeface="Calibri"/>
-            </a:endParaRPr>
-          </a:p>
-          <a:p>
-            <a:pPr algn="just"/>
-            <a:r>
-              <a:rPr lang="en-US" sz="2000" dirty="0">
-                <a:latin typeface="Calibri"/>
-                <a:ea typeface="Fira Code Retina"/>
-                <a:cs typeface="Fira Code Retina"/>
-              </a:rPr>
-              <a:t>In summary, the analysis provides a concise understanding of sales dynamics, weather impacts, and external influences, offering actionable insights for businesses to enhance decision-making and strategic planning.</a:t>
-            </a:r>
-            <a:endParaRPr lang="en-US" sz="2000" dirty="0">
-              <a:latin typeface="Calibri"/>
-              <a:cs typeface="Calibri"/>
-            </a:endParaRPr>
-          </a:p>
-          <a:p>
-            <a:pPr algn="just"/>
-            <a:endParaRPr lang="en-US" sz="2000" dirty="0">
-              <a:cs typeface="Calibri"/>
-            </a:endParaRPr>
-          </a:p>
         </p:txBody>
       </p:sp>
     </p:spTree>
     <p:extLst>
       <p:ext uri="{BB962C8B-B14F-4D97-AF65-F5344CB8AC3E}">
-        <p14:creationId xmlns:p14="http://schemas.microsoft.com/office/powerpoint/2010/main" val="807039530"/>
+        <p14:creationId xmlns:p14="http://schemas.microsoft.com/office/powerpoint/2010/main" val="558210488"/>
       </p:ext>
     </p:extLst>
   </p:cSld>
@@ -11617,7 +11689,7 @@
         <p:cNvPr id="1" name="">
           <a:extLst>
             <a:ext uri="{FF2B5EF4-FFF2-40B4-BE49-F238E27FC236}">
-              <a16:creationId xmlns:a16="http://schemas.microsoft.com/office/drawing/2014/main" id="{C031C563-462A-D6C1-30CF-AD1BECFF6E36}"/>
+              <a16:creationId xmlns:a16="http://schemas.microsoft.com/office/drawing/2014/main" id="{CCC87344-BF7F-FBDE-7736-2C6112A2C414}"/>
             </a:ext>
           </a:extLst>
         </p:cNvPr>
@@ -11637,7 +11709,7 @@
           <p:cNvPr id="8" name="Rectangle 7">
             <a:extLst>
               <a:ext uri="{FF2B5EF4-FFF2-40B4-BE49-F238E27FC236}">
-                <a16:creationId xmlns:a16="http://schemas.microsoft.com/office/drawing/2014/main" id="{F4467AE5-9B36-E0E0-3EF0-826CC3EF7B12}"/>
+                <a16:creationId xmlns:a16="http://schemas.microsoft.com/office/drawing/2014/main" id="{2DED5100-35A2-D094-4BC6-94A6D6E6D536}"/>
               </a:ext>
               <a:ext uri="{C183D7F6-B498-43B3-948B-1728B52AA6E4}">
                 <adec:decorative xmlns:adec="http://schemas.microsoft.com/office/drawing/2017/decorative" val="1"/>
@@ -11713,7 +11785,7 @@
           <p:cNvPr id="10" name="Rectangle 9">
             <a:extLst>
               <a:ext uri="{FF2B5EF4-FFF2-40B4-BE49-F238E27FC236}">
-                <a16:creationId xmlns:a16="http://schemas.microsoft.com/office/drawing/2014/main" id="{63BE43FC-0E70-424D-9034-F4606F84FEFB}"/>
+                <a16:creationId xmlns:a16="http://schemas.microsoft.com/office/drawing/2014/main" id="{87C3CFF3-8CF4-D314-ED0A-1447CE78D38E}"/>
               </a:ext>
               <a:ext uri="{C183D7F6-B498-43B3-948B-1728B52AA6E4}">
                 <adec:decorative xmlns:adec="http://schemas.microsoft.com/office/drawing/2017/decorative" val="1"/>
@@ -11784,7 +11856,7 @@
           <p:cNvPr id="12" name="Rectangle 11">
             <a:extLst>
               <a:ext uri="{FF2B5EF4-FFF2-40B4-BE49-F238E27FC236}">
-                <a16:creationId xmlns:a16="http://schemas.microsoft.com/office/drawing/2014/main" id="{1407CFFD-3EE9-EF57-5739-D1E7B1ADD1D0}"/>
+                <a16:creationId xmlns:a16="http://schemas.microsoft.com/office/drawing/2014/main" id="{607B374D-1702-FE25-1394-7233A63779ED}"/>
               </a:ext>
               <a:ext uri="{C183D7F6-B498-43B3-948B-1728B52AA6E4}">
                 <adec:decorative xmlns:adec="http://schemas.microsoft.com/office/drawing/2017/decorative" val="1"/>
@@ -11859,7 +11931,7 @@
           <p:cNvPr id="7" name="TextBox 1">
             <a:extLst>
               <a:ext uri="{FF2B5EF4-FFF2-40B4-BE49-F238E27FC236}">
-                <a16:creationId xmlns:a16="http://schemas.microsoft.com/office/drawing/2014/main" id="{7CDE5E9D-E7D0-FE03-1FDA-400ACBB7ED2F}"/>
+                <a16:creationId xmlns:a16="http://schemas.microsoft.com/office/drawing/2014/main" id="{96161D42-65B5-26D7-34C9-91A33598B02B}"/>
               </a:ext>
             </a:extLst>
           </p:cNvPr>
@@ -11868,8 +11940,8 @@
         </p:nvSpPr>
         <p:spPr>
           <a:xfrm>
-            <a:off x="4663653" y="2906098"/>
-            <a:ext cx="5592443" cy="707886"/>
+            <a:off x="349388" y="272716"/>
+            <a:ext cx="11800501" cy="707886"/>
           </a:xfrm>
           <a:prstGeom prst="rect">
             <a:avLst/>
@@ -11987,7 +12059,7 @@
                 <a:latin typeface="Calibri Light"/>
                 <a:cs typeface="Calibri"/>
               </a:rPr>
-              <a:t>Q &amp; A</a:t>
+              <a:t>Conclusion</a:t>
             </a:r>
             <a:endParaRPr lang="en-US" dirty="0"/>
           </a:p>
@@ -11998,7 +12070,7 @@
           <p:cNvPr id="11" name="Straight Arrow Connector 10">
             <a:extLst>
               <a:ext uri="{FF2B5EF4-FFF2-40B4-BE49-F238E27FC236}">
-                <a16:creationId xmlns:a16="http://schemas.microsoft.com/office/drawing/2014/main" id="{438851BA-CD8E-DD01-DCC4-BEC21B72BFDB}"/>
+                <a16:creationId xmlns:a16="http://schemas.microsoft.com/office/drawing/2014/main" id="{7F6B01D3-B239-A897-336C-2CE56946361B}"/>
               </a:ext>
             </a:extLst>
           </p:cNvPr>
@@ -12034,7 +12106,7 @@
           <p:cNvPr id="14" name="Slide Number Placeholder 13">
             <a:extLst>
               <a:ext uri="{FF2B5EF4-FFF2-40B4-BE49-F238E27FC236}">
-                <a16:creationId xmlns:a16="http://schemas.microsoft.com/office/drawing/2014/main" id="{A214036C-0755-91D7-F6B8-19A53A339C12}"/>
+                <a16:creationId xmlns:a16="http://schemas.microsoft.com/office/drawing/2014/main" id="{2B2D7DB0-3B6B-1BEB-6303-FAEAE8232301}"/>
               </a:ext>
             </a:extLst>
           </p:cNvPr>
@@ -12062,10 +12134,226 @@
           </a:p>
         </p:txBody>
       </p:sp>
+      <p:sp>
+        <p:nvSpPr>
+          <p:cNvPr id="3" name="TextBox 2">
+            <a:extLst>
+              <a:ext uri="{FF2B5EF4-FFF2-40B4-BE49-F238E27FC236}">
+                <a16:creationId xmlns:a16="http://schemas.microsoft.com/office/drawing/2014/main" id="{6E9DC346-8D60-3D12-FAD3-E55A8F518A4F}"/>
+              </a:ext>
+            </a:extLst>
+          </p:cNvPr>
+          <p:cNvSpPr txBox="1"/>
+          <p:nvPr/>
+        </p:nvSpPr>
+        <p:spPr>
+          <a:xfrm>
+            <a:off x="156086" y="1449333"/>
+            <a:ext cx="11687851" cy="4093428"/>
+          </a:xfrm>
+          <a:prstGeom prst="rect">
+            <a:avLst/>
+          </a:prstGeom>
+          <a:noFill/>
+        </p:spPr>
+        <p:txBody>
+          <a:bodyPr rot="0" spcFirstLastPara="0" vert="horz" wrap="square" lIns="91440" tIns="45720" rIns="91440" bIns="45720" numCol="1" spcCol="0" rtlCol="0" fromWordArt="0" anchor="t" anchorCtr="0" forceAA="0" compatLnSpc="1">
+            <a:prstTxWarp prst="textNoShape">
+              <a:avLst/>
+            </a:prstTxWarp>
+            <a:spAutoFit/>
+          </a:bodyPr>
+          <a:lstStyle>
+            <a:defPPr>
+              <a:defRPr lang="en-US"/>
+            </a:defPPr>
+            <a:lvl1pPr marL="0" algn="l" defTabSz="914400" rtl="0" eaLnBrk="1" latinLnBrk="0" hangingPunct="1">
+              <a:defRPr sz="1800" kern="1200">
+                <a:solidFill>
+                  <a:schemeClr val="tx1"/>
+                </a:solidFill>
+                <a:latin typeface="+mn-lt"/>
+                <a:ea typeface="+mn-ea"/>
+                <a:cs typeface="+mn-cs"/>
+              </a:defRPr>
+            </a:lvl1pPr>
+            <a:lvl2pPr marL="457200" algn="l" defTabSz="914400" rtl="0" eaLnBrk="1" latinLnBrk="0" hangingPunct="1">
+              <a:defRPr sz="1800" kern="1200">
+                <a:solidFill>
+                  <a:schemeClr val="tx1"/>
+                </a:solidFill>
+                <a:latin typeface="+mn-lt"/>
+                <a:ea typeface="+mn-ea"/>
+                <a:cs typeface="+mn-cs"/>
+              </a:defRPr>
+            </a:lvl2pPr>
+            <a:lvl3pPr marL="914400" algn="l" defTabSz="914400" rtl="0" eaLnBrk="1" latinLnBrk="0" hangingPunct="1">
+              <a:defRPr sz="1800" kern="1200">
+                <a:solidFill>
+                  <a:schemeClr val="tx1"/>
+                </a:solidFill>
+                <a:latin typeface="+mn-lt"/>
+                <a:ea typeface="+mn-ea"/>
+                <a:cs typeface="+mn-cs"/>
+              </a:defRPr>
+            </a:lvl3pPr>
+            <a:lvl4pPr marL="1371600" algn="l" defTabSz="914400" rtl="0" eaLnBrk="1" latinLnBrk="0" hangingPunct="1">
+              <a:defRPr sz="1800" kern="1200">
+                <a:solidFill>
+                  <a:schemeClr val="tx1"/>
+                </a:solidFill>
+                <a:latin typeface="+mn-lt"/>
+                <a:ea typeface="+mn-ea"/>
+                <a:cs typeface="+mn-cs"/>
+              </a:defRPr>
+            </a:lvl4pPr>
+            <a:lvl5pPr marL="1828800" algn="l" defTabSz="914400" rtl="0" eaLnBrk="1" latinLnBrk="0" hangingPunct="1">
+              <a:defRPr sz="1800" kern="1200">
+                <a:solidFill>
+                  <a:schemeClr val="tx1"/>
+                </a:solidFill>
+                <a:latin typeface="+mn-lt"/>
+                <a:ea typeface="+mn-ea"/>
+                <a:cs typeface="+mn-cs"/>
+              </a:defRPr>
+            </a:lvl5pPr>
+            <a:lvl6pPr marL="2286000" algn="l" defTabSz="914400" rtl="0" eaLnBrk="1" latinLnBrk="0" hangingPunct="1">
+              <a:defRPr sz="1800" kern="1200">
+                <a:solidFill>
+                  <a:schemeClr val="tx1"/>
+                </a:solidFill>
+                <a:latin typeface="+mn-lt"/>
+                <a:ea typeface="+mn-ea"/>
+                <a:cs typeface="+mn-cs"/>
+              </a:defRPr>
+            </a:lvl6pPr>
+            <a:lvl7pPr marL="2743200" algn="l" defTabSz="914400" rtl="0" eaLnBrk="1" latinLnBrk="0" hangingPunct="1">
+              <a:defRPr sz="1800" kern="1200">
+                <a:solidFill>
+                  <a:schemeClr val="tx1"/>
+                </a:solidFill>
+                <a:latin typeface="+mn-lt"/>
+                <a:ea typeface="+mn-ea"/>
+                <a:cs typeface="+mn-cs"/>
+              </a:defRPr>
+            </a:lvl7pPr>
+            <a:lvl8pPr marL="3200400" algn="l" defTabSz="914400" rtl="0" eaLnBrk="1" latinLnBrk="0" hangingPunct="1">
+              <a:defRPr sz="1800" kern="1200">
+                <a:solidFill>
+                  <a:schemeClr val="tx1"/>
+                </a:solidFill>
+                <a:latin typeface="+mn-lt"/>
+                <a:ea typeface="+mn-ea"/>
+                <a:cs typeface="+mn-cs"/>
+              </a:defRPr>
+            </a:lvl8pPr>
+            <a:lvl9pPr marL="3657600" algn="l" defTabSz="914400" rtl="0" eaLnBrk="1" latinLnBrk="0" hangingPunct="1">
+              <a:defRPr sz="1800" kern="1200">
+                <a:solidFill>
+                  <a:schemeClr val="tx1"/>
+                </a:solidFill>
+                <a:latin typeface="+mn-lt"/>
+                <a:ea typeface="+mn-ea"/>
+                <a:cs typeface="+mn-cs"/>
+              </a:defRPr>
+            </a:lvl9pPr>
+          </a:lstStyle>
+          <a:p>
+            <a:pPr algn="just"/>
+            <a:r>
+              <a:rPr lang="en-US" sz="2000" dirty="0">
+                <a:ea typeface="+mn-lt"/>
+                <a:cs typeface="+mn-lt"/>
+              </a:rPr>
+              <a:t>Financial analysis (2018-2022) highlights consistent sales growth, improved profitability, and regional variations. Key products, customers, and divisions impact sales and profits, with Brick &amp; Mortar and Retailer channels dominating.</a:t>
+            </a:r>
+            <a:endParaRPr lang="en-US" sz="2000" dirty="0">
+              <a:cs typeface="Calibri"/>
+            </a:endParaRPr>
+          </a:p>
+          <a:p>
+            <a:pPr algn="just"/>
+            <a:endParaRPr lang="en-US" sz="2000" dirty="0">
+              <a:cs typeface="Calibri"/>
+            </a:endParaRPr>
+          </a:p>
+          <a:p>
+            <a:pPr algn="just"/>
+            <a:r>
+              <a:rPr lang="en-US" sz="2000" dirty="0">
+                <a:ea typeface="+mn-lt"/>
+                <a:cs typeface="+mn-lt"/>
+              </a:rPr>
+              <a:t>Budget sales analysis emphasizes leadership markets (USA, India) and influential customers (Amazon, </a:t>
+            </a:r>
+            <a:r>
+              <a:rPr lang="en-US" sz="2000" dirty="0" err="1">
+                <a:ea typeface="+mn-lt"/>
+                <a:cs typeface="+mn-lt"/>
+              </a:rPr>
+              <a:t>AltiQ</a:t>
+            </a:r>
+            <a:r>
+              <a:rPr lang="en-US" sz="2000" dirty="0">
+                <a:ea typeface="+mn-lt"/>
+                <a:cs typeface="+mn-lt"/>
+              </a:rPr>
+              <a:t> Exclusive). We prioritized top-performing product categories for strategic budget allocation.</a:t>
+            </a:r>
+            <a:endParaRPr lang="en-US" sz="2000" dirty="0">
+              <a:cs typeface="Calibri"/>
+            </a:endParaRPr>
+          </a:p>
+          <a:p>
+            <a:pPr algn="just"/>
+            <a:endParaRPr lang="en-US" sz="2000" dirty="0">
+              <a:cs typeface="Calibri"/>
+            </a:endParaRPr>
+          </a:p>
+          <a:p>
+            <a:pPr algn="just"/>
+            <a:r>
+              <a:rPr lang="en-US" sz="2000" dirty="0">
+                <a:ea typeface="+mn-lt"/>
+                <a:cs typeface="+mn-lt"/>
+              </a:rPr>
+              <a:t>For seasonal trends, we could not derive the outcomes based on the weather API results and the dataset. But we tried to provide high level insights based on our research.</a:t>
+            </a:r>
+            <a:endParaRPr lang="en-US" dirty="0"/>
+          </a:p>
+          <a:p>
+            <a:pPr algn="just"/>
+            <a:endParaRPr lang="en-US" sz="2000" dirty="0">
+              <a:cs typeface="Calibri"/>
+            </a:endParaRPr>
+          </a:p>
+          <a:p>
+            <a:pPr algn="just"/>
+            <a:r>
+              <a:rPr lang="en-US" sz="2000" dirty="0">
+                <a:latin typeface="Calibri"/>
+                <a:ea typeface="Fira Code Retina"/>
+                <a:cs typeface="Fira Code Retina"/>
+              </a:rPr>
+              <a:t>In summary, the analysis provides a concise understanding of sales dynamics, weather impacts, and external influences, offering actionable insights for businesses to enhance decision-making and strategic planning.</a:t>
+            </a:r>
+            <a:endParaRPr lang="en-US" sz="2000" dirty="0">
+              <a:latin typeface="Calibri"/>
+              <a:cs typeface="Calibri"/>
+            </a:endParaRPr>
+          </a:p>
+          <a:p>
+            <a:pPr algn="just"/>
+            <a:endParaRPr lang="en-US" sz="2000" dirty="0">
+              <a:cs typeface="Calibri"/>
+            </a:endParaRPr>
+          </a:p>
+        </p:txBody>
+      </p:sp>
     </p:spTree>
     <p:extLst>
       <p:ext uri="{BB962C8B-B14F-4D97-AF65-F5344CB8AC3E}">
-        <p14:creationId xmlns:p14="http://schemas.microsoft.com/office/powerpoint/2010/main" val="205067941"/>
+        <p14:creationId xmlns:p14="http://schemas.microsoft.com/office/powerpoint/2010/main" val="807039530"/>
       </p:ext>
     </p:extLst>
   </p:cSld>
@@ -12549,7 +12837,7 @@
         <p:spPr>
           <a:xfrm>
             <a:off x="546286" y="1711699"/>
-            <a:ext cx="11135845" cy="4493538"/>
+            <a:ext cx="11135845" cy="4154984"/>
           </a:xfrm>
           <a:prstGeom prst="rect">
             <a:avLst/>
@@ -12611,11 +12899,6 @@
               </a:rPr>
               <a:t> has provided customized solutions to businesses worldwide, enhancing efficiency, reducing costs, and fostering growth. As a multinational firm, they prioritize data-driven decision-making and aim to embed analytical tools in their work culture. </a:t>
             </a:r>
-            <a:endParaRPr lang="en-US" sz="2200" dirty="0">
-              <a:cs typeface="Calibri"/>
-            </a:endParaRPr>
-          </a:p>
-          <a:p>
             <a:endParaRPr lang="en-US" sz="2200" dirty="0">
               <a:cs typeface="Calibri"/>
             </a:endParaRPr>
@@ -12696,7 +12979,7 @@
         <p:cNvPr id="1" name="">
           <a:extLst>
             <a:ext uri="{FF2B5EF4-FFF2-40B4-BE49-F238E27FC236}">
-              <a16:creationId xmlns:a16="http://schemas.microsoft.com/office/drawing/2014/main" id="{49F662FF-DFA4-5A87-F824-619CD5151F95}"/>
+              <a16:creationId xmlns:a16="http://schemas.microsoft.com/office/drawing/2014/main" id="{C031C563-462A-D6C1-30CF-AD1BECFF6E36}"/>
             </a:ext>
           </a:extLst>
         </p:cNvPr>
@@ -12716,7 +12999,7 @@
           <p:cNvPr id="8" name="Rectangle 7">
             <a:extLst>
               <a:ext uri="{FF2B5EF4-FFF2-40B4-BE49-F238E27FC236}">
-                <a16:creationId xmlns:a16="http://schemas.microsoft.com/office/drawing/2014/main" id="{376BFB09-045F-6F70-97FF-AF518D22D2EB}"/>
+                <a16:creationId xmlns:a16="http://schemas.microsoft.com/office/drawing/2014/main" id="{F4467AE5-9B36-E0E0-3EF0-826CC3EF7B12}"/>
               </a:ext>
               <a:ext uri="{C183D7F6-B498-43B3-948B-1728B52AA6E4}">
                 <adec:decorative xmlns:adec="http://schemas.microsoft.com/office/drawing/2017/decorative" val="1"/>
@@ -12792,7 +13075,7 @@
           <p:cNvPr id="10" name="Rectangle 9">
             <a:extLst>
               <a:ext uri="{FF2B5EF4-FFF2-40B4-BE49-F238E27FC236}">
-                <a16:creationId xmlns:a16="http://schemas.microsoft.com/office/drawing/2014/main" id="{08FBD409-2C3A-21E8-297A-B5F246A9A663}"/>
+                <a16:creationId xmlns:a16="http://schemas.microsoft.com/office/drawing/2014/main" id="{63BE43FC-0E70-424D-9034-F4606F84FEFB}"/>
               </a:ext>
               <a:ext uri="{C183D7F6-B498-43B3-948B-1728B52AA6E4}">
                 <adec:decorative xmlns:adec="http://schemas.microsoft.com/office/drawing/2017/decorative" val="1"/>
@@ -12863,7 +13146,7 @@
           <p:cNvPr id="12" name="Rectangle 11">
             <a:extLst>
               <a:ext uri="{FF2B5EF4-FFF2-40B4-BE49-F238E27FC236}">
-                <a16:creationId xmlns:a16="http://schemas.microsoft.com/office/drawing/2014/main" id="{DE3496B3-59CD-AA88-11F5-30066CDB5F2E}"/>
+                <a16:creationId xmlns:a16="http://schemas.microsoft.com/office/drawing/2014/main" id="{1407CFFD-3EE9-EF57-5739-D1E7B1ADD1D0}"/>
               </a:ext>
               <a:ext uri="{C183D7F6-B498-43B3-948B-1728B52AA6E4}">
                 <adec:decorative xmlns:adec="http://schemas.microsoft.com/office/drawing/2017/decorative" val="1"/>
@@ -12938,7 +13221,7 @@
           <p:cNvPr id="7" name="TextBox 1">
             <a:extLst>
               <a:ext uri="{FF2B5EF4-FFF2-40B4-BE49-F238E27FC236}">
-                <a16:creationId xmlns:a16="http://schemas.microsoft.com/office/drawing/2014/main" id="{E6DDD8E8-EA52-DB7D-A13A-1F3A0FA54FDF}"/>
+                <a16:creationId xmlns:a16="http://schemas.microsoft.com/office/drawing/2014/main" id="{7CDE5E9D-E7D0-FE03-1FDA-400ACBB7ED2F}"/>
               </a:ext>
             </a:extLst>
           </p:cNvPr>
@@ -12947,8 +13230,8 @@
         </p:nvSpPr>
         <p:spPr>
           <a:xfrm>
-            <a:off x="349388" y="272716"/>
-            <a:ext cx="11800501" cy="707886"/>
+            <a:off x="3297629" y="2915391"/>
+            <a:ext cx="5592443" cy="707886"/>
           </a:xfrm>
           <a:prstGeom prst="rect">
             <a:avLst/>
@@ -13058,6 +13341,7 @@
             </a:lvl9pPr>
           </a:lstStyle>
           <a:p>
+            <a:pPr algn="ctr"/>
             <a:r>
               <a:rPr lang="en-US" sz="4000" b="1" dirty="0">
                 <a:solidFill>
@@ -13066,9 +13350,12 @@
                 <a:latin typeface="Calibri Light"/>
                 <a:cs typeface="Calibri"/>
               </a:rPr>
-              <a:t>References</a:t>
-            </a:r>
-            <a:endParaRPr lang="en-US" dirty="0"/>
+              <a:t>Q &amp; A</a:t>
+            </a:r>
+            <a:endParaRPr lang="en-US">
+              <a:ea typeface="Calibri" panose="020F0502020204030204"/>
+              <a:cs typeface="Calibri" panose="020F0502020204030204"/>
+            </a:endParaRPr>
           </a:p>
         </p:txBody>
       </p:sp>
@@ -13077,7 +13364,7 @@
           <p:cNvPr id="11" name="Straight Arrow Connector 10">
             <a:extLst>
               <a:ext uri="{FF2B5EF4-FFF2-40B4-BE49-F238E27FC236}">
-                <a16:creationId xmlns:a16="http://schemas.microsoft.com/office/drawing/2014/main" id="{F3FBE75F-7DBC-A191-3EE0-08199F23F197}"/>
+                <a16:creationId xmlns:a16="http://schemas.microsoft.com/office/drawing/2014/main" id="{438851BA-CD8E-DD01-DCC4-BEC21B72BFDB}"/>
               </a:ext>
             </a:extLst>
           </p:cNvPr>
@@ -13113,7 +13400,7 @@
           <p:cNvPr id="14" name="Slide Number Placeholder 13">
             <a:extLst>
               <a:ext uri="{FF2B5EF4-FFF2-40B4-BE49-F238E27FC236}">
-                <a16:creationId xmlns:a16="http://schemas.microsoft.com/office/drawing/2014/main" id="{16EA446A-492F-2705-4C90-62867CCCA6DA}"/>
+                <a16:creationId xmlns:a16="http://schemas.microsoft.com/office/drawing/2014/main" id="{A214036C-0755-91D7-F6B8-19A53A339C12}"/>
               </a:ext>
             </a:extLst>
           </p:cNvPr>
@@ -13141,107 +13428,10 @@
           </a:p>
         </p:txBody>
       </p:sp>
-      <p:sp>
-        <p:nvSpPr>
-          <p:cNvPr id="2" name="TextBox 1">
-            <a:extLst>
-              <a:ext uri="{FF2B5EF4-FFF2-40B4-BE49-F238E27FC236}">
-                <a16:creationId xmlns:a16="http://schemas.microsoft.com/office/drawing/2014/main" id="{451C2D57-B665-745C-A064-9F88DCE3CD25}"/>
-              </a:ext>
-            </a:extLst>
-          </p:cNvPr>
-          <p:cNvSpPr txBox="1"/>
-          <p:nvPr/>
-        </p:nvSpPr>
-        <p:spPr>
-          <a:xfrm>
-            <a:off x="352425" y="1285875"/>
-            <a:ext cx="8763000" cy="1938992"/>
-          </a:xfrm>
-          <a:prstGeom prst="rect">
-            <a:avLst/>
-          </a:prstGeom>
-          <a:noFill/>
-        </p:spPr>
-        <p:txBody>
-          <a:bodyPr rot="0" spcFirstLastPara="0" vertOverflow="overflow" horzOverflow="overflow" vert="horz" wrap="square" lIns="91440" tIns="45720" rIns="91440" bIns="45720" numCol="1" spcCol="0" rtlCol="0" fromWordArt="0" anchor="t" anchorCtr="0" forceAA="0" compatLnSpc="1">
-            <a:prstTxWarp prst="textNoShape">
-              <a:avLst/>
-            </a:prstTxWarp>
-            <a:spAutoFit/>
-          </a:bodyPr>
-          <a:lstStyle/>
-          <a:p>
-            <a:r>
-              <a:rPr lang="en-US" sz="2000" u="sng">
-                <a:solidFill>
-                  <a:srgbClr val="0563C1"/>
-                </a:solidFill>
-                <a:latin typeface="Arial"/>
-                <a:cs typeface="Arial"/>
-                <a:hlinkClick r:id="rId2"/>
-              </a:rPr>
-              <a:t>https://openweathermap.org/history</a:t>
-            </a:r>
-          </a:p>
-          <a:p>
-            <a:r>
-              <a:rPr lang="en-US" sz="2000" u="sng">
-                <a:solidFill>
-                  <a:srgbClr val="0563C1"/>
-                </a:solidFill>
-                <a:latin typeface="Arial"/>
-                <a:cs typeface="Arial"/>
-                <a:hlinkClick r:id="rId3"/>
-              </a:rPr>
-              <a:t>https://docs.python.org/3/library/logging.html</a:t>
-            </a:r>
-          </a:p>
-          <a:p>
-            <a:r>
-              <a:rPr lang="en-US" sz="2000" u="sng">
-                <a:solidFill>
-                  <a:srgbClr val="0563C1"/>
-                </a:solidFill>
-                <a:latin typeface="Arial"/>
-                <a:cs typeface="Arial"/>
-                <a:hlinkClick r:id="rId4"/>
-              </a:rPr>
-              <a:t>https://hevodata.com/learn/mysql-to-postgresql/</a:t>
-            </a:r>
-          </a:p>
-          <a:p>
-            <a:r>
-              <a:rPr lang="en-US" sz="2000" u="sng">
-                <a:solidFill>
-                  <a:srgbClr val="0563C1"/>
-                </a:solidFill>
-                <a:latin typeface="Arial"/>
-                <a:cs typeface="Arial"/>
-                <a:hlinkClick r:id="rId5"/>
-              </a:rPr>
-              <a:t>https://builtin.com/data-science/pandas-pivot-tables</a:t>
-            </a:r>
-          </a:p>
-          <a:p>
-            <a:r>
-              <a:rPr lang="en-US" sz="2000" u="sng">
-                <a:solidFill>
-                  <a:srgbClr val="0563C1"/>
-                </a:solidFill>
-                <a:latin typeface="Arial"/>
-                <a:cs typeface="Arial"/>
-                <a:hlinkClick r:id="rId6"/>
-              </a:rPr>
-              <a:t>https://towardsdatascience.com/feature-engineering-in-python-part-i-the-most-powerful-way-of-dealing-with-data-8e2447e7c69e</a:t>
-            </a:r>
-          </a:p>
-        </p:txBody>
-      </p:sp>
     </p:spTree>
     <p:extLst>
       <p:ext uri="{BB962C8B-B14F-4D97-AF65-F5344CB8AC3E}">
-        <p14:creationId xmlns:p14="http://schemas.microsoft.com/office/powerpoint/2010/main" val="2106946351"/>
+        <p14:creationId xmlns:p14="http://schemas.microsoft.com/office/powerpoint/2010/main" val="205067941"/>
       </p:ext>
     </p:extLst>
   </p:cSld>
@@ -13267,7 +13457,7 @@
         <p:cNvPr id="1" name="">
           <a:extLst>
             <a:ext uri="{FF2B5EF4-FFF2-40B4-BE49-F238E27FC236}">
-              <a16:creationId xmlns:a16="http://schemas.microsoft.com/office/drawing/2014/main" id="{6CA34ED8-82CA-5DAB-42E9-8EBCC505C691}"/>
+              <a16:creationId xmlns:a16="http://schemas.microsoft.com/office/drawing/2014/main" id="{49F662FF-DFA4-5A87-F824-619CD5151F95}"/>
             </a:ext>
           </a:extLst>
         </p:cNvPr>
@@ -13287,7 +13477,7 @@
           <p:cNvPr id="8" name="Rectangle 7">
             <a:extLst>
               <a:ext uri="{FF2B5EF4-FFF2-40B4-BE49-F238E27FC236}">
-                <a16:creationId xmlns:a16="http://schemas.microsoft.com/office/drawing/2014/main" id="{388A0B08-C8E0-6BA1-E606-185D0D1A7FC7}"/>
+                <a16:creationId xmlns:a16="http://schemas.microsoft.com/office/drawing/2014/main" id="{376BFB09-045F-6F70-97FF-AF518D22D2EB}"/>
               </a:ext>
               <a:ext uri="{C183D7F6-B498-43B3-948B-1728B52AA6E4}">
                 <adec:decorative xmlns:adec="http://schemas.microsoft.com/office/drawing/2017/decorative" val="1"/>
@@ -13363,7 +13553,7 @@
           <p:cNvPr id="10" name="Rectangle 9">
             <a:extLst>
               <a:ext uri="{FF2B5EF4-FFF2-40B4-BE49-F238E27FC236}">
-                <a16:creationId xmlns:a16="http://schemas.microsoft.com/office/drawing/2014/main" id="{4252DC7C-D338-C5E9-7929-8B3F6E84C5C2}"/>
+                <a16:creationId xmlns:a16="http://schemas.microsoft.com/office/drawing/2014/main" id="{08FBD409-2C3A-21E8-297A-B5F246A9A663}"/>
               </a:ext>
               <a:ext uri="{C183D7F6-B498-43B3-948B-1728B52AA6E4}">
                 <adec:decorative xmlns:adec="http://schemas.microsoft.com/office/drawing/2017/decorative" val="1"/>
@@ -13434,7 +13624,7 @@
           <p:cNvPr id="12" name="Rectangle 11">
             <a:extLst>
               <a:ext uri="{FF2B5EF4-FFF2-40B4-BE49-F238E27FC236}">
-                <a16:creationId xmlns:a16="http://schemas.microsoft.com/office/drawing/2014/main" id="{7647C4C8-382B-2FCD-C147-06501B21E09A}"/>
+                <a16:creationId xmlns:a16="http://schemas.microsoft.com/office/drawing/2014/main" id="{DE3496B3-59CD-AA88-11F5-30066CDB5F2E}"/>
               </a:ext>
               <a:ext uri="{C183D7F6-B498-43B3-948B-1728B52AA6E4}">
                 <adec:decorative xmlns:adec="http://schemas.microsoft.com/office/drawing/2017/decorative" val="1"/>
@@ -13509,7 +13699,7 @@
           <p:cNvPr id="7" name="TextBox 1">
             <a:extLst>
               <a:ext uri="{FF2B5EF4-FFF2-40B4-BE49-F238E27FC236}">
-                <a16:creationId xmlns:a16="http://schemas.microsoft.com/office/drawing/2014/main" id="{431D05C5-E755-84A5-ABC0-0CCAEA2621E1}"/>
+                <a16:creationId xmlns:a16="http://schemas.microsoft.com/office/drawing/2014/main" id="{E6DDD8E8-EA52-DB7D-A13A-1F3A0FA54FDF}"/>
               </a:ext>
             </a:extLst>
           </p:cNvPr>
@@ -13637,7 +13827,7 @@
                 <a:latin typeface="Calibri Light"/>
                 <a:cs typeface="Calibri"/>
               </a:rPr>
-              <a:t>Source Code</a:t>
+              <a:t>References</a:t>
             </a:r>
             <a:endParaRPr lang="en-US" dirty="0"/>
           </a:p>
@@ -13648,7 +13838,7 @@
           <p:cNvPr id="11" name="Straight Arrow Connector 10">
             <a:extLst>
               <a:ext uri="{FF2B5EF4-FFF2-40B4-BE49-F238E27FC236}">
-                <a16:creationId xmlns:a16="http://schemas.microsoft.com/office/drawing/2014/main" id="{37D1CB0B-2785-9DF3-D5CA-293534E87D18}"/>
+                <a16:creationId xmlns:a16="http://schemas.microsoft.com/office/drawing/2014/main" id="{F3FBE75F-7DBC-A191-3EE0-08199F23F197}"/>
               </a:ext>
             </a:extLst>
           </p:cNvPr>
@@ -13684,7 +13874,7 @@
           <p:cNvPr id="14" name="Slide Number Placeholder 13">
             <a:extLst>
               <a:ext uri="{FF2B5EF4-FFF2-40B4-BE49-F238E27FC236}">
-                <a16:creationId xmlns:a16="http://schemas.microsoft.com/office/drawing/2014/main" id="{68F017EA-438F-1CC7-E80F-BF0F202A02E2}"/>
+                <a16:creationId xmlns:a16="http://schemas.microsoft.com/office/drawing/2014/main" id="{16EA446A-492F-2705-4C90-62867CCCA6DA}"/>
               </a:ext>
             </a:extLst>
           </p:cNvPr>
@@ -13701,7 +13891,7 @@
           <a:lstStyle/>
           <a:p>
             <a:r>
-              <a:rPr lang="en-US" dirty="0">
+              <a:rPr lang="en-US">
                 <a:solidFill>
                   <a:schemeClr val="bg1"/>
                 </a:solidFill>
@@ -13709,15 +13899,21 @@
               </a:rPr>
               <a:t>21</a:t>
             </a:r>
+            <a:endParaRPr lang="en-US" dirty="0">
+              <a:solidFill>
+                <a:schemeClr val="bg1"/>
+              </a:solidFill>
+              <a:cs typeface="Calibri"/>
+            </a:endParaRPr>
           </a:p>
         </p:txBody>
       </p:sp>
       <p:sp>
         <p:nvSpPr>
-          <p:cNvPr id="3" name="TextBox 2">
+          <p:cNvPr id="2" name="TextBox 1">
             <a:extLst>
               <a:ext uri="{FF2B5EF4-FFF2-40B4-BE49-F238E27FC236}">
-                <a16:creationId xmlns:a16="http://schemas.microsoft.com/office/drawing/2014/main" id="{D01ED16E-C182-F764-6F80-3342F3D7157F}"/>
+                <a16:creationId xmlns:a16="http://schemas.microsoft.com/office/drawing/2014/main" id="{451C2D57-B665-745C-A064-9F88DCE3CD25}"/>
               </a:ext>
             </a:extLst>
           </p:cNvPr>
@@ -13726,8 +13922,371 @@
         </p:nvSpPr>
         <p:spPr>
           <a:xfrm>
-            <a:off x="156086" y="1449333"/>
-            <a:ext cx="8662264" cy="523220"/>
+            <a:off x="352425" y="1285875"/>
+            <a:ext cx="8763000" cy="1938992"/>
+          </a:xfrm>
+          <a:prstGeom prst="rect">
+            <a:avLst/>
+          </a:prstGeom>
+          <a:noFill/>
+        </p:spPr>
+        <p:txBody>
+          <a:bodyPr rot="0" spcFirstLastPara="0" vertOverflow="overflow" horzOverflow="overflow" vert="horz" wrap="square" lIns="91440" tIns="45720" rIns="91440" bIns="45720" numCol="1" spcCol="0" rtlCol="0" fromWordArt="0" anchor="t" anchorCtr="0" forceAA="0" compatLnSpc="1">
+            <a:prstTxWarp prst="textNoShape">
+              <a:avLst/>
+            </a:prstTxWarp>
+            <a:spAutoFit/>
+          </a:bodyPr>
+          <a:lstStyle/>
+          <a:p>
+            <a:r>
+              <a:rPr lang="en-US" sz="2000" u="sng">
+                <a:solidFill>
+                  <a:srgbClr val="0563C1"/>
+                </a:solidFill>
+                <a:latin typeface="Arial"/>
+                <a:cs typeface="Arial"/>
+                <a:hlinkClick r:id="rId2"/>
+              </a:rPr>
+              <a:t>https://openweathermap.org/history</a:t>
+            </a:r>
+          </a:p>
+          <a:p>
+            <a:r>
+              <a:rPr lang="en-US" sz="2000" u="sng">
+                <a:solidFill>
+                  <a:srgbClr val="0563C1"/>
+                </a:solidFill>
+                <a:latin typeface="Arial"/>
+                <a:cs typeface="Arial"/>
+                <a:hlinkClick r:id="rId3"/>
+              </a:rPr>
+              <a:t>https://docs.python.org/3/library/logging.html</a:t>
+            </a:r>
+          </a:p>
+          <a:p>
+            <a:r>
+              <a:rPr lang="en-US" sz="2000" u="sng">
+                <a:solidFill>
+                  <a:srgbClr val="0563C1"/>
+                </a:solidFill>
+                <a:latin typeface="Arial"/>
+                <a:cs typeface="Arial"/>
+                <a:hlinkClick r:id="rId4"/>
+              </a:rPr>
+              <a:t>https://hevodata.com/learn/mysql-to-postgresql/</a:t>
+            </a:r>
+          </a:p>
+          <a:p>
+            <a:r>
+              <a:rPr lang="en-US" sz="2000" u="sng">
+                <a:solidFill>
+                  <a:srgbClr val="0563C1"/>
+                </a:solidFill>
+                <a:latin typeface="Arial"/>
+                <a:cs typeface="Arial"/>
+                <a:hlinkClick r:id="rId5"/>
+              </a:rPr>
+              <a:t>https://builtin.com/data-science/pandas-pivot-tables</a:t>
+            </a:r>
+          </a:p>
+          <a:p>
+            <a:r>
+              <a:rPr lang="en-US" sz="2000" u="sng">
+                <a:solidFill>
+                  <a:srgbClr val="0563C1"/>
+                </a:solidFill>
+                <a:latin typeface="Arial"/>
+                <a:cs typeface="Arial"/>
+                <a:hlinkClick r:id="rId6"/>
+              </a:rPr>
+              <a:t>https://towardsdatascience.com/feature-engineering-in-python-part-i-the-most-powerful-way-of-dealing-with-data-8e2447e7c69e</a:t>
+            </a:r>
+          </a:p>
+        </p:txBody>
+      </p:sp>
+    </p:spTree>
+    <p:extLst>
+      <p:ext uri="{BB962C8B-B14F-4D97-AF65-F5344CB8AC3E}">
+        <p14:creationId xmlns:p14="http://schemas.microsoft.com/office/powerpoint/2010/main" val="2106946351"/>
+      </p:ext>
+    </p:extLst>
+  </p:cSld>
+  <p:clrMapOvr>
+    <a:masterClrMapping/>
+  </p:clrMapOvr>
+</p:sld>
+</file>
+
+<file path=ppt/slides/slide22.xml><?xml version="1.0" encoding="utf-8"?>
+<p:sld xmlns:a="http://schemas.openxmlformats.org/drawingml/2006/main" xmlns:r="http://schemas.openxmlformats.org/officeDocument/2006/relationships" xmlns:p="http://schemas.openxmlformats.org/presentationml/2006/main">
+  <p:cSld>
+    <p:bg>
+      <p:bgPr>
+        <a:solidFill>
+          <a:schemeClr val="bg1"/>
+        </a:solidFill>
+        <a:effectLst/>
+      </p:bgPr>
+    </p:bg>
+    <p:spTree>
+      <p:nvGrpSpPr>
+        <p:cNvPr id="1" name="">
+          <a:extLst>
+            <a:ext uri="{FF2B5EF4-FFF2-40B4-BE49-F238E27FC236}">
+              <a16:creationId xmlns:a16="http://schemas.microsoft.com/office/drawing/2014/main" id="{6CA34ED8-82CA-5DAB-42E9-8EBCC505C691}"/>
+            </a:ext>
+          </a:extLst>
+        </p:cNvPr>
+        <p:cNvGrpSpPr/>
+        <p:nvPr/>
+      </p:nvGrpSpPr>
+      <p:grpSpPr>
+        <a:xfrm>
+          <a:off x="0" y="0"/>
+          <a:ext cx="0" cy="0"/>
+          <a:chOff x="0" y="0"/>
+          <a:chExt cx="0" cy="0"/>
+        </a:xfrm>
+      </p:grpSpPr>
+      <p:sp useBgFill="1">
+        <p:nvSpPr>
+          <p:cNvPr id="8" name="Rectangle 7">
+            <a:extLst>
+              <a:ext uri="{FF2B5EF4-FFF2-40B4-BE49-F238E27FC236}">
+                <a16:creationId xmlns:a16="http://schemas.microsoft.com/office/drawing/2014/main" id="{388A0B08-C8E0-6BA1-E606-185D0D1A7FC7}"/>
+              </a:ext>
+              <a:ext uri="{C183D7F6-B498-43B3-948B-1728B52AA6E4}">
+                <adec:decorative xmlns:adec="http://schemas.microsoft.com/office/drawing/2017/decorative" val="1"/>
+              </a:ext>
+            </a:extLst>
+          </p:cNvPr>
+          <p:cNvSpPr>
+            <a:spLocks noGrp="1" noRot="1" noChangeAspect="1" noMove="1" noResize="1" noEditPoints="1" noAdjustHandles="1" noChangeArrowheads="1" noChangeShapeType="1" noTextEdit="1"/>
+          </p:cNvSpPr>
+          <p:nvPr>
+            <p:extLst>
+              <p:ext uri="{386F3935-93C4-4BCD-93E2-E3B085C9AB24}">
+                <p16:designElem xmlns:p16="http://schemas.microsoft.com/office/powerpoint/2015/main" val="1"/>
+              </p:ext>
+            </p:extLst>
+          </p:nvPr>
+        </p:nvSpPr>
+        <p:spPr>
+          <a:xfrm>
+            <a:off x="0" y="0"/>
+            <a:ext cx="12192000" cy="6858000"/>
+          </a:xfrm>
+          <a:prstGeom prst="rect">
+            <a:avLst/>
+          </a:prstGeom>
+          <a:ln w="12700" cap="flat" cmpd="sng" algn="ctr">
+            <a:noFill/>
+            <a:prstDash val="solid"/>
+            <a:miter lim="800000"/>
+          </a:ln>
+          <a:effectLst/>
+          <a:extLst>
+            <a:ext uri="{91240B29-F687-4F45-9708-019B960494DF}">
+              <a14:hiddenLine xmlns:a14="http://schemas.microsoft.com/office/drawing/2010/main" w="12700" cap="flat" cmpd="sng" algn="ctr">
+                <a:solidFill>
+                  <a:schemeClr val="accent1">
+                    <a:shade val="50000"/>
+                  </a:schemeClr>
+                </a:solidFill>
+                <a:prstDash val="solid"/>
+                <a:miter lim="800000"/>
+              </a14:hiddenLine>
+            </a:ext>
+          </a:extLst>
+        </p:spPr>
+        <p:style>
+          <a:lnRef idx="2">
+            <a:schemeClr val="accent1">
+              <a:shade val="50000"/>
+            </a:schemeClr>
+          </a:lnRef>
+          <a:fillRef idx="1">
+            <a:schemeClr val="accent1"/>
+          </a:fillRef>
+          <a:effectRef idx="0">
+            <a:schemeClr val="accent1"/>
+          </a:effectRef>
+          <a:fontRef idx="minor">
+            <a:schemeClr val="lt1"/>
+          </a:fontRef>
+        </p:style>
+        <p:txBody>
+          <a:bodyPr rtlCol="0" anchor="ctr"/>
+          <a:lstStyle/>
+          <a:p>
+            <a:pPr algn="ctr"/>
+            <a:endParaRPr lang="en-US"/>
+          </a:p>
+        </p:txBody>
+      </p:sp>
+      <p:sp>
+        <p:nvSpPr>
+          <p:cNvPr id="10" name="Rectangle 9">
+            <a:extLst>
+              <a:ext uri="{FF2B5EF4-FFF2-40B4-BE49-F238E27FC236}">
+                <a16:creationId xmlns:a16="http://schemas.microsoft.com/office/drawing/2014/main" id="{4252DC7C-D338-C5E9-7929-8B3F6E84C5C2}"/>
+              </a:ext>
+              <a:ext uri="{C183D7F6-B498-43B3-948B-1728B52AA6E4}">
+                <adec:decorative xmlns:adec="http://schemas.microsoft.com/office/drawing/2017/decorative" val="1"/>
+              </a:ext>
+            </a:extLst>
+          </p:cNvPr>
+          <p:cNvSpPr>
+            <a:spLocks noGrp="1" noRot="1" noChangeAspect="1" noMove="1" noResize="1" noEditPoints="1" noAdjustHandles="1" noChangeArrowheads="1" noChangeShapeType="1" noTextEdit="1"/>
+          </p:cNvSpPr>
+          <p:nvPr>
+            <p:extLst>
+              <p:ext uri="{386F3935-93C4-4BCD-93E2-E3B085C9AB24}">
+                <p16:designElem xmlns:p16="http://schemas.microsoft.com/office/powerpoint/2015/main" val="1"/>
+              </p:ext>
+            </p:extLst>
+          </p:nvPr>
+        </p:nvSpPr>
+        <p:spPr>
+          <a:xfrm rot="10800000" flipH="1">
+            <a:off x="0" y="6400799"/>
+            <a:ext cx="12192000" cy="456773"/>
+          </a:xfrm>
+          <a:prstGeom prst="rect">
+            <a:avLst/>
+          </a:prstGeom>
+          <a:gradFill>
+            <a:gsLst>
+              <a:gs pos="0">
+                <a:schemeClr val="accent1"/>
+              </a:gs>
+              <a:gs pos="78000">
+                <a:srgbClr val="000000"/>
+              </a:gs>
+            </a:gsLst>
+            <a:lin ang="7200000" scaled="0"/>
+          </a:gradFill>
+          <a:ln>
+            <a:noFill/>
+          </a:ln>
+        </p:spPr>
+        <p:style>
+          <a:lnRef idx="2">
+            <a:schemeClr val="accent1">
+              <a:shade val="50000"/>
+            </a:schemeClr>
+          </a:lnRef>
+          <a:fillRef idx="1">
+            <a:schemeClr val="accent1"/>
+          </a:fillRef>
+          <a:effectRef idx="0">
+            <a:schemeClr val="accent1"/>
+          </a:effectRef>
+          <a:fontRef idx="minor">
+            <a:schemeClr val="lt1"/>
+          </a:fontRef>
+        </p:style>
+        <p:txBody>
+          <a:bodyPr rtlCol="0" anchor="ctr"/>
+          <a:lstStyle/>
+          <a:p>
+            <a:pPr algn="ctr"/>
+            <a:endParaRPr lang="en-US"/>
+          </a:p>
+        </p:txBody>
+      </p:sp>
+      <p:sp>
+        <p:nvSpPr>
+          <p:cNvPr id="12" name="Rectangle 11">
+            <a:extLst>
+              <a:ext uri="{FF2B5EF4-FFF2-40B4-BE49-F238E27FC236}">
+                <a16:creationId xmlns:a16="http://schemas.microsoft.com/office/drawing/2014/main" id="{7647C4C8-382B-2FCD-C147-06501B21E09A}"/>
+              </a:ext>
+              <a:ext uri="{C183D7F6-B498-43B3-948B-1728B52AA6E4}">
+                <adec:decorative xmlns:adec="http://schemas.microsoft.com/office/drawing/2017/decorative" val="1"/>
+              </a:ext>
+            </a:extLst>
+          </p:cNvPr>
+          <p:cNvSpPr>
+            <a:spLocks noGrp="1" noRot="1" noChangeAspect="1" noMove="1" noResize="1" noEditPoints="1" noAdjustHandles="1" noChangeArrowheads="1" noChangeShapeType="1" noTextEdit="1"/>
+          </p:cNvSpPr>
+          <p:nvPr>
+            <p:extLst>
+              <p:ext uri="{386F3935-93C4-4BCD-93E2-E3B085C9AB24}">
+                <p16:designElem xmlns:p16="http://schemas.microsoft.com/office/powerpoint/2015/main" val="1"/>
+              </p:ext>
+            </p:extLst>
+          </p:nvPr>
+        </p:nvSpPr>
+        <p:spPr>
+          <a:xfrm flipH="1">
+            <a:off x="0" y="6400800"/>
+            <a:ext cx="8153398" cy="456772"/>
+          </a:xfrm>
+          <a:prstGeom prst="rect">
+            <a:avLst/>
+          </a:prstGeom>
+          <a:gradFill>
+            <a:gsLst>
+              <a:gs pos="0">
+                <a:srgbClr val="000000">
+                  <a:alpha val="28000"/>
+                </a:srgbClr>
+              </a:gs>
+              <a:gs pos="100000">
+                <a:schemeClr val="accent1">
+                  <a:lumMod val="75000"/>
+                </a:schemeClr>
+              </a:gs>
+            </a:gsLst>
+            <a:lin ang="3000000" scaled="0"/>
+          </a:gradFill>
+          <a:ln>
+            <a:noFill/>
+          </a:ln>
+        </p:spPr>
+        <p:style>
+          <a:lnRef idx="2">
+            <a:schemeClr val="accent1">
+              <a:shade val="50000"/>
+            </a:schemeClr>
+          </a:lnRef>
+          <a:fillRef idx="1">
+            <a:schemeClr val="accent1"/>
+          </a:fillRef>
+          <a:effectRef idx="0">
+            <a:schemeClr val="accent1"/>
+          </a:effectRef>
+          <a:fontRef idx="minor">
+            <a:schemeClr val="lt1"/>
+          </a:fontRef>
+        </p:style>
+        <p:txBody>
+          <a:bodyPr rtlCol="0" anchor="ctr"/>
+          <a:lstStyle/>
+          <a:p>
+            <a:pPr algn="ctr"/>
+            <a:endParaRPr lang="en-US"/>
+          </a:p>
+        </p:txBody>
+      </p:sp>
+      <p:sp>
+        <p:nvSpPr>
+          <p:cNvPr id="7" name="TextBox 1">
+            <a:extLst>
+              <a:ext uri="{FF2B5EF4-FFF2-40B4-BE49-F238E27FC236}">
+                <a16:creationId xmlns:a16="http://schemas.microsoft.com/office/drawing/2014/main" id="{431D05C5-E755-84A5-ABC0-0CCAEA2621E1}"/>
+              </a:ext>
+            </a:extLst>
+          </p:cNvPr>
+          <p:cNvSpPr txBox="1"/>
+          <p:nvPr/>
+        </p:nvSpPr>
+        <p:spPr>
+          <a:xfrm>
+            <a:off x="349388" y="272716"/>
+            <a:ext cx="11800501" cy="707886"/>
           </a:xfrm>
           <a:prstGeom prst="rect">
             <a:avLst/>
@@ -13838,6 +14397,220 @@
           </a:lstStyle>
           <a:p>
             <a:r>
+              <a:rPr lang="en-US" sz="4000" b="1" dirty="0">
+                <a:solidFill>
+                  <a:srgbClr val="843C0C"/>
+                </a:solidFill>
+                <a:latin typeface="Calibri Light"/>
+                <a:cs typeface="Calibri"/>
+              </a:rPr>
+              <a:t>Source Code</a:t>
+            </a:r>
+            <a:endParaRPr lang="en-US" dirty="0"/>
+          </a:p>
+        </p:txBody>
+      </p:sp>
+      <p:cxnSp>
+        <p:nvCxnSpPr>
+          <p:cNvPr id="11" name="Straight Arrow Connector 10">
+            <a:extLst>
+              <a:ext uri="{FF2B5EF4-FFF2-40B4-BE49-F238E27FC236}">
+                <a16:creationId xmlns:a16="http://schemas.microsoft.com/office/drawing/2014/main" id="{37D1CB0B-2785-9DF3-D5CA-293534E87D18}"/>
+              </a:ext>
+            </a:extLst>
+          </p:cNvPr>
+          <p:cNvCxnSpPr/>
+          <p:nvPr/>
+        </p:nvCxnSpPr>
+        <p:spPr>
+          <a:xfrm>
+            <a:off x="4601" y="1179450"/>
+            <a:ext cx="11712740" cy="62163"/>
+          </a:xfrm>
+          <a:prstGeom prst="straightConnector1">
+            <a:avLst/>
+          </a:prstGeom>
+        </p:spPr>
+        <p:style>
+          <a:lnRef idx="1">
+            <a:schemeClr val="accent1"/>
+          </a:lnRef>
+          <a:fillRef idx="0">
+            <a:schemeClr val="accent1"/>
+          </a:fillRef>
+          <a:effectRef idx="0">
+            <a:schemeClr val="accent1"/>
+          </a:effectRef>
+          <a:fontRef idx="minor">
+            <a:schemeClr val="tx1"/>
+          </a:fontRef>
+        </p:style>
+      </p:cxnSp>
+      <p:sp>
+        <p:nvSpPr>
+          <p:cNvPr id="14" name="Slide Number Placeholder 13">
+            <a:extLst>
+              <a:ext uri="{FF2B5EF4-FFF2-40B4-BE49-F238E27FC236}">
+                <a16:creationId xmlns:a16="http://schemas.microsoft.com/office/drawing/2014/main" id="{68F017EA-438F-1CC7-E80F-BF0F202A02E2}"/>
+              </a:ext>
+            </a:extLst>
+          </p:cNvPr>
+          <p:cNvSpPr>
+            <a:spLocks noGrp="1"/>
+          </p:cNvSpPr>
+          <p:nvPr>
+            <p:ph type="sldNum" sz="quarter" idx="12"/>
+          </p:nvPr>
+        </p:nvSpPr>
+        <p:spPr/>
+        <p:txBody>
+          <a:bodyPr/>
+          <a:lstStyle/>
+          <a:p>
+            <a:r>
+              <a:rPr lang="en-US">
+                <a:solidFill>
+                  <a:schemeClr val="bg1"/>
+                </a:solidFill>
+                <a:cs typeface="Calibri"/>
+              </a:rPr>
+              <a:t>22</a:t>
+            </a:r>
+            <a:endParaRPr lang="en-US" dirty="0">
+              <a:solidFill>
+                <a:schemeClr val="bg1"/>
+              </a:solidFill>
+              <a:cs typeface="Calibri"/>
+            </a:endParaRPr>
+          </a:p>
+        </p:txBody>
+      </p:sp>
+      <p:sp>
+        <p:nvSpPr>
+          <p:cNvPr id="3" name="TextBox 2">
+            <a:extLst>
+              <a:ext uri="{FF2B5EF4-FFF2-40B4-BE49-F238E27FC236}">
+                <a16:creationId xmlns:a16="http://schemas.microsoft.com/office/drawing/2014/main" id="{D01ED16E-C182-F764-6F80-3342F3D7157F}"/>
+              </a:ext>
+            </a:extLst>
+          </p:cNvPr>
+          <p:cNvSpPr txBox="1"/>
+          <p:nvPr/>
+        </p:nvSpPr>
+        <p:spPr>
+          <a:xfrm>
+            <a:off x="351232" y="1458626"/>
+            <a:ext cx="8662264" cy="523220"/>
+          </a:xfrm>
+          <a:prstGeom prst="rect">
+            <a:avLst/>
+          </a:prstGeom>
+          <a:noFill/>
+        </p:spPr>
+        <p:txBody>
+          <a:bodyPr rot="0" spcFirstLastPara="0" vert="horz" wrap="square" lIns="91440" tIns="45720" rIns="91440" bIns="45720" numCol="1" spcCol="0" rtlCol="0" fromWordArt="0" anchor="t" anchorCtr="0" forceAA="0" compatLnSpc="1">
+            <a:prstTxWarp prst="textNoShape">
+              <a:avLst/>
+            </a:prstTxWarp>
+            <a:spAutoFit/>
+          </a:bodyPr>
+          <a:lstStyle>
+            <a:defPPr>
+              <a:defRPr lang="en-US"/>
+            </a:defPPr>
+            <a:lvl1pPr marL="0" algn="l" defTabSz="914400" rtl="0" eaLnBrk="1" latinLnBrk="0" hangingPunct="1">
+              <a:defRPr sz="1800" kern="1200">
+                <a:solidFill>
+                  <a:schemeClr val="tx1"/>
+                </a:solidFill>
+                <a:latin typeface="+mn-lt"/>
+                <a:ea typeface="+mn-ea"/>
+                <a:cs typeface="+mn-cs"/>
+              </a:defRPr>
+            </a:lvl1pPr>
+            <a:lvl2pPr marL="457200" algn="l" defTabSz="914400" rtl="0" eaLnBrk="1" latinLnBrk="0" hangingPunct="1">
+              <a:defRPr sz="1800" kern="1200">
+                <a:solidFill>
+                  <a:schemeClr val="tx1"/>
+                </a:solidFill>
+                <a:latin typeface="+mn-lt"/>
+                <a:ea typeface="+mn-ea"/>
+                <a:cs typeface="+mn-cs"/>
+              </a:defRPr>
+            </a:lvl2pPr>
+            <a:lvl3pPr marL="914400" algn="l" defTabSz="914400" rtl="0" eaLnBrk="1" latinLnBrk="0" hangingPunct="1">
+              <a:defRPr sz="1800" kern="1200">
+                <a:solidFill>
+                  <a:schemeClr val="tx1"/>
+                </a:solidFill>
+                <a:latin typeface="+mn-lt"/>
+                <a:ea typeface="+mn-ea"/>
+                <a:cs typeface="+mn-cs"/>
+              </a:defRPr>
+            </a:lvl3pPr>
+            <a:lvl4pPr marL="1371600" algn="l" defTabSz="914400" rtl="0" eaLnBrk="1" latinLnBrk="0" hangingPunct="1">
+              <a:defRPr sz="1800" kern="1200">
+                <a:solidFill>
+                  <a:schemeClr val="tx1"/>
+                </a:solidFill>
+                <a:latin typeface="+mn-lt"/>
+                <a:ea typeface="+mn-ea"/>
+                <a:cs typeface="+mn-cs"/>
+              </a:defRPr>
+            </a:lvl4pPr>
+            <a:lvl5pPr marL="1828800" algn="l" defTabSz="914400" rtl="0" eaLnBrk="1" latinLnBrk="0" hangingPunct="1">
+              <a:defRPr sz="1800" kern="1200">
+                <a:solidFill>
+                  <a:schemeClr val="tx1"/>
+                </a:solidFill>
+                <a:latin typeface="+mn-lt"/>
+                <a:ea typeface="+mn-ea"/>
+                <a:cs typeface="+mn-cs"/>
+              </a:defRPr>
+            </a:lvl5pPr>
+            <a:lvl6pPr marL="2286000" algn="l" defTabSz="914400" rtl="0" eaLnBrk="1" latinLnBrk="0" hangingPunct="1">
+              <a:defRPr sz="1800" kern="1200">
+                <a:solidFill>
+                  <a:schemeClr val="tx1"/>
+                </a:solidFill>
+                <a:latin typeface="+mn-lt"/>
+                <a:ea typeface="+mn-ea"/>
+                <a:cs typeface="+mn-cs"/>
+              </a:defRPr>
+            </a:lvl6pPr>
+            <a:lvl7pPr marL="2743200" algn="l" defTabSz="914400" rtl="0" eaLnBrk="1" latinLnBrk="0" hangingPunct="1">
+              <a:defRPr sz="1800" kern="1200">
+                <a:solidFill>
+                  <a:schemeClr val="tx1"/>
+                </a:solidFill>
+                <a:latin typeface="+mn-lt"/>
+                <a:ea typeface="+mn-ea"/>
+                <a:cs typeface="+mn-cs"/>
+              </a:defRPr>
+            </a:lvl7pPr>
+            <a:lvl8pPr marL="3200400" algn="l" defTabSz="914400" rtl="0" eaLnBrk="1" latinLnBrk="0" hangingPunct="1">
+              <a:defRPr sz="1800" kern="1200">
+                <a:solidFill>
+                  <a:schemeClr val="tx1"/>
+                </a:solidFill>
+                <a:latin typeface="+mn-lt"/>
+                <a:ea typeface="+mn-ea"/>
+                <a:cs typeface="+mn-cs"/>
+              </a:defRPr>
+            </a:lvl8pPr>
+            <a:lvl9pPr marL="3657600" algn="l" defTabSz="914400" rtl="0" eaLnBrk="1" latinLnBrk="0" hangingPunct="1">
+              <a:defRPr sz="1800" kern="1200">
+                <a:solidFill>
+                  <a:schemeClr val="tx1"/>
+                </a:solidFill>
+                <a:latin typeface="+mn-lt"/>
+                <a:ea typeface="+mn-ea"/>
+                <a:cs typeface="+mn-cs"/>
+              </a:defRPr>
+            </a:lvl9pPr>
+          </a:lstStyle>
+          <a:p>
+            <a:r>
               <a:rPr lang="en-US" sz="2800" b="1" dirty="0">
                 <a:solidFill>
                   <a:schemeClr val="accent1">
@@ -13867,7 +14640,7 @@
         </p:nvSpPr>
         <p:spPr>
           <a:xfrm>
-            <a:off x="230841" y="2427194"/>
+            <a:off x="351646" y="2427194"/>
             <a:ext cx="9814111" cy="369332"/>
           </a:xfrm>
           <a:prstGeom prst="rect">
@@ -13898,6 +14671,487 @@
     <p:extLst>
       <p:ext uri="{BB962C8B-B14F-4D97-AF65-F5344CB8AC3E}">
         <p14:creationId xmlns:p14="http://schemas.microsoft.com/office/powerpoint/2010/main" val="2071123162"/>
+      </p:ext>
+    </p:extLst>
+  </p:cSld>
+  <p:clrMapOvr>
+    <a:masterClrMapping/>
+  </p:clrMapOvr>
+</p:sld>
+</file>
+
+<file path=ppt/slides/slide23.xml><?xml version="1.0" encoding="utf-8"?>
+<p:sld xmlns:a="http://schemas.openxmlformats.org/drawingml/2006/main" xmlns:r="http://schemas.openxmlformats.org/officeDocument/2006/relationships" xmlns:p="http://schemas.openxmlformats.org/presentationml/2006/main">
+  <p:cSld>
+    <p:bg>
+      <p:bgPr>
+        <a:solidFill>
+          <a:schemeClr val="bg1"/>
+        </a:solidFill>
+        <a:effectLst/>
+      </p:bgPr>
+    </p:bg>
+    <p:spTree>
+      <p:nvGrpSpPr>
+        <p:cNvPr id="1" name="">
+          <a:extLst>
+            <a:ext uri="{FF2B5EF4-FFF2-40B4-BE49-F238E27FC236}">
+              <a16:creationId xmlns:a16="http://schemas.microsoft.com/office/drawing/2014/main" id="{056CDE7E-4AA3-DA79-FA7D-8435CEA33FFA}"/>
+            </a:ext>
+          </a:extLst>
+        </p:cNvPr>
+        <p:cNvGrpSpPr/>
+        <p:nvPr/>
+      </p:nvGrpSpPr>
+      <p:grpSpPr>
+        <a:xfrm>
+          <a:off x="0" y="0"/>
+          <a:ext cx="0" cy="0"/>
+          <a:chOff x="0" y="0"/>
+          <a:chExt cx="0" cy="0"/>
+        </a:xfrm>
+      </p:grpSpPr>
+      <p:sp useBgFill="1">
+        <p:nvSpPr>
+          <p:cNvPr id="8" name="Rectangle 7">
+            <a:extLst>
+              <a:ext uri="{FF2B5EF4-FFF2-40B4-BE49-F238E27FC236}">
+                <a16:creationId xmlns:a16="http://schemas.microsoft.com/office/drawing/2014/main" id="{87728BF9-0C4F-D419-3F55-1AA74129D07D}"/>
+              </a:ext>
+              <a:ext uri="{C183D7F6-B498-43B3-948B-1728B52AA6E4}">
+                <adec:decorative xmlns:adec="http://schemas.microsoft.com/office/drawing/2017/decorative" val="1"/>
+              </a:ext>
+            </a:extLst>
+          </p:cNvPr>
+          <p:cNvSpPr>
+            <a:spLocks noGrp="1" noRot="1" noChangeAspect="1" noMove="1" noResize="1" noEditPoints="1" noAdjustHandles="1" noChangeArrowheads="1" noChangeShapeType="1" noTextEdit="1"/>
+          </p:cNvSpPr>
+          <p:nvPr>
+            <p:extLst>
+              <p:ext uri="{386F3935-93C4-4BCD-93E2-E3B085C9AB24}">
+                <p16:designElem xmlns:p16="http://schemas.microsoft.com/office/powerpoint/2015/main" val="1"/>
+              </p:ext>
+            </p:extLst>
+          </p:nvPr>
+        </p:nvSpPr>
+        <p:spPr>
+          <a:xfrm>
+            <a:off x="0" y="0"/>
+            <a:ext cx="12192000" cy="6858000"/>
+          </a:xfrm>
+          <a:prstGeom prst="rect">
+            <a:avLst/>
+          </a:prstGeom>
+          <a:ln w="12700" cap="flat" cmpd="sng" algn="ctr">
+            <a:noFill/>
+            <a:prstDash val="solid"/>
+            <a:miter lim="800000"/>
+          </a:ln>
+          <a:effectLst/>
+          <a:extLst>
+            <a:ext uri="{91240B29-F687-4F45-9708-019B960494DF}">
+              <a14:hiddenLine xmlns:a14="http://schemas.microsoft.com/office/drawing/2010/main" w="12700" cap="flat" cmpd="sng" algn="ctr">
+                <a:solidFill>
+                  <a:schemeClr val="accent1">
+                    <a:shade val="50000"/>
+                  </a:schemeClr>
+                </a:solidFill>
+                <a:prstDash val="solid"/>
+                <a:miter lim="800000"/>
+              </a14:hiddenLine>
+            </a:ext>
+          </a:extLst>
+        </p:spPr>
+        <p:style>
+          <a:lnRef idx="2">
+            <a:schemeClr val="accent1">
+              <a:shade val="50000"/>
+            </a:schemeClr>
+          </a:lnRef>
+          <a:fillRef idx="1">
+            <a:schemeClr val="accent1"/>
+          </a:fillRef>
+          <a:effectRef idx="0">
+            <a:schemeClr val="accent1"/>
+          </a:effectRef>
+          <a:fontRef idx="minor">
+            <a:schemeClr val="lt1"/>
+          </a:fontRef>
+        </p:style>
+        <p:txBody>
+          <a:bodyPr rtlCol="0" anchor="ctr"/>
+          <a:lstStyle/>
+          <a:p>
+            <a:pPr algn="ctr"/>
+            <a:endParaRPr lang="en-US"/>
+          </a:p>
+        </p:txBody>
+      </p:sp>
+      <p:sp>
+        <p:nvSpPr>
+          <p:cNvPr id="10" name="Rectangle 9">
+            <a:extLst>
+              <a:ext uri="{FF2B5EF4-FFF2-40B4-BE49-F238E27FC236}">
+                <a16:creationId xmlns:a16="http://schemas.microsoft.com/office/drawing/2014/main" id="{2FFD6B0E-CF13-D513-2E3B-783B112DD275}"/>
+              </a:ext>
+              <a:ext uri="{C183D7F6-B498-43B3-948B-1728B52AA6E4}">
+                <adec:decorative xmlns:adec="http://schemas.microsoft.com/office/drawing/2017/decorative" val="1"/>
+              </a:ext>
+            </a:extLst>
+          </p:cNvPr>
+          <p:cNvSpPr>
+            <a:spLocks noGrp="1" noRot="1" noChangeAspect="1" noMove="1" noResize="1" noEditPoints="1" noAdjustHandles="1" noChangeArrowheads="1" noChangeShapeType="1" noTextEdit="1"/>
+          </p:cNvSpPr>
+          <p:nvPr>
+            <p:extLst>
+              <p:ext uri="{386F3935-93C4-4BCD-93E2-E3B085C9AB24}">
+                <p16:designElem xmlns:p16="http://schemas.microsoft.com/office/powerpoint/2015/main" val="1"/>
+              </p:ext>
+            </p:extLst>
+          </p:nvPr>
+        </p:nvSpPr>
+        <p:spPr>
+          <a:xfrm rot="10800000" flipH="1">
+            <a:off x="0" y="6400799"/>
+            <a:ext cx="12192000" cy="456773"/>
+          </a:xfrm>
+          <a:prstGeom prst="rect">
+            <a:avLst/>
+          </a:prstGeom>
+          <a:gradFill>
+            <a:gsLst>
+              <a:gs pos="0">
+                <a:schemeClr val="accent1"/>
+              </a:gs>
+              <a:gs pos="78000">
+                <a:srgbClr val="000000"/>
+              </a:gs>
+            </a:gsLst>
+            <a:lin ang="7200000" scaled="0"/>
+          </a:gradFill>
+          <a:ln>
+            <a:noFill/>
+          </a:ln>
+        </p:spPr>
+        <p:style>
+          <a:lnRef idx="2">
+            <a:schemeClr val="accent1">
+              <a:shade val="50000"/>
+            </a:schemeClr>
+          </a:lnRef>
+          <a:fillRef idx="1">
+            <a:schemeClr val="accent1"/>
+          </a:fillRef>
+          <a:effectRef idx="0">
+            <a:schemeClr val="accent1"/>
+          </a:effectRef>
+          <a:fontRef idx="minor">
+            <a:schemeClr val="lt1"/>
+          </a:fontRef>
+        </p:style>
+        <p:txBody>
+          <a:bodyPr rtlCol="0" anchor="ctr"/>
+          <a:lstStyle/>
+          <a:p>
+            <a:pPr algn="ctr"/>
+            <a:endParaRPr lang="en-US"/>
+          </a:p>
+        </p:txBody>
+      </p:sp>
+      <p:sp>
+        <p:nvSpPr>
+          <p:cNvPr id="12" name="Rectangle 11">
+            <a:extLst>
+              <a:ext uri="{FF2B5EF4-FFF2-40B4-BE49-F238E27FC236}">
+                <a16:creationId xmlns:a16="http://schemas.microsoft.com/office/drawing/2014/main" id="{84B4F1C6-C607-D28A-92CF-A6F1112D823D}"/>
+              </a:ext>
+              <a:ext uri="{C183D7F6-B498-43B3-948B-1728B52AA6E4}">
+                <adec:decorative xmlns:adec="http://schemas.microsoft.com/office/drawing/2017/decorative" val="1"/>
+              </a:ext>
+            </a:extLst>
+          </p:cNvPr>
+          <p:cNvSpPr>
+            <a:spLocks noGrp="1" noRot="1" noChangeAspect="1" noMove="1" noResize="1" noEditPoints="1" noAdjustHandles="1" noChangeArrowheads="1" noChangeShapeType="1" noTextEdit="1"/>
+          </p:cNvSpPr>
+          <p:nvPr>
+            <p:extLst>
+              <p:ext uri="{386F3935-93C4-4BCD-93E2-E3B085C9AB24}">
+                <p16:designElem xmlns:p16="http://schemas.microsoft.com/office/powerpoint/2015/main" val="1"/>
+              </p:ext>
+            </p:extLst>
+          </p:nvPr>
+        </p:nvSpPr>
+        <p:spPr>
+          <a:xfrm flipH="1">
+            <a:off x="0" y="6400800"/>
+            <a:ext cx="8153398" cy="456772"/>
+          </a:xfrm>
+          <a:prstGeom prst="rect">
+            <a:avLst/>
+          </a:prstGeom>
+          <a:gradFill>
+            <a:gsLst>
+              <a:gs pos="0">
+                <a:srgbClr val="000000">
+                  <a:alpha val="28000"/>
+                </a:srgbClr>
+              </a:gs>
+              <a:gs pos="100000">
+                <a:schemeClr val="accent1">
+                  <a:lumMod val="75000"/>
+                </a:schemeClr>
+              </a:gs>
+            </a:gsLst>
+            <a:lin ang="3000000" scaled="0"/>
+          </a:gradFill>
+          <a:ln>
+            <a:noFill/>
+          </a:ln>
+        </p:spPr>
+        <p:style>
+          <a:lnRef idx="2">
+            <a:schemeClr val="accent1">
+              <a:shade val="50000"/>
+            </a:schemeClr>
+          </a:lnRef>
+          <a:fillRef idx="1">
+            <a:schemeClr val="accent1"/>
+          </a:fillRef>
+          <a:effectRef idx="0">
+            <a:schemeClr val="accent1"/>
+          </a:effectRef>
+          <a:fontRef idx="minor">
+            <a:schemeClr val="lt1"/>
+          </a:fontRef>
+        </p:style>
+        <p:txBody>
+          <a:bodyPr rtlCol="0" anchor="ctr"/>
+          <a:lstStyle/>
+          <a:p>
+            <a:pPr algn="ctr"/>
+            <a:endParaRPr lang="en-US"/>
+          </a:p>
+        </p:txBody>
+      </p:sp>
+      <p:sp>
+        <p:nvSpPr>
+          <p:cNvPr id="7" name="TextBox 1">
+            <a:extLst>
+              <a:ext uri="{FF2B5EF4-FFF2-40B4-BE49-F238E27FC236}">
+                <a16:creationId xmlns:a16="http://schemas.microsoft.com/office/drawing/2014/main" id="{FC8F93AF-3E57-56C5-F748-F74EA57DEE2D}"/>
+              </a:ext>
+            </a:extLst>
+          </p:cNvPr>
+          <p:cNvSpPr txBox="1"/>
+          <p:nvPr/>
+        </p:nvSpPr>
+        <p:spPr>
+          <a:xfrm>
+            <a:off x="3297629" y="3073366"/>
+            <a:ext cx="5592443" cy="707886"/>
+          </a:xfrm>
+          <a:prstGeom prst="rect">
+            <a:avLst/>
+          </a:prstGeom>
+          <a:noFill/>
+        </p:spPr>
+        <p:txBody>
+          <a:bodyPr rot="0" spcFirstLastPara="0" vert="horz" wrap="square" lIns="91440" tIns="45720" rIns="91440" bIns="45720" numCol="1" spcCol="0" rtlCol="0" fromWordArt="0" anchor="t" anchorCtr="0" forceAA="0" compatLnSpc="1">
+            <a:prstTxWarp prst="textNoShape">
+              <a:avLst/>
+            </a:prstTxWarp>
+            <a:spAutoFit/>
+          </a:bodyPr>
+          <a:lstStyle>
+            <a:defPPr>
+              <a:defRPr lang="en-US"/>
+            </a:defPPr>
+            <a:lvl1pPr marL="0" algn="l" defTabSz="914400" rtl="0" eaLnBrk="1" latinLnBrk="0" hangingPunct="1">
+              <a:defRPr sz="1800" kern="1200">
+                <a:solidFill>
+                  <a:schemeClr val="tx1"/>
+                </a:solidFill>
+                <a:latin typeface="+mn-lt"/>
+                <a:ea typeface="+mn-ea"/>
+                <a:cs typeface="+mn-cs"/>
+              </a:defRPr>
+            </a:lvl1pPr>
+            <a:lvl2pPr marL="457200" algn="l" defTabSz="914400" rtl="0" eaLnBrk="1" latinLnBrk="0" hangingPunct="1">
+              <a:defRPr sz="1800" kern="1200">
+                <a:solidFill>
+                  <a:schemeClr val="tx1"/>
+                </a:solidFill>
+                <a:latin typeface="+mn-lt"/>
+                <a:ea typeface="+mn-ea"/>
+                <a:cs typeface="+mn-cs"/>
+              </a:defRPr>
+            </a:lvl2pPr>
+            <a:lvl3pPr marL="914400" algn="l" defTabSz="914400" rtl="0" eaLnBrk="1" latinLnBrk="0" hangingPunct="1">
+              <a:defRPr sz="1800" kern="1200">
+                <a:solidFill>
+                  <a:schemeClr val="tx1"/>
+                </a:solidFill>
+                <a:latin typeface="+mn-lt"/>
+                <a:ea typeface="+mn-ea"/>
+                <a:cs typeface="+mn-cs"/>
+              </a:defRPr>
+            </a:lvl3pPr>
+            <a:lvl4pPr marL="1371600" algn="l" defTabSz="914400" rtl="0" eaLnBrk="1" latinLnBrk="0" hangingPunct="1">
+              <a:defRPr sz="1800" kern="1200">
+                <a:solidFill>
+                  <a:schemeClr val="tx1"/>
+                </a:solidFill>
+                <a:latin typeface="+mn-lt"/>
+                <a:ea typeface="+mn-ea"/>
+                <a:cs typeface="+mn-cs"/>
+              </a:defRPr>
+            </a:lvl4pPr>
+            <a:lvl5pPr marL="1828800" algn="l" defTabSz="914400" rtl="0" eaLnBrk="1" latinLnBrk="0" hangingPunct="1">
+              <a:defRPr sz="1800" kern="1200">
+                <a:solidFill>
+                  <a:schemeClr val="tx1"/>
+                </a:solidFill>
+                <a:latin typeface="+mn-lt"/>
+                <a:ea typeface="+mn-ea"/>
+                <a:cs typeface="+mn-cs"/>
+              </a:defRPr>
+            </a:lvl5pPr>
+            <a:lvl6pPr marL="2286000" algn="l" defTabSz="914400" rtl="0" eaLnBrk="1" latinLnBrk="0" hangingPunct="1">
+              <a:defRPr sz="1800" kern="1200">
+                <a:solidFill>
+                  <a:schemeClr val="tx1"/>
+                </a:solidFill>
+                <a:latin typeface="+mn-lt"/>
+                <a:ea typeface="+mn-ea"/>
+                <a:cs typeface="+mn-cs"/>
+              </a:defRPr>
+            </a:lvl6pPr>
+            <a:lvl7pPr marL="2743200" algn="l" defTabSz="914400" rtl="0" eaLnBrk="1" latinLnBrk="0" hangingPunct="1">
+              <a:defRPr sz="1800" kern="1200">
+                <a:solidFill>
+                  <a:schemeClr val="tx1"/>
+                </a:solidFill>
+                <a:latin typeface="+mn-lt"/>
+                <a:ea typeface="+mn-ea"/>
+                <a:cs typeface="+mn-cs"/>
+              </a:defRPr>
+            </a:lvl7pPr>
+            <a:lvl8pPr marL="3200400" algn="l" defTabSz="914400" rtl="0" eaLnBrk="1" latinLnBrk="0" hangingPunct="1">
+              <a:defRPr sz="1800" kern="1200">
+                <a:solidFill>
+                  <a:schemeClr val="tx1"/>
+                </a:solidFill>
+                <a:latin typeface="+mn-lt"/>
+                <a:ea typeface="+mn-ea"/>
+                <a:cs typeface="+mn-cs"/>
+              </a:defRPr>
+            </a:lvl8pPr>
+            <a:lvl9pPr marL="3657600" algn="l" defTabSz="914400" rtl="0" eaLnBrk="1" latinLnBrk="0" hangingPunct="1">
+              <a:defRPr sz="1800" kern="1200">
+                <a:solidFill>
+                  <a:schemeClr val="tx1"/>
+                </a:solidFill>
+                <a:latin typeface="+mn-lt"/>
+                <a:ea typeface="+mn-ea"/>
+                <a:cs typeface="+mn-cs"/>
+              </a:defRPr>
+            </a:lvl9pPr>
+          </a:lstStyle>
+          <a:p>
+            <a:pPr algn="ctr"/>
+            <a:r>
+              <a:rPr lang="en-US" sz="4000" b="1" dirty="0">
+                <a:solidFill>
+                  <a:srgbClr val="843C0C"/>
+                </a:solidFill>
+                <a:latin typeface="Calibri Light"/>
+                <a:cs typeface="Calibri"/>
+              </a:rPr>
+              <a:t>THANK YOU</a:t>
+            </a:r>
+            <a:endParaRPr lang="en-US"/>
+          </a:p>
+        </p:txBody>
+      </p:sp>
+      <p:cxnSp>
+        <p:nvCxnSpPr>
+          <p:cNvPr id="11" name="Straight Arrow Connector 10">
+            <a:extLst>
+              <a:ext uri="{FF2B5EF4-FFF2-40B4-BE49-F238E27FC236}">
+                <a16:creationId xmlns:a16="http://schemas.microsoft.com/office/drawing/2014/main" id="{55D3690C-6950-246B-4DCC-DC4E27A7DB57}"/>
+              </a:ext>
+            </a:extLst>
+          </p:cNvPr>
+          <p:cNvCxnSpPr/>
+          <p:nvPr/>
+        </p:nvCxnSpPr>
+        <p:spPr>
+          <a:xfrm>
+            <a:off x="4601" y="1179450"/>
+            <a:ext cx="11712740" cy="62163"/>
+          </a:xfrm>
+          <a:prstGeom prst="straightConnector1">
+            <a:avLst/>
+          </a:prstGeom>
+        </p:spPr>
+        <p:style>
+          <a:lnRef idx="1">
+            <a:schemeClr val="accent1"/>
+          </a:lnRef>
+          <a:fillRef idx="0">
+            <a:schemeClr val="accent1"/>
+          </a:fillRef>
+          <a:effectRef idx="0">
+            <a:schemeClr val="accent1"/>
+          </a:effectRef>
+          <a:fontRef idx="minor">
+            <a:schemeClr val="tx1"/>
+          </a:fontRef>
+        </p:style>
+      </p:cxnSp>
+      <p:sp>
+        <p:nvSpPr>
+          <p:cNvPr id="14" name="Slide Number Placeholder 13">
+            <a:extLst>
+              <a:ext uri="{FF2B5EF4-FFF2-40B4-BE49-F238E27FC236}">
+                <a16:creationId xmlns:a16="http://schemas.microsoft.com/office/drawing/2014/main" id="{2EECF94F-AE5E-5F9A-63F3-16FF8991D9AE}"/>
+              </a:ext>
+            </a:extLst>
+          </p:cNvPr>
+          <p:cNvSpPr>
+            <a:spLocks noGrp="1"/>
+          </p:cNvSpPr>
+          <p:nvPr>
+            <p:ph type="sldNum" sz="quarter" idx="12"/>
+          </p:nvPr>
+        </p:nvSpPr>
+        <p:spPr/>
+        <p:txBody>
+          <a:bodyPr/>
+          <a:lstStyle/>
+          <a:p>
+            <a:r>
+              <a:rPr lang="en-US">
+                <a:solidFill>
+                  <a:schemeClr val="bg1"/>
+                </a:solidFill>
+                <a:cs typeface="Calibri"/>
+              </a:rPr>
+              <a:t>23</a:t>
+            </a:r>
+            <a:endParaRPr lang="en-US" dirty="0">
+              <a:solidFill>
+                <a:schemeClr val="bg1"/>
+              </a:solidFill>
+              <a:cs typeface="Calibri"/>
+            </a:endParaRPr>
+          </a:p>
+        </p:txBody>
+      </p:sp>
+    </p:spTree>
+    <p:extLst>
+      <p:ext uri="{BB962C8B-B14F-4D97-AF65-F5344CB8AC3E}">
+        <p14:creationId xmlns:p14="http://schemas.microsoft.com/office/powerpoint/2010/main" val="205829759"/>
       </p:ext>
     </p:extLst>
   </p:cSld>
@@ -14939,7 +16193,21 @@
                 <a:ea typeface="+mn-lt"/>
                 <a:cs typeface="+mn-lt"/>
               </a:rPr>
-              <a:t>   - Approach: Explore profit and loss across markets, products, regions.</a:t>
+              <a:t>   - Approach: Explore profit and loss across markets, products, </a:t>
+            </a:r>
+            <a:r>
+              <a:rPr lang="en-US" sz="2000">
+                <a:ea typeface="+mn-lt"/>
+                <a:cs typeface="+mn-lt"/>
+              </a:rPr>
+              <a:t>and </a:t>
+            </a:r>
+            <a:r>
+              <a:rPr lang="en-US" sz="2000" dirty="0">
+                <a:ea typeface="+mn-lt"/>
+                <a:cs typeface="+mn-lt"/>
+              </a:rPr>
+              <a:t>regions.</a:t>
             </a:r>
             <a:endParaRPr lang="en-US" sz="2000" dirty="0">
               <a:cs typeface="Calibri"/>
@@ -15058,6 +16326,13 @@
                 <a:cs typeface="+mn-lt"/>
               </a:rPr>
               <a:t>   - Outcome: Insights from the weather API correlation with the sales in USA and India</a:t>
+            </a:r>
+            <a:r>
+              <a:rPr lang="en-US" sz="2000">
+                <a:ea typeface="+mn-lt"/>
+                <a:cs typeface="+mn-lt"/>
+              </a:rPr>
+              <a:t>.</a:t>
             </a:r>
             <a:endParaRPr lang="en-US" sz="2000" dirty="0">
               <a:cs typeface="Calibri"/>
@@ -15565,8 +16840,8 @@
         </p:blipFill>
         <p:spPr>
           <a:xfrm>
-            <a:off x="214313" y="1847850"/>
-            <a:ext cx="11839575" cy="3257550"/>
+            <a:off x="177142" y="2173094"/>
+            <a:ext cx="11839575" cy="3610671"/>
           </a:xfrm>
           <a:prstGeom prst="rect">
             <a:avLst/>
@@ -16072,8 +17347,8 @@
         </p:blipFill>
         <p:spPr>
           <a:xfrm>
-            <a:off x="1681163" y="1233488"/>
-            <a:ext cx="7372350" cy="4848225"/>
+            <a:off x="2396700" y="1270659"/>
+            <a:ext cx="7706886" cy="5089834"/>
           </a:xfrm>
           <a:prstGeom prst="rect">
             <a:avLst/>
@@ -17226,7 +18501,7 @@
         <p:spPr>
           <a:xfrm>
             <a:off x="0" y="1846856"/>
-            <a:ext cx="10372725" cy="3840562"/>
+            <a:ext cx="11775920" cy="4360952"/>
           </a:xfrm>
           <a:prstGeom prst="rect">
             <a:avLst/>
@@ -18000,7 +19275,31 @@
                 <a:latin typeface="Calibri Light"/>
                 <a:cs typeface="Calibri"/>
               </a:rPr>
-              <a:t>Net Sales Vs. Gross Margin By Customer</a:t>
+              <a:t>Net Sales </a:t>
+            </a:r>
+            <a:r>
+              <a:rPr lang="en-US" sz="2800" b="1">
+                <a:solidFill>
+                  <a:schemeClr val="accent1">
+                    <a:lumMod val="50000"/>
+                  </a:schemeClr>
+                </a:solidFill>
+                <a:latin typeface="Calibri Light"/>
+                <a:cs typeface="Calibri"/>
+              </a:rPr>
+              <a:t>vs </a:t>
+            </a:r>
+            <a:r>
+              <a:rPr lang="en-US" sz="2800" b="1" dirty="0">
+                <a:solidFill>
+                  <a:schemeClr val="accent1">
+                    <a:lumMod val="50000"/>
+                  </a:schemeClr>
+                </a:solidFill>
+                <a:latin typeface="Calibri Light"/>
+                <a:cs typeface="Calibri"/>
+              </a:rPr>
+              <a:t>Gross Margin By Customer</a:t>
             </a:r>
             <a:endParaRPr lang="en-US" dirty="0">
               <a:solidFill>

</xml_diff>

<commit_message>
- DAM - Final Project Presentation
</commit_message>
<xml_diff>
--- a/Final_Project/DAM - Final Project Presentation.pptx
+++ b/Final_Project/DAM - Final Project Presentation.pptx
@@ -139,7 +139,7 @@
 <p1510:revInfo xmlns:a="http://schemas.openxmlformats.org/drawingml/2006/main" xmlns:r="http://schemas.openxmlformats.org/officeDocument/2006/relationships" xmlns:p1510="http://schemas.microsoft.com/office/powerpoint/2015/10/main">
   <p1510:revLst>
     <p1510:client id="{2F33739F-3E8E-4E4D-BD9C-119954084C7B}" v="111" dt="2023-12-19T21:02:48.305"/>
-    <p1510:client id="{4170EDE1-74A4-3671-8BFC-743D95BFCA69}" v="1164" dt="2023-12-19T20:59:10.391"/>
+    <p1510:client id="{4170EDE1-74A4-3671-8BFC-743D95BFCA69}" v="1196" dt="2023-12-19T21:31:07.963"/>
     <p1510:client id="{49D9C7F2-D204-F334-2A7E-24D61547E2EB}" v="2074" dt="2023-12-19T17:24:42.592"/>
   </p1510:revLst>
 </p1510:revInfo>
@@ -187,7 +187,7 @@
           </a:lstStyle>
           <a:p>
             <a:r>
-              <a:rPr lang="en-US" dirty="0"/>
+              <a:rPr lang="en-US"/>
               <a:t>Click to edit Master title style</a:t>
             </a:r>
           </a:p>
@@ -251,7 +251,7 @@
           </a:lstStyle>
           <a:p>
             <a:r>
-              <a:rPr lang="en-US" dirty="0"/>
+              <a:rPr lang="en-US"/>
               <a:t>Click to edit Master subtitle style</a:t>
             </a:r>
           </a:p>
@@ -276,7 +276,7 @@
               <a:rPr lang="en-US" dirty="0"/>
               <a:t>12/19/2023</a:t>
             </a:fld>
-            <a:endParaRPr lang="en-US" dirty="0"/>
+            <a:endParaRPr lang="en-US"/>
           </a:p>
         </p:txBody>
       </p:sp>
@@ -296,7 +296,7 @@
           <a:lstStyle/>
           <a:p>
             <a:r>
-              <a:rPr lang="en-US" dirty="0"/>
+              <a:rPr lang="en-US"/>
               <a:t>1</a:t>
             </a:r>
           </a:p>
@@ -321,7 +321,7 @@
               <a:rPr lang="en-US" dirty="0"/>
               <a:t>‹#›</a:t>
             </a:fld>
-            <a:endParaRPr lang="en-US" dirty="0"/>
+            <a:endParaRPr lang="en-US"/>
           </a:p>
         </p:txBody>
       </p:sp>
@@ -372,7 +372,7 @@
           <a:lstStyle/>
           <a:p>
             <a:r>
-              <a:rPr lang="en-US" dirty="0"/>
+              <a:rPr lang="en-US"/>
               <a:t>Click to edit Master title style</a:t>
             </a:r>
           </a:p>
@@ -395,35 +395,35 @@
           <a:p>
             <a:pPr lvl="0"/>
             <a:r>
-              <a:rPr lang="en-US" dirty="0"/>
+              <a:rPr lang="en-US"/>
               <a:t>Click to edit Master text styles</a:t>
             </a:r>
           </a:p>
           <a:p>
             <a:pPr lvl="1"/>
             <a:r>
-              <a:rPr lang="en-US" dirty="0"/>
+              <a:rPr lang="en-US"/>
               <a:t>Second level</a:t>
             </a:r>
           </a:p>
           <a:p>
             <a:pPr lvl="2"/>
             <a:r>
-              <a:rPr lang="en-US" dirty="0"/>
+              <a:rPr lang="en-US"/>
               <a:t>Third level</a:t>
             </a:r>
           </a:p>
           <a:p>
             <a:pPr lvl="3"/>
             <a:r>
-              <a:rPr lang="en-US" dirty="0"/>
+              <a:rPr lang="en-US"/>
               <a:t>Fourth level</a:t>
             </a:r>
           </a:p>
           <a:p>
             <a:pPr lvl="4"/>
             <a:r>
-              <a:rPr lang="en-US" dirty="0"/>
+              <a:rPr lang="en-US"/>
               <a:t>Fifth level</a:t>
             </a:r>
           </a:p>
@@ -448,7 +448,7 @@
               <a:rPr lang="en-US" dirty="0"/>
               <a:t>12/19/2023</a:t>
             </a:fld>
-            <a:endParaRPr lang="en-US" dirty="0"/>
+            <a:endParaRPr lang="en-US"/>
           </a:p>
         </p:txBody>
       </p:sp>
@@ -468,7 +468,7 @@
           <a:lstStyle/>
           <a:p>
             <a:r>
-              <a:rPr lang="en-US" dirty="0"/>
+              <a:rPr lang="en-US"/>
               <a:t>1</a:t>
             </a:r>
           </a:p>
@@ -493,7 +493,7 @@
               <a:rPr lang="en-US" dirty="0"/>
               <a:t>‹#›</a:t>
             </a:fld>
-            <a:endParaRPr lang="en-US" dirty="0"/>
+            <a:endParaRPr lang="en-US"/>
           </a:p>
         </p:txBody>
       </p:sp>
@@ -549,7 +549,7 @@
           <a:lstStyle/>
           <a:p>
             <a:r>
-              <a:rPr lang="en-US" dirty="0"/>
+              <a:rPr lang="en-US"/>
               <a:t>Click to edit Master title style</a:t>
             </a:r>
           </a:p>
@@ -577,35 +577,35 @@
           <a:p>
             <a:pPr lvl="0"/>
             <a:r>
-              <a:rPr lang="en-US" dirty="0"/>
+              <a:rPr lang="en-US"/>
               <a:t>Click to edit Master text styles</a:t>
             </a:r>
           </a:p>
           <a:p>
             <a:pPr lvl="1"/>
             <a:r>
-              <a:rPr lang="en-US" dirty="0"/>
+              <a:rPr lang="en-US"/>
               <a:t>Second level</a:t>
             </a:r>
           </a:p>
           <a:p>
             <a:pPr lvl="2"/>
             <a:r>
-              <a:rPr lang="en-US" dirty="0"/>
+              <a:rPr lang="en-US"/>
               <a:t>Third level</a:t>
             </a:r>
           </a:p>
           <a:p>
             <a:pPr lvl="3"/>
             <a:r>
-              <a:rPr lang="en-US" dirty="0"/>
+              <a:rPr lang="en-US"/>
               <a:t>Fourth level</a:t>
             </a:r>
           </a:p>
           <a:p>
             <a:pPr lvl="4"/>
             <a:r>
-              <a:rPr lang="en-US" dirty="0"/>
+              <a:rPr lang="en-US"/>
               <a:t>Fifth level</a:t>
             </a:r>
           </a:p>
@@ -630,7 +630,7 @@
               <a:rPr lang="en-US" dirty="0"/>
               <a:t>12/19/2023</a:t>
             </a:fld>
-            <a:endParaRPr lang="en-US" dirty="0"/>
+            <a:endParaRPr lang="en-US"/>
           </a:p>
         </p:txBody>
       </p:sp>
@@ -650,7 +650,7 @@
           <a:lstStyle/>
           <a:p>
             <a:r>
-              <a:rPr lang="en-US" dirty="0"/>
+              <a:rPr lang="en-US"/>
               <a:t>1</a:t>
             </a:r>
           </a:p>
@@ -675,7 +675,7 @@
               <a:rPr lang="en-US" dirty="0"/>
               <a:t>‹#›</a:t>
             </a:fld>
-            <a:endParaRPr lang="en-US" dirty="0"/>
+            <a:endParaRPr lang="en-US"/>
           </a:p>
         </p:txBody>
       </p:sp>
@@ -726,7 +726,7 @@
           <a:lstStyle/>
           <a:p>
             <a:r>
-              <a:rPr lang="en-US" dirty="0"/>
+              <a:rPr lang="en-US"/>
               <a:t>Click to edit Master title style</a:t>
             </a:r>
           </a:p>
@@ -749,35 +749,35 @@
           <a:p>
             <a:pPr lvl="0"/>
             <a:r>
-              <a:rPr lang="en-US" dirty="0"/>
+              <a:rPr lang="en-US"/>
               <a:t>Click to edit Master text styles</a:t>
             </a:r>
           </a:p>
           <a:p>
             <a:pPr lvl="1"/>
             <a:r>
-              <a:rPr lang="en-US" dirty="0"/>
+              <a:rPr lang="en-US"/>
               <a:t>Second level</a:t>
             </a:r>
           </a:p>
           <a:p>
             <a:pPr lvl="2"/>
             <a:r>
-              <a:rPr lang="en-US" dirty="0"/>
+              <a:rPr lang="en-US"/>
               <a:t>Third level</a:t>
             </a:r>
           </a:p>
           <a:p>
             <a:pPr lvl="3"/>
             <a:r>
-              <a:rPr lang="en-US" dirty="0"/>
+              <a:rPr lang="en-US"/>
               <a:t>Fourth level</a:t>
             </a:r>
           </a:p>
           <a:p>
             <a:pPr lvl="4"/>
             <a:r>
-              <a:rPr lang="en-US" dirty="0"/>
+              <a:rPr lang="en-US"/>
               <a:t>Fifth level</a:t>
             </a:r>
           </a:p>
@@ -802,7 +802,7 @@
               <a:rPr lang="en-US" dirty="0"/>
               <a:t>12/19/2023</a:t>
             </a:fld>
-            <a:endParaRPr lang="en-US" dirty="0"/>
+            <a:endParaRPr lang="en-US"/>
           </a:p>
         </p:txBody>
       </p:sp>
@@ -822,7 +822,7 @@
           <a:lstStyle/>
           <a:p>
             <a:r>
-              <a:rPr lang="en-US" dirty="0"/>
+              <a:rPr lang="en-US"/>
               <a:t>1</a:t>
             </a:r>
           </a:p>
@@ -847,7 +847,7 @@
               <a:rPr lang="en-US" dirty="0"/>
               <a:t>‹#›</a:t>
             </a:fld>
-            <a:endParaRPr lang="en-US" dirty="0"/>
+            <a:endParaRPr lang="en-US"/>
           </a:p>
         </p:txBody>
       </p:sp>
@@ -907,7 +907,7 @@
           </a:lstStyle>
           <a:p>
             <a:r>
-              <a:rPr lang="en-US" dirty="0"/>
+              <a:rPr lang="en-US"/>
               <a:t>Click to edit Master title style</a:t>
             </a:r>
           </a:p>
@@ -1026,7 +1026,7 @@
           <a:p>
             <a:pPr lvl="0"/>
             <a:r>
-              <a:rPr lang="en-US" dirty="0"/>
+              <a:rPr lang="en-US"/>
               <a:t>Click to edit Master text styles</a:t>
             </a:r>
           </a:p>
@@ -1051,7 +1051,7 @@
               <a:rPr lang="en-US" dirty="0"/>
               <a:t>12/19/2023</a:t>
             </a:fld>
-            <a:endParaRPr lang="en-US" dirty="0"/>
+            <a:endParaRPr lang="en-US"/>
           </a:p>
         </p:txBody>
       </p:sp>
@@ -1071,7 +1071,7 @@
           <a:lstStyle/>
           <a:p>
             <a:r>
-              <a:rPr lang="en-US" dirty="0"/>
+              <a:rPr lang="en-US"/>
               <a:t>1</a:t>
             </a:r>
           </a:p>
@@ -1096,7 +1096,7 @@
               <a:rPr lang="en-US" dirty="0"/>
               <a:t>‹#›</a:t>
             </a:fld>
-            <a:endParaRPr lang="en-US" dirty="0"/>
+            <a:endParaRPr lang="en-US"/>
           </a:p>
         </p:txBody>
       </p:sp>
@@ -1147,7 +1147,7 @@
           <a:lstStyle/>
           <a:p>
             <a:r>
-              <a:rPr lang="en-US" dirty="0"/>
+              <a:rPr lang="en-US"/>
               <a:t>Click to edit Master title style</a:t>
             </a:r>
           </a:p>
@@ -1175,35 +1175,35 @@
           <a:p>
             <a:pPr lvl="0"/>
             <a:r>
-              <a:rPr lang="en-US" dirty="0"/>
+              <a:rPr lang="en-US"/>
               <a:t>Click to edit Master text styles</a:t>
             </a:r>
           </a:p>
           <a:p>
             <a:pPr lvl="1"/>
             <a:r>
-              <a:rPr lang="en-US" dirty="0"/>
+              <a:rPr lang="en-US"/>
               <a:t>Second level</a:t>
             </a:r>
           </a:p>
           <a:p>
             <a:pPr lvl="2"/>
             <a:r>
-              <a:rPr lang="en-US" dirty="0"/>
+              <a:rPr lang="en-US"/>
               <a:t>Third level</a:t>
             </a:r>
           </a:p>
           <a:p>
             <a:pPr lvl="3"/>
             <a:r>
-              <a:rPr lang="en-US" dirty="0"/>
+              <a:rPr lang="en-US"/>
               <a:t>Fourth level</a:t>
             </a:r>
           </a:p>
           <a:p>
             <a:pPr lvl="4"/>
             <a:r>
-              <a:rPr lang="en-US" dirty="0"/>
+              <a:rPr lang="en-US"/>
               <a:t>Fifth level</a:t>
             </a:r>
           </a:p>
@@ -1231,35 +1231,35 @@
           <a:p>
             <a:pPr lvl="0"/>
             <a:r>
-              <a:rPr lang="en-US" dirty="0"/>
+              <a:rPr lang="en-US"/>
               <a:t>Click to edit Master text styles</a:t>
             </a:r>
           </a:p>
           <a:p>
             <a:pPr lvl="1"/>
             <a:r>
-              <a:rPr lang="en-US" dirty="0"/>
+              <a:rPr lang="en-US"/>
               <a:t>Second level</a:t>
             </a:r>
           </a:p>
           <a:p>
             <a:pPr lvl="2"/>
             <a:r>
-              <a:rPr lang="en-US" dirty="0"/>
+              <a:rPr lang="en-US"/>
               <a:t>Third level</a:t>
             </a:r>
           </a:p>
           <a:p>
             <a:pPr lvl="3"/>
             <a:r>
-              <a:rPr lang="en-US" dirty="0"/>
+              <a:rPr lang="en-US"/>
               <a:t>Fourth level</a:t>
             </a:r>
           </a:p>
           <a:p>
             <a:pPr lvl="4"/>
             <a:r>
-              <a:rPr lang="en-US" dirty="0"/>
+              <a:rPr lang="en-US"/>
               <a:t>Fifth level</a:t>
             </a:r>
           </a:p>
@@ -1284,7 +1284,7 @@
               <a:rPr lang="en-US" dirty="0"/>
               <a:t>12/19/2023</a:t>
             </a:fld>
-            <a:endParaRPr lang="en-US" dirty="0"/>
+            <a:endParaRPr lang="en-US"/>
           </a:p>
         </p:txBody>
       </p:sp>
@@ -1304,7 +1304,7 @@
           <a:lstStyle/>
           <a:p>
             <a:r>
-              <a:rPr lang="en-US" dirty="0"/>
+              <a:rPr lang="en-US"/>
               <a:t>1</a:t>
             </a:r>
           </a:p>
@@ -1329,7 +1329,7 @@
               <a:rPr lang="en-US" dirty="0"/>
               <a:t>‹#›</a:t>
             </a:fld>
-            <a:endParaRPr lang="en-US" dirty="0"/>
+            <a:endParaRPr lang="en-US"/>
           </a:p>
         </p:txBody>
       </p:sp>
@@ -1385,7 +1385,7 @@
           <a:lstStyle/>
           <a:p>
             <a:r>
-              <a:rPr lang="en-US" dirty="0"/>
+              <a:rPr lang="en-US"/>
               <a:t>Click to edit Master title style</a:t>
             </a:r>
           </a:p>
@@ -1450,7 +1450,7 @@
           <a:p>
             <a:pPr lvl="0"/>
             <a:r>
-              <a:rPr lang="en-US" dirty="0"/>
+              <a:rPr lang="en-US"/>
               <a:t>Click to edit Master text styles</a:t>
             </a:r>
           </a:p>
@@ -1478,35 +1478,35 @@
           <a:p>
             <a:pPr lvl="0"/>
             <a:r>
-              <a:rPr lang="en-US" dirty="0"/>
+              <a:rPr lang="en-US"/>
               <a:t>Click to edit Master text styles</a:t>
             </a:r>
           </a:p>
           <a:p>
             <a:pPr lvl="1"/>
             <a:r>
-              <a:rPr lang="en-US" dirty="0"/>
+              <a:rPr lang="en-US"/>
               <a:t>Second level</a:t>
             </a:r>
           </a:p>
           <a:p>
             <a:pPr lvl="2"/>
             <a:r>
-              <a:rPr lang="en-US" dirty="0"/>
+              <a:rPr lang="en-US"/>
               <a:t>Third level</a:t>
             </a:r>
           </a:p>
           <a:p>
             <a:pPr lvl="3"/>
             <a:r>
-              <a:rPr lang="en-US" dirty="0"/>
+              <a:rPr lang="en-US"/>
               <a:t>Fourth level</a:t>
             </a:r>
           </a:p>
           <a:p>
             <a:pPr lvl="4"/>
             <a:r>
-              <a:rPr lang="en-US" dirty="0"/>
+              <a:rPr lang="en-US"/>
               <a:t>Fifth level</a:t>
             </a:r>
           </a:p>
@@ -1571,7 +1571,7 @@
           <a:p>
             <a:pPr lvl="0"/>
             <a:r>
-              <a:rPr lang="en-US" dirty="0"/>
+              <a:rPr lang="en-US"/>
               <a:t>Click to edit Master text styles</a:t>
             </a:r>
           </a:p>
@@ -1599,35 +1599,35 @@
           <a:p>
             <a:pPr lvl="0"/>
             <a:r>
-              <a:rPr lang="en-US" dirty="0"/>
+              <a:rPr lang="en-US"/>
               <a:t>Click to edit Master text styles</a:t>
             </a:r>
           </a:p>
           <a:p>
             <a:pPr lvl="1"/>
             <a:r>
-              <a:rPr lang="en-US" dirty="0"/>
+              <a:rPr lang="en-US"/>
               <a:t>Second level</a:t>
             </a:r>
           </a:p>
           <a:p>
             <a:pPr lvl="2"/>
             <a:r>
-              <a:rPr lang="en-US" dirty="0"/>
+              <a:rPr lang="en-US"/>
               <a:t>Third level</a:t>
             </a:r>
           </a:p>
           <a:p>
             <a:pPr lvl="3"/>
             <a:r>
-              <a:rPr lang="en-US" dirty="0"/>
+              <a:rPr lang="en-US"/>
               <a:t>Fourth level</a:t>
             </a:r>
           </a:p>
           <a:p>
             <a:pPr lvl="4"/>
             <a:r>
-              <a:rPr lang="en-US" dirty="0"/>
+              <a:rPr lang="en-US"/>
               <a:t>Fifth level</a:t>
             </a:r>
           </a:p>
@@ -1652,7 +1652,7 @@
               <a:rPr lang="en-US" dirty="0"/>
               <a:t>12/19/2023</a:t>
             </a:fld>
-            <a:endParaRPr lang="en-US" dirty="0"/>
+            <a:endParaRPr lang="en-US"/>
           </a:p>
         </p:txBody>
       </p:sp>
@@ -1672,7 +1672,7 @@
           <a:lstStyle/>
           <a:p>
             <a:r>
-              <a:rPr lang="en-US" dirty="0"/>
+              <a:rPr lang="en-US"/>
               <a:t>1</a:t>
             </a:r>
           </a:p>
@@ -1697,7 +1697,7 @@
               <a:rPr lang="en-US" dirty="0"/>
               <a:t>‹#›</a:t>
             </a:fld>
-            <a:endParaRPr lang="en-US" dirty="0"/>
+            <a:endParaRPr lang="en-US"/>
           </a:p>
         </p:txBody>
       </p:sp>
@@ -1748,7 +1748,7 @@
           <a:lstStyle/>
           <a:p>
             <a:r>
-              <a:rPr lang="en-US" dirty="0"/>
+              <a:rPr lang="en-US"/>
               <a:t>Click to edit Master title style</a:t>
             </a:r>
           </a:p>
@@ -1773,7 +1773,7 @@
               <a:rPr lang="en-US" dirty="0"/>
               <a:t>12/19/2023</a:t>
             </a:fld>
-            <a:endParaRPr lang="en-US" dirty="0"/>
+            <a:endParaRPr lang="en-US"/>
           </a:p>
         </p:txBody>
       </p:sp>
@@ -1793,7 +1793,7 @@
           <a:lstStyle/>
           <a:p>
             <a:r>
-              <a:rPr lang="en-US" dirty="0"/>
+              <a:rPr lang="en-US"/>
               <a:t>1</a:t>
             </a:r>
           </a:p>
@@ -1818,7 +1818,7 @@
               <a:rPr lang="en-US" dirty="0"/>
               <a:t>‹#›</a:t>
             </a:fld>
-            <a:endParaRPr lang="en-US" dirty="0"/>
+            <a:endParaRPr lang="en-US"/>
           </a:p>
         </p:txBody>
       </p:sp>
@@ -1872,7 +1872,7 @@
               <a:rPr lang="en-US" dirty="0"/>
               <a:t>12/19/2023</a:t>
             </a:fld>
-            <a:endParaRPr lang="en-US" dirty="0"/>
+            <a:endParaRPr lang="en-US"/>
           </a:p>
         </p:txBody>
       </p:sp>
@@ -1892,7 +1892,7 @@
           <a:lstStyle/>
           <a:p>
             <a:r>
-              <a:rPr lang="en-US" dirty="0"/>
+              <a:rPr lang="en-US"/>
               <a:t>1</a:t>
             </a:r>
           </a:p>
@@ -1917,7 +1917,7 @@
               <a:rPr lang="en-US" dirty="0"/>
               <a:t>‹#›</a:t>
             </a:fld>
-            <a:endParaRPr lang="en-US" dirty="0"/>
+            <a:endParaRPr lang="en-US"/>
           </a:p>
         </p:txBody>
       </p:sp>
@@ -1977,7 +1977,7 @@
           </a:lstStyle>
           <a:p>
             <a:r>
-              <a:rPr lang="en-US" dirty="0"/>
+              <a:rPr lang="en-US"/>
               <a:t>Click to edit Master title style</a:t>
             </a:r>
           </a:p>
@@ -2033,35 +2033,35 @@
           <a:p>
             <a:pPr lvl="0"/>
             <a:r>
-              <a:rPr lang="en-US" dirty="0"/>
+              <a:rPr lang="en-US"/>
               <a:t>Click to edit Master text styles</a:t>
             </a:r>
           </a:p>
           <a:p>
             <a:pPr lvl="1"/>
             <a:r>
-              <a:rPr lang="en-US" dirty="0"/>
+              <a:rPr lang="en-US"/>
               <a:t>Second level</a:t>
             </a:r>
           </a:p>
           <a:p>
             <a:pPr lvl="2"/>
             <a:r>
-              <a:rPr lang="en-US" dirty="0"/>
+              <a:rPr lang="en-US"/>
               <a:t>Third level</a:t>
             </a:r>
           </a:p>
           <a:p>
             <a:pPr lvl="3"/>
             <a:r>
-              <a:rPr lang="en-US" dirty="0"/>
+              <a:rPr lang="en-US"/>
               <a:t>Fourth level</a:t>
             </a:r>
           </a:p>
           <a:p>
             <a:pPr lvl="4"/>
             <a:r>
-              <a:rPr lang="en-US" dirty="0"/>
+              <a:rPr lang="en-US"/>
               <a:t>Fifth level</a:t>
             </a:r>
           </a:p>
@@ -2126,7 +2126,7 @@
           <a:p>
             <a:pPr lvl="0"/>
             <a:r>
-              <a:rPr lang="en-US" dirty="0"/>
+              <a:rPr lang="en-US"/>
               <a:t>Click to edit Master text styles</a:t>
             </a:r>
           </a:p>
@@ -2151,7 +2151,7 @@
               <a:rPr lang="en-US" dirty="0"/>
               <a:t>12/19/2023</a:t>
             </a:fld>
-            <a:endParaRPr lang="en-US" dirty="0"/>
+            <a:endParaRPr lang="en-US"/>
           </a:p>
         </p:txBody>
       </p:sp>
@@ -2171,7 +2171,7 @@
           <a:lstStyle/>
           <a:p>
             <a:r>
-              <a:rPr lang="en-US" dirty="0"/>
+              <a:rPr lang="en-US"/>
               <a:t>1</a:t>
             </a:r>
           </a:p>
@@ -2196,7 +2196,7 @@
               <a:rPr lang="en-US" dirty="0"/>
               <a:t>‹#›</a:t>
             </a:fld>
-            <a:endParaRPr lang="en-US" dirty="0"/>
+            <a:endParaRPr lang="en-US"/>
           </a:p>
         </p:txBody>
       </p:sp>
@@ -2256,7 +2256,7 @@
           </a:lstStyle>
           <a:p>
             <a:r>
-              <a:rPr lang="en-US" dirty="0"/>
+              <a:rPr lang="en-US"/>
               <a:t>Click to edit Master title style</a:t>
             </a:r>
           </a:p>
@@ -2319,7 +2319,7 @@
             </a:lvl9pPr>
           </a:lstStyle>
           <a:p>
-            <a:endParaRPr lang="en-US" dirty="0"/>
+            <a:endParaRPr lang="en-US"/>
           </a:p>
         </p:txBody>
       </p:sp>
@@ -2382,7 +2382,7 @@
           <a:p>
             <a:pPr lvl="0"/>
             <a:r>
-              <a:rPr lang="en-US" dirty="0"/>
+              <a:rPr lang="en-US"/>
               <a:t>Click to edit Master text styles</a:t>
             </a:r>
           </a:p>
@@ -2407,7 +2407,7 @@
               <a:rPr lang="en-US" dirty="0"/>
               <a:t>12/19/2023</a:t>
             </a:fld>
-            <a:endParaRPr lang="en-US" dirty="0"/>
+            <a:endParaRPr lang="en-US"/>
           </a:p>
         </p:txBody>
       </p:sp>
@@ -2427,7 +2427,7 @@
           <a:lstStyle/>
           <a:p>
             <a:r>
-              <a:rPr lang="en-US" dirty="0"/>
+              <a:rPr lang="en-US"/>
               <a:t>1</a:t>
             </a:r>
           </a:p>
@@ -2452,7 +2452,7 @@
               <a:rPr lang="en-US" dirty="0"/>
               <a:t>‹#›</a:t>
             </a:fld>
-            <a:endParaRPr lang="en-US" dirty="0"/>
+            <a:endParaRPr lang="en-US"/>
           </a:p>
         </p:txBody>
       </p:sp>
@@ -2518,7 +2518,7 @@
           <a:lstStyle/>
           <a:p>
             <a:r>
-              <a:rPr lang="en-US" dirty="0"/>
+              <a:rPr lang="en-US"/>
               <a:t>Click to edit Master title style</a:t>
             </a:r>
           </a:p>
@@ -2551,35 +2551,35 @@
           <a:p>
             <a:pPr lvl="0"/>
             <a:r>
-              <a:rPr lang="en-US" dirty="0"/>
+              <a:rPr lang="en-US"/>
               <a:t>Click to edit Master text styles</a:t>
             </a:r>
           </a:p>
           <a:p>
             <a:pPr lvl="1"/>
             <a:r>
-              <a:rPr lang="en-US" dirty="0"/>
+              <a:rPr lang="en-US"/>
               <a:t>Second level</a:t>
             </a:r>
           </a:p>
           <a:p>
             <a:pPr lvl="2"/>
             <a:r>
-              <a:rPr lang="en-US" dirty="0"/>
+              <a:rPr lang="en-US"/>
               <a:t>Third level</a:t>
             </a:r>
           </a:p>
           <a:p>
             <a:pPr lvl="3"/>
             <a:r>
-              <a:rPr lang="en-US" dirty="0"/>
+              <a:rPr lang="en-US"/>
               <a:t>Fourth level</a:t>
             </a:r>
           </a:p>
           <a:p>
             <a:pPr lvl="4"/>
             <a:r>
-              <a:rPr lang="en-US" dirty="0"/>
+              <a:rPr lang="en-US"/>
               <a:t>Fifth level</a:t>
             </a:r>
           </a:p>
@@ -2622,7 +2622,7 @@
               <a:rPr lang="en-US" dirty="0"/>
               <a:t>12/19/2023</a:t>
             </a:fld>
-            <a:endParaRPr lang="en-US" dirty="0"/>
+            <a:endParaRPr lang="en-US"/>
           </a:p>
         </p:txBody>
       </p:sp>
@@ -2660,7 +2660,7 @@
           </a:lstStyle>
           <a:p>
             <a:r>
-              <a:rPr lang="en-US" dirty="0"/>
+              <a:rPr lang="en-US"/>
               <a:t>1</a:t>
             </a:r>
           </a:p>
@@ -2703,7 +2703,7 @@
               <a:rPr lang="en-US" dirty="0"/>
               <a:t>‹#›</a:t>
             </a:fld>
-            <a:endParaRPr lang="en-US" dirty="0"/>
+            <a:endParaRPr lang="en-US"/>
           </a:p>
         </p:txBody>
       </p:sp>
@@ -3127,7 +3127,7 @@
           <a:p>
             <a:pPr algn="ctr"/>
             <a:r>
-              <a:rPr lang="en-US" sz="3600" b="1" dirty="0">
+              <a:rPr lang="en-US" sz="3600" b="1">
                 <a:solidFill>
                   <a:schemeClr val="accent2">
                     <a:lumMod val="50000"/>
@@ -3139,7 +3139,7 @@
               <a:t>BUDGET SALES ANALYSIS</a:t>
             </a:r>
             <a:br>
-              <a:rPr lang="en-US" sz="1900" b="1" dirty="0">
+              <a:rPr lang="en-US" sz="1900" b="1">
                 <a:solidFill>
                   <a:schemeClr val="accent2">
                     <a:lumMod val="50000"/>
@@ -3148,18 +3148,18 @@
               </a:rPr>
             </a:br>
             <a:r>
-              <a:rPr lang="en-US" sz="2000" b="1" dirty="0">
+              <a:rPr lang="en-US" sz="2000" b="1">
                 <a:cs typeface="Calibri Light"/>
               </a:rPr>
               <a:t>OF</a:t>
             </a:r>
             <a:br>
-              <a:rPr lang="en-US" sz="2000" b="1" dirty="0">
+              <a:rPr lang="en-US" sz="2000" b="1">
                 <a:cs typeface="Calibri Light"/>
               </a:rPr>
             </a:br>
             <a:r>
-              <a:rPr lang="en-US" sz="2000" b="1" dirty="0">
+              <a:rPr lang="en-US" sz="2000" b="1">
                 <a:cs typeface="Calibri Light"/>
               </a:rPr>
               <a:t>COMPUTER HARDWARE MANUFACTURER</a:t>
@@ -3167,7 +3167,7 @@
           </a:p>
           <a:p>
             <a:pPr algn="ctr"/>
-            <a:endParaRPr lang="en-US" sz="1900" b="1" dirty="0"/>
+            <a:endParaRPr lang="en-US" sz="1900" b="1"/>
           </a:p>
         </p:txBody>
       </p:sp>
@@ -3433,10 +3433,10 @@
               </a:spcAft>
             </a:pPr>
             <a:r>
-              <a:rPr lang="en-US" sz="2000" b="1" dirty="0"/>
+              <a:rPr lang="en-US" sz="2000" b="1"/>
               <a:t>By</a:t>
             </a:r>
-            <a:endParaRPr lang="en-US" dirty="0">
+            <a:endParaRPr lang="en-US">
               <a:cs typeface="Calibri" panose="020F0502020204030204"/>
             </a:endParaRPr>
           </a:p>
@@ -3449,7 +3449,7 @@
                 <a:spcPts val="600"/>
               </a:spcAft>
             </a:pPr>
-            <a:endParaRPr lang="en-US" sz="2000" b="1" dirty="0">
+            <a:endParaRPr lang="en-US" sz="2000" b="1">
               <a:cs typeface="Calibri" panose="020F0502020204030204"/>
             </a:endParaRPr>
           </a:p>
@@ -3463,10 +3463,10 @@
               </a:spcAft>
             </a:pPr>
             <a:r>
-              <a:rPr lang="en-US" sz="2000" b="1" dirty="0"/>
+              <a:rPr lang="en-US" sz="2000" b="1"/>
               <a:t>Sahil Kumar</a:t>
             </a:r>
-            <a:endParaRPr lang="en-US" sz="2000" b="1" dirty="0">
+            <a:endParaRPr lang="en-US" sz="2000" b="1">
               <a:cs typeface="Calibri" panose="020F0502020204030204"/>
             </a:endParaRPr>
           </a:p>
@@ -4060,7 +4060,7 @@
           </a:lstStyle>
           <a:p>
             <a:r>
-              <a:rPr lang="en-US" sz="4000" b="1" dirty="0">
+              <a:rPr lang="en-US" sz="4000" b="1">
                 <a:solidFill>
                   <a:srgbClr val="843C0C"/>
                 </a:solidFill>
@@ -4138,12 +4138,6 @@
               </a:rPr>
               <a:t>10</a:t>
             </a:r>
-            <a:endParaRPr lang="en-US" dirty="0">
-              <a:solidFill>
-                <a:schemeClr val="bg1"/>
-              </a:solidFill>
-              <a:cs typeface="Calibri"/>
-            </a:endParaRPr>
           </a:p>
         </p:txBody>
       </p:sp>
@@ -4273,7 +4267,7 @@
           </a:lstStyle>
           <a:p>
             <a:r>
-              <a:rPr lang="en-US" sz="2800" b="1" dirty="0">
+              <a:rPr lang="en-US" sz="2800" b="1">
                 <a:solidFill>
                   <a:schemeClr val="accent1">
                     <a:lumMod val="50000"/>
@@ -4282,33 +4276,9 @@
                 <a:latin typeface="Calibri Light"/>
                 <a:cs typeface="Calibri"/>
               </a:rPr>
-              <a:t>Net Sales </a:t>
-            </a:r>
-            <a:r>
-              <a:rPr lang="en-US" sz="2800" b="1">
-                <a:solidFill>
-                  <a:schemeClr val="accent1">
-                    <a:lumMod val="50000"/>
-                  </a:schemeClr>
-                </a:solidFill>
-                <a:latin typeface="Calibri Light"/>
-                <a:cs typeface="Calibri"/>
-              </a:rPr>
-              <a:t>vs </a:t>
-            </a:r>
-            <a:r>
-              <a:rPr lang="en-US" sz="2800" b="1" dirty="0">
-                <a:solidFill>
-                  <a:schemeClr val="accent1">
-                    <a:lumMod val="50000"/>
-                  </a:schemeClr>
-                </a:solidFill>
-                <a:latin typeface="Calibri Light"/>
-                <a:cs typeface="Calibri"/>
-              </a:rPr>
-              <a:t>Gross Margin By Customer</a:t>
-            </a:r>
-            <a:endParaRPr lang="en-US" dirty="0">
+              <a:t>Net Sales vs Gross Margin By Customer</a:t>
+            </a:r>
+            <a:endParaRPr lang="en-US">
               <a:solidFill>
                 <a:schemeClr val="accent1">
                   <a:lumMod val="50000"/>
@@ -4568,13 +4538,13 @@
               <a:buChar char="•"/>
             </a:pPr>
             <a:r>
-              <a:rPr lang="en-US" dirty="0">
+              <a:rPr lang="en-US">
                 <a:ea typeface="+mn-lt"/>
                 <a:cs typeface="+mn-lt"/>
               </a:rPr>
               <a:t>High Net Sales with Moderate Margin</a:t>
             </a:r>
-            <a:endParaRPr lang="en-US" dirty="0">
+            <a:endParaRPr lang="en-US">
               <a:cs typeface="Calibri"/>
             </a:endParaRPr>
           </a:p>
@@ -4584,7 +4554,7 @@
               <a:buChar char="•"/>
             </a:pPr>
             <a:r>
-              <a:rPr lang="en-US" dirty="0">
+              <a:rPr lang="en-US">
                 <a:ea typeface="+mn-lt"/>
                 <a:cs typeface="+mn-lt"/>
               </a:rPr>
@@ -4600,7 +4570,7 @@
               <a:buChar char="•"/>
             </a:pPr>
             <a:r>
-              <a:rPr lang="en-US" dirty="0">
+              <a:rPr lang="en-US">
                 <a:ea typeface="+mn-lt"/>
                 <a:cs typeface="+mn-lt"/>
               </a:rPr>
@@ -4616,7 +4586,7 @@
               <a:buChar char="•"/>
             </a:pPr>
             <a:r>
-              <a:rPr lang="en-US" dirty="0">
+              <a:rPr lang="en-US">
                 <a:ea typeface="+mn-lt"/>
                 <a:cs typeface="+mn-lt"/>
               </a:rPr>
@@ -4631,7 +4601,7 @@
               <a:buFont typeface="Arial"/>
               <a:buChar char="•"/>
             </a:pPr>
-            <a:endParaRPr lang="en-US" b="1" dirty="0">
+            <a:endParaRPr lang="en-US" b="1">
               <a:latin typeface="Calibri Light"/>
               <a:cs typeface="Calibri"/>
             </a:endParaRPr>
@@ -5030,7 +5000,7 @@
           </a:lstStyle>
           <a:p>
             <a:r>
-              <a:rPr lang="en-US" sz="4000" b="1" dirty="0">
+              <a:rPr lang="en-US" sz="4000" b="1">
                 <a:solidFill>
                   <a:srgbClr val="843C0C"/>
                 </a:solidFill>
@@ -5108,12 +5078,6 @@
               </a:rPr>
               <a:t>11</a:t>
             </a:r>
-            <a:endParaRPr lang="en-US" dirty="0">
-              <a:solidFill>
-                <a:schemeClr val="bg1"/>
-              </a:solidFill>
-              <a:cs typeface="Calibri"/>
-            </a:endParaRPr>
           </a:p>
         </p:txBody>
       </p:sp>
@@ -5243,7 +5207,7 @@
           </a:lstStyle>
           <a:p>
             <a:r>
-              <a:rPr lang="en-US" sz="2800" b="1" dirty="0">
+              <a:rPr lang="en-US" sz="2800" b="1">
                 <a:solidFill>
                   <a:schemeClr val="accent1">
                     <a:lumMod val="50000"/>
@@ -5252,33 +5216,9 @@
                 <a:latin typeface="Calibri Light"/>
                 <a:cs typeface="Calibri"/>
               </a:rPr>
-              <a:t>Net Sales </a:t>
-            </a:r>
-            <a:r>
-              <a:rPr lang="en-US" sz="2800" b="1">
-                <a:solidFill>
-                  <a:schemeClr val="accent1">
-                    <a:lumMod val="50000"/>
-                  </a:schemeClr>
-                </a:solidFill>
-                <a:latin typeface="Calibri Light"/>
-                <a:cs typeface="Calibri"/>
-              </a:rPr>
-              <a:t>vs </a:t>
-            </a:r>
-            <a:r>
-              <a:rPr lang="en-US" sz="2800" b="1" dirty="0">
-                <a:solidFill>
-                  <a:schemeClr val="accent1">
-                    <a:lumMod val="50000"/>
-                  </a:schemeClr>
-                </a:solidFill>
-                <a:latin typeface="Calibri Light"/>
-                <a:cs typeface="Calibri"/>
-              </a:rPr>
-              <a:t>Gross Margin </a:t>
-            </a:r>
-            <a:endParaRPr lang="en-US" dirty="0">
+              <a:t>Net Sales vs Gross Margin </a:t>
+            </a:r>
+            <a:endParaRPr lang="en-US">
               <a:solidFill>
                 <a:schemeClr val="accent1">
                   <a:lumMod val="50000"/>
@@ -5290,7 +5230,7 @@
           </a:p>
           <a:p>
             <a:r>
-              <a:rPr lang="en-US" sz="2800" b="1" dirty="0">
+              <a:rPr lang="en-US" sz="2800" b="1">
                 <a:solidFill>
                   <a:schemeClr val="accent1">
                     <a:lumMod val="50000"/>
@@ -5472,7 +5412,7 @@
               <a:buChar char="•"/>
             </a:pPr>
             <a:r>
-              <a:rPr lang="en-US" dirty="0">
+              <a:rPr lang="en-US">
                 <a:ea typeface="+mn-lt"/>
                 <a:cs typeface="+mn-lt"/>
               </a:rPr>
@@ -5485,7 +5425,7 @@
               <a:buChar char="•"/>
             </a:pPr>
             <a:r>
-              <a:rPr lang="en-US" dirty="0">
+              <a:rPr lang="en-US">
                 <a:ea typeface="+mn-lt"/>
                 <a:cs typeface="+mn-lt"/>
               </a:rPr>
@@ -5501,7 +5441,7 @@
               <a:buChar char="•"/>
             </a:pPr>
             <a:r>
-              <a:rPr lang="en-US" dirty="0">
+              <a:rPr lang="en-US">
                 <a:ea typeface="+mn-lt"/>
                 <a:cs typeface="+mn-lt"/>
               </a:rPr>
@@ -5514,7 +5454,7 @@
               <a:buChar char="•"/>
             </a:pPr>
             <a:r>
-              <a:rPr lang="en-US" dirty="0">
+              <a:rPr lang="en-US">
                 <a:ea typeface="+mn-lt"/>
                 <a:cs typeface="+mn-lt"/>
               </a:rPr>
@@ -5530,7 +5470,7 @@
               <a:buChar char="•"/>
             </a:pPr>
             <a:r>
-              <a:rPr lang="en-US" dirty="0">
+              <a:rPr lang="en-US">
                 <a:ea typeface="+mn-lt"/>
                 <a:cs typeface="+mn-lt"/>
               </a:rPr>
@@ -5546,7 +5486,7 @@
               <a:buChar char="•"/>
             </a:pPr>
             <a:r>
-              <a:rPr lang="en-US" dirty="0">
+              <a:rPr lang="en-US">
                 <a:ea typeface="+mn-lt"/>
                 <a:cs typeface="+mn-lt"/>
               </a:rPr>
@@ -5558,7 +5498,7 @@
               <a:buFont typeface="Arial"/>
               <a:buChar char="•"/>
             </a:pPr>
-            <a:endParaRPr lang="en-US" sz="4000" dirty="0">
+            <a:endParaRPr lang="en-US" sz="4000">
               <a:latin typeface="Calibri"/>
               <a:cs typeface="Calibri"/>
             </a:endParaRPr>
@@ -5957,7 +5897,7 @@
           </a:lstStyle>
           <a:p>
             <a:r>
-              <a:rPr lang="en-US" sz="4000" b="1" dirty="0">
+              <a:rPr lang="en-US" sz="4000" b="1">
                 <a:solidFill>
                   <a:srgbClr val="843C0C"/>
                 </a:solidFill>
@@ -5966,7 +5906,7 @@
               </a:rPr>
               <a:t>Budget Sales Analysis</a:t>
             </a:r>
-            <a:endParaRPr lang="en-US" dirty="0"/>
+            <a:endParaRPr lang="en-US"/>
           </a:p>
         </p:txBody>
       </p:sp>
@@ -6036,12 +5976,6 @@
               </a:rPr>
               <a:t>12</a:t>
             </a:r>
-            <a:endParaRPr lang="en-US" dirty="0">
-              <a:solidFill>
-                <a:schemeClr val="bg1"/>
-              </a:solidFill>
-              <a:cs typeface="Calibri"/>
-            </a:endParaRPr>
           </a:p>
         </p:txBody>
       </p:sp>
@@ -6201,7 +6135,7 @@
           </a:lstStyle>
           <a:p>
             <a:r>
-              <a:rPr lang="en-US" sz="2800" b="1" dirty="0">
+              <a:rPr lang="en-US" sz="2800" b="1">
                 <a:solidFill>
                   <a:schemeClr val="accent1">
                     <a:lumMod val="50000"/>
@@ -6212,19 +6146,10 @@
               </a:rPr>
               <a:t>Correlation </a:t>
             </a:r>
-            <a:endParaRPr lang="en-US" sz="2800" b="1">
-              <a:solidFill>
-                <a:schemeClr val="accent1">
-                  <a:lumMod val="50000"/>
-                </a:schemeClr>
-              </a:solidFill>
-              <a:latin typeface="Calibri Light"/>
-              <a:cs typeface="Calibri"/>
-            </a:endParaRPr>
-          </a:p>
-          <a:p>
-            <a:r>
-              <a:rPr lang="en-US" sz="2800" b="1" dirty="0">
+          </a:p>
+          <a:p>
+            <a:r>
+              <a:rPr lang="en-US" sz="2800" b="1">
                 <a:solidFill>
                   <a:schemeClr val="accent1">
                     <a:lumMod val="50000"/>
@@ -6233,19 +6158,7 @@
                 <a:latin typeface="Calibri Light"/>
                 <a:cs typeface="Calibri"/>
               </a:rPr>
-              <a:t>Market </a:t>
-            </a:r>
-            <a:r>
-              <a:rPr lang="en-US" sz="2800" b="1">
-                <a:solidFill>
-                  <a:schemeClr val="accent1">
-                    <a:lumMod val="50000"/>
-                  </a:schemeClr>
-                </a:solidFill>
-                <a:latin typeface="Calibri Light"/>
-                <a:cs typeface="Calibri"/>
-              </a:rPr>
-              <a:t>vs </a:t>
+              <a:t>Market vs </a:t>
             </a:r>
             <a:endParaRPr lang="en-US" sz="2800" b="1">
               <a:solidFill>
@@ -6260,7 +6173,7 @@
           </a:p>
           <a:p>
             <a:r>
-              <a:rPr lang="en-US" sz="2800" b="1" dirty="0">
+              <a:rPr lang="en-US" sz="2800" b="1">
                 <a:solidFill>
                   <a:schemeClr val="accent1">
                     <a:lumMod val="50000"/>
@@ -6673,7 +6586,7 @@
           </a:lstStyle>
           <a:p>
             <a:r>
-              <a:rPr lang="en-US" sz="4000" b="1" dirty="0">
+              <a:rPr lang="en-US" sz="4000" b="1">
                 <a:solidFill>
                   <a:srgbClr val="843C0C"/>
                 </a:solidFill>
@@ -6682,7 +6595,7 @@
               </a:rPr>
               <a:t>Seasonal Trends in USA And India</a:t>
             </a:r>
-            <a:endParaRPr lang="en-US" dirty="0"/>
+            <a:endParaRPr lang="en-US"/>
           </a:p>
         </p:txBody>
       </p:sp>
@@ -6752,12 +6665,6 @@
               </a:rPr>
               <a:t>13</a:t>
             </a:r>
-            <a:endParaRPr lang="en-US" dirty="0">
-              <a:solidFill>
-                <a:schemeClr val="bg1"/>
-              </a:solidFill>
-              <a:cs typeface="Calibri"/>
-            </a:endParaRPr>
           </a:p>
         </p:txBody>
       </p:sp>
@@ -6917,7 +6824,7 @@
           </a:lstStyle>
           <a:p>
             <a:r>
-              <a:rPr lang="en-US" sz="4400" b="1" dirty="0">
+              <a:rPr lang="en-US" sz="4400" b="1">
                 <a:solidFill>
                   <a:srgbClr val="1F3864"/>
                 </a:solidFill>
@@ -7089,7 +6996,7 @@
           </a:lstStyle>
           <a:p>
             <a:r>
-              <a:rPr lang="en-US" sz="4400" b="1" dirty="0">
+              <a:rPr lang="en-US" sz="4400" b="1">
                 <a:solidFill>
                   <a:srgbClr val="1F3864"/>
                 </a:solidFill>
@@ -7099,7 +7006,7 @@
               </a:rPr>
               <a:t>India</a:t>
             </a:r>
-            <a:endParaRPr lang="en-US" dirty="0"/>
+            <a:endParaRPr lang="en-US"/>
           </a:p>
         </p:txBody>
       </p:sp>
@@ -7495,7 +7402,7 @@
           </a:lstStyle>
           <a:p>
             <a:r>
-              <a:rPr lang="en-US" sz="4000" b="1" dirty="0">
+              <a:rPr lang="en-US" sz="4000" b="1">
                 <a:solidFill>
                   <a:srgbClr val="843C0C"/>
                 </a:solidFill>
@@ -7504,7 +7411,7 @@
               </a:rPr>
               <a:t>Seasonal Trends in India For Sales Increase</a:t>
             </a:r>
-            <a:endParaRPr lang="en-US" dirty="0"/>
+            <a:endParaRPr lang="en-US"/>
           </a:p>
         </p:txBody>
       </p:sp>
@@ -7574,12 +7481,6 @@
               </a:rPr>
               <a:t>14</a:t>
             </a:r>
-            <a:endParaRPr lang="en-US" dirty="0">
-              <a:solidFill>
-                <a:schemeClr val="bg1"/>
-              </a:solidFill>
-              <a:cs typeface="Calibri"/>
-            </a:endParaRPr>
           </a:p>
         </p:txBody>
       </p:sp>
@@ -7635,7 +7536,7 @@
             <a:lstStyle/>
             <a:p>
               <a:r>
-                <a:rPr lang="en-US" sz="1100" dirty="0">
+                <a:rPr lang="en-US" sz="1100">
                   <a:solidFill>
                     <a:srgbClr val="A31515"/>
                   </a:solidFill>
@@ -7653,7 +7554,7 @@
                 <a:t>http</a:t>
               </a:r>
               <a:r>
-                <a:rPr lang="en-US" sz="1100" dirty="0">
+                <a:rPr lang="en-US" sz="1100">
                   <a:solidFill>
                     <a:srgbClr val="A31515"/>
                   </a:solidFill>
@@ -7664,7 +7565,7 @@
                 <a:t>s</a:t>
               </a:r>
               <a:r>
-                <a:rPr lang="en-US" sz="1100" dirty="0">
+                <a:rPr lang="en-US" sz="1100">
                   <a:solidFill>
                     <a:srgbClr val="A31515"/>
                   </a:solidFill>
@@ -7682,7 +7583,7 @@
                 <a:t>://weather.visualcrossing.com</a:t>
               </a:r>
               <a:r>
-                <a:rPr lang="en-US" sz="1100" dirty="0">
+                <a:rPr lang="en-US" sz="1100">
                   <a:solidFill>
                     <a:srgbClr val="A31515"/>
                   </a:solidFill>
@@ -7692,13 +7593,13 @@
                 </a:rPr>
                 <a:t>/</a:t>
               </a:r>
-              <a:endParaRPr lang="en-US" dirty="0">
+              <a:endParaRPr lang="en-US">
                 <a:cs typeface="Calibri"/>
               </a:endParaRPr>
             </a:p>
             <a:p>
               <a:pPr algn="l"/>
-              <a:endParaRPr lang="en-US" dirty="0">
+              <a:endParaRPr lang="en-US">
                 <a:cs typeface="Calibri"/>
               </a:endParaRPr>
             </a:p>
@@ -7746,20 +7647,7 @@
                   <a:ea typeface="Fira Code Retina"/>
                   <a:cs typeface="Fira Code Retina"/>
                 </a:rPr>
-                <a:t>Weather</a:t>
-              </a:r>
-              <a:r>
-                <a:rPr lang="en-US" sz="1100" dirty="0">
-                  <a:solidFill>
-                    <a:schemeClr val="accent1">
-                      <a:lumMod val="50000"/>
-                    </a:schemeClr>
-                  </a:solidFill>
-                  <a:latin typeface="Fira Code Retina"/>
-                  <a:ea typeface="Fira Code Retina"/>
-                  <a:cs typeface="Fira Code Retina"/>
-                </a:rPr>
-                <a:t> API</a:t>
+                <a:t>Weather API</a:t>
               </a:r>
               <a:endParaRPr lang="en-US">
                 <a:solidFill>
@@ -7899,7 +7787,7 @@
           </a:lstStyle>
           <a:p>
             <a:r>
-              <a:rPr lang="en-US" sz="1100" b="1" dirty="0">
+              <a:rPr lang="en-US" sz="1100" b="1">
                 <a:solidFill>
                   <a:srgbClr val="1F3864"/>
                 </a:solidFill>
@@ -7964,7 +7852,7 @@
             <a:lstStyle/>
             <a:p>
               <a:r>
-                <a:rPr lang="en-US" sz="1100" dirty="0">
+                <a:rPr lang="en-US" sz="1100">
                   <a:solidFill>
                     <a:srgbClr val="0000FF"/>
                   </a:solidFill>
@@ -8011,7 +7899,7 @@
             <a:lstStyle/>
             <a:p>
               <a:r>
-                <a:rPr lang="en-US" sz="1100" dirty="0">
+                <a:rPr lang="en-US" sz="1100">
                   <a:solidFill>
                     <a:schemeClr val="accent1">
                       <a:lumMod val="50000"/>
@@ -8169,7 +8057,7 @@
             <a:lstStyle/>
             <a:p>
               <a:r>
-                <a:rPr lang="en-US" sz="1100" dirty="0">
+                <a:rPr lang="en-US" sz="1100">
                   <a:solidFill>
                     <a:srgbClr val="0000FF"/>
                   </a:solidFill>
@@ -8183,7 +8071,7 @@
               <a:endParaRPr lang="en-US"/>
             </a:p>
             <a:p>
-              <a:endParaRPr lang="en-US" sz="1100" dirty="0">
+              <a:endParaRPr lang="en-US" sz="1100">
                 <a:solidFill>
                   <a:srgbClr val="0000FF"/>
                 </a:solidFill>
@@ -8226,7 +8114,7 @@
             <a:lstStyle/>
             <a:p>
               <a:r>
-                <a:rPr lang="en-US" sz="1100" dirty="0">
+                <a:rPr lang="en-US" sz="1100">
                   <a:solidFill>
                     <a:schemeClr val="accent1">
                       <a:lumMod val="50000"/>
@@ -8239,7 +8127,7 @@
                 <a:t>Amazon: High performing Cities of India : Gujarat, New </a:t>
               </a:r>
               <a:r>
-                <a:rPr lang="en-US" sz="1100" dirty="0">
+                <a:rPr lang="en-US" sz="1100">
                   <a:solidFill>
                     <a:srgbClr val="3B3B3B"/>
                   </a:solidFill>
@@ -8249,10 +8137,10 @@
                 </a:rPr>
                 <a:t>Delhi</a:t>
               </a:r>
-              <a:endParaRPr lang="en-US" dirty="0"/>
+              <a:endParaRPr lang="en-US"/>
             </a:p>
             <a:p>
-              <a:endParaRPr lang="en-US" sz="1100" dirty="0">
+              <a:endParaRPr lang="en-US" sz="1100">
                 <a:solidFill>
                   <a:schemeClr val="accent1">
                     <a:lumMod val="50000"/>
@@ -8658,7 +8546,7 @@
           </a:lstStyle>
           <a:p>
             <a:r>
-              <a:rPr lang="en-US" sz="4000" b="1" dirty="0">
+              <a:rPr lang="en-US" sz="4000" b="1">
                 <a:solidFill>
                   <a:srgbClr val="843C0C"/>
                 </a:solidFill>
@@ -8667,7 +8555,7 @@
               </a:rPr>
               <a:t>Seasonal Trends in India For Sales Decrease</a:t>
             </a:r>
-            <a:endParaRPr lang="en-US" dirty="0"/>
+            <a:endParaRPr lang="en-US"/>
           </a:p>
         </p:txBody>
       </p:sp>
@@ -8737,12 +8625,6 @@
               </a:rPr>
               <a:t>15</a:t>
             </a:r>
-            <a:endParaRPr lang="en-US" dirty="0">
-              <a:solidFill>
-                <a:schemeClr val="bg1"/>
-              </a:solidFill>
-              <a:cs typeface="Calibri"/>
-            </a:endParaRPr>
           </a:p>
         </p:txBody>
       </p:sp>
@@ -8798,7 +8680,7 @@
             <a:lstStyle/>
             <a:p>
               <a:r>
-                <a:rPr lang="en-US" sz="1100" dirty="0">
+                <a:rPr lang="en-US" sz="1100">
                   <a:solidFill>
                     <a:srgbClr val="A31515"/>
                   </a:solidFill>
@@ -8816,7 +8698,7 @@
                 <a:t>http</a:t>
               </a:r>
               <a:r>
-                <a:rPr lang="en-US" sz="1100" dirty="0">
+                <a:rPr lang="en-US" sz="1100">
                   <a:solidFill>
                     <a:srgbClr val="A31515"/>
                   </a:solidFill>
@@ -8827,7 +8709,7 @@
                 <a:t>s</a:t>
               </a:r>
               <a:r>
-                <a:rPr lang="en-US" sz="1100" dirty="0">
+                <a:rPr lang="en-US" sz="1100">
                   <a:solidFill>
                     <a:srgbClr val="A31515"/>
                   </a:solidFill>
@@ -8845,7 +8727,7 @@
                 <a:t>://weather.visualcrossing.com</a:t>
               </a:r>
               <a:r>
-                <a:rPr lang="en-US" sz="1100" dirty="0">
+                <a:rPr lang="en-US" sz="1100">
                   <a:solidFill>
                     <a:srgbClr val="A31515"/>
                   </a:solidFill>
@@ -8855,13 +8737,13 @@
                 </a:rPr>
                 <a:t>/</a:t>
               </a:r>
-              <a:endParaRPr lang="en-US" dirty="0">
+              <a:endParaRPr lang="en-US">
                 <a:cs typeface="Calibri"/>
               </a:endParaRPr>
             </a:p>
             <a:p>
               <a:pPr algn="l"/>
-              <a:endParaRPr lang="en-US" dirty="0">
+              <a:endParaRPr lang="en-US">
                 <a:cs typeface="Calibri"/>
               </a:endParaRPr>
             </a:p>
@@ -8909,20 +8791,7 @@
                   <a:ea typeface="Fira Code Retina"/>
                   <a:cs typeface="Fira Code Retina"/>
                 </a:rPr>
-                <a:t>Weather</a:t>
-              </a:r>
-              <a:r>
-                <a:rPr lang="en-US" sz="1100" dirty="0">
-                  <a:solidFill>
-                    <a:schemeClr val="accent1">
-                      <a:lumMod val="50000"/>
-                    </a:schemeClr>
-                  </a:solidFill>
-                  <a:latin typeface="Fira Code Retina"/>
-                  <a:ea typeface="Fira Code Retina"/>
-                  <a:cs typeface="Fira Code Retina"/>
-                </a:rPr>
-                <a:t> API</a:t>
+                <a:t>Weather API</a:t>
               </a:r>
               <a:endParaRPr lang="en-US">
                 <a:solidFill>
@@ -9062,7 +8931,7 @@
           </a:lstStyle>
           <a:p>
             <a:r>
-              <a:rPr lang="en-US" sz="1100" b="1" dirty="0">
+              <a:rPr lang="en-US" sz="1100" b="1">
                 <a:solidFill>
                   <a:srgbClr val="1F3864"/>
                 </a:solidFill>
@@ -9197,7 +9066,7 @@
           <a:lstStyle/>
           <a:p>
             <a:r>
-              <a:rPr lang="en-US" sz="1600" dirty="0">
+              <a:rPr lang="en-US" sz="1600">
                 <a:solidFill>
                   <a:schemeClr val="accent1">
                     <a:lumMod val="50000"/>
@@ -9211,7 +9080,7 @@
             </a:r>
           </a:p>
           <a:p>
-            <a:endParaRPr lang="en-US" sz="1600" dirty="0">
+            <a:endParaRPr lang="en-US" sz="1600">
               <a:solidFill>
                 <a:schemeClr val="accent1">
                   <a:lumMod val="50000"/>
@@ -9224,7 +9093,7 @@
           </a:p>
           <a:p>
             <a:r>
-              <a:rPr lang="en-US" sz="1600" dirty="0">
+              <a:rPr lang="en-US" sz="1600">
                 <a:solidFill>
                   <a:schemeClr val="accent1">
                     <a:lumMod val="50000"/>
@@ -9271,7 +9140,7 @@
           <a:lstStyle/>
           <a:p>
             <a:r>
-              <a:rPr lang="en-US" sz="1400" dirty="0">
+              <a:rPr lang="en-US" sz="1400">
                 <a:hlinkClick r:id="rId6"/>
               </a:rPr>
               <a:t>COVID-19 pandemic cases in February 2020 - Wikipedia</a:t>
@@ -9674,7 +9543,7 @@
           </a:lstStyle>
           <a:p>
             <a:r>
-              <a:rPr lang="en-US" sz="4000" b="1" dirty="0">
+              <a:rPr lang="en-US" sz="4000" b="1">
                 <a:solidFill>
                   <a:srgbClr val="843C0C"/>
                 </a:solidFill>
@@ -9683,7 +9552,7 @@
               </a:rPr>
               <a:t>Seasonal Trends in USA For Sales Increase</a:t>
             </a:r>
-            <a:endParaRPr lang="en-US" dirty="0"/>
+            <a:endParaRPr lang="en-US"/>
           </a:p>
         </p:txBody>
       </p:sp>
@@ -9753,12 +9622,6 @@
               </a:rPr>
               <a:t>16</a:t>
             </a:r>
-            <a:endParaRPr lang="en-US" dirty="0">
-              <a:solidFill>
-                <a:schemeClr val="bg1"/>
-              </a:solidFill>
-              <a:cs typeface="Calibri"/>
-            </a:endParaRPr>
           </a:p>
         </p:txBody>
       </p:sp>
@@ -9814,7 +9677,7 @@
             <a:lstStyle/>
             <a:p>
               <a:r>
-                <a:rPr lang="en-US" sz="1100" dirty="0">
+                <a:rPr lang="en-US" sz="1100">
                   <a:solidFill>
                     <a:srgbClr val="A31515"/>
                   </a:solidFill>
@@ -9832,7 +9695,7 @@
                 <a:t>http</a:t>
               </a:r>
               <a:r>
-                <a:rPr lang="en-US" sz="1100" dirty="0">
+                <a:rPr lang="en-US" sz="1100">
                   <a:solidFill>
                     <a:srgbClr val="A31515"/>
                   </a:solidFill>
@@ -9843,7 +9706,7 @@
                 <a:t>s</a:t>
               </a:r>
               <a:r>
-                <a:rPr lang="en-US" sz="1100" dirty="0">
+                <a:rPr lang="en-US" sz="1100">
                   <a:solidFill>
                     <a:srgbClr val="A31515"/>
                   </a:solidFill>
@@ -9861,7 +9724,7 @@
                 <a:t>://weather.visualcrossing.com</a:t>
               </a:r>
               <a:r>
-                <a:rPr lang="en-US" sz="1100" dirty="0">
+                <a:rPr lang="en-US" sz="1100">
                   <a:solidFill>
                     <a:srgbClr val="A31515"/>
                   </a:solidFill>
@@ -9871,13 +9734,13 @@
                 </a:rPr>
                 <a:t>/</a:t>
               </a:r>
-              <a:endParaRPr lang="en-US" dirty="0">
+              <a:endParaRPr lang="en-US">
                 <a:cs typeface="Calibri"/>
               </a:endParaRPr>
             </a:p>
             <a:p>
               <a:pPr algn="l"/>
-              <a:endParaRPr lang="en-US" dirty="0">
+              <a:endParaRPr lang="en-US">
                 <a:cs typeface="Calibri"/>
               </a:endParaRPr>
             </a:p>
@@ -9925,20 +9788,7 @@
                   <a:ea typeface="Fira Code Retina"/>
                   <a:cs typeface="Fira Code Retina"/>
                 </a:rPr>
-                <a:t>Weather</a:t>
-              </a:r>
-              <a:r>
-                <a:rPr lang="en-US" sz="1100" dirty="0">
-                  <a:solidFill>
-                    <a:schemeClr val="accent1">
-                      <a:lumMod val="50000"/>
-                    </a:schemeClr>
-                  </a:solidFill>
-                  <a:latin typeface="Fira Code Retina"/>
-                  <a:ea typeface="Fira Code Retina"/>
-                  <a:cs typeface="Fira Code Retina"/>
-                </a:rPr>
-                <a:t> API</a:t>
+                <a:t>Weather API</a:t>
               </a:r>
               <a:endParaRPr lang="en-US">
                 <a:solidFill>
@@ -10168,7 +10018,7 @@
           </a:lstStyle>
           <a:p>
             <a:r>
-              <a:rPr lang="en-US" sz="1100" b="1" dirty="0">
+              <a:rPr lang="en-US" sz="1100" b="1">
                 <a:solidFill>
                   <a:srgbClr val="1F3864"/>
                 </a:solidFill>
@@ -10233,7 +10083,7 @@
             <a:lstStyle/>
             <a:p>
               <a:r>
-                <a:rPr lang="en-US" sz="1100" dirty="0">
+                <a:rPr lang="en-US" sz="1100">
                   <a:solidFill>
                     <a:srgbClr val="0000FF"/>
                   </a:solidFill>
@@ -10247,7 +10097,7 @@
               <a:endParaRPr lang="en-US"/>
             </a:p>
             <a:p>
-              <a:endParaRPr lang="en-US" sz="1100" dirty="0">
+              <a:endParaRPr lang="en-US" sz="1100">
                 <a:solidFill>
                   <a:srgbClr val="A31515"/>
                 </a:solidFill>
@@ -10290,7 +10140,7 @@
             <a:lstStyle/>
             <a:p>
               <a:r>
-                <a:rPr lang="en-US" sz="1100" dirty="0">
+                <a:rPr lang="en-US" sz="1100">
                   <a:solidFill>
                     <a:schemeClr val="accent1">
                       <a:lumMod val="50000"/>
@@ -10698,7 +10548,7 @@
           </a:lstStyle>
           <a:p>
             <a:r>
-              <a:rPr lang="en-US" sz="4000" b="1" dirty="0">
+              <a:rPr lang="en-US" sz="4000" b="1">
                 <a:solidFill>
                   <a:srgbClr val="843C0C"/>
                 </a:solidFill>
@@ -10707,7 +10557,7 @@
               </a:rPr>
               <a:t>Seasonal Trends in USA For Sales Decrease</a:t>
             </a:r>
-            <a:endParaRPr lang="en-US" dirty="0"/>
+            <a:endParaRPr lang="en-US"/>
           </a:p>
         </p:txBody>
       </p:sp>
@@ -10777,12 +10627,6 @@
               </a:rPr>
               <a:t>17</a:t>
             </a:r>
-            <a:endParaRPr lang="en-US" dirty="0">
-              <a:solidFill>
-                <a:schemeClr val="bg1"/>
-              </a:solidFill>
-              <a:cs typeface="Calibri"/>
-            </a:endParaRPr>
           </a:p>
         </p:txBody>
       </p:sp>
@@ -10838,7 +10682,7 @@
             <a:lstStyle/>
             <a:p>
               <a:r>
-                <a:rPr lang="en-US" sz="1100" dirty="0">
+                <a:rPr lang="en-US" sz="1100">
                   <a:solidFill>
                     <a:srgbClr val="A31515"/>
                   </a:solidFill>
@@ -10856,7 +10700,7 @@
                 <a:t>http</a:t>
               </a:r>
               <a:r>
-                <a:rPr lang="en-US" sz="1100" dirty="0">
+                <a:rPr lang="en-US" sz="1100">
                   <a:solidFill>
                     <a:srgbClr val="A31515"/>
                   </a:solidFill>
@@ -10867,7 +10711,7 @@
                 <a:t>s</a:t>
               </a:r>
               <a:r>
-                <a:rPr lang="en-US" sz="1100" dirty="0">
+                <a:rPr lang="en-US" sz="1100">
                   <a:solidFill>
                     <a:srgbClr val="A31515"/>
                   </a:solidFill>
@@ -10885,7 +10729,7 @@
                 <a:t>://weather.visualcrossing.com</a:t>
               </a:r>
               <a:r>
-                <a:rPr lang="en-US" sz="1100" dirty="0">
+                <a:rPr lang="en-US" sz="1100">
                   <a:solidFill>
                     <a:srgbClr val="A31515"/>
                   </a:solidFill>
@@ -10895,13 +10739,13 @@
                 </a:rPr>
                 <a:t>/</a:t>
               </a:r>
-              <a:endParaRPr lang="en-US" dirty="0">
+              <a:endParaRPr lang="en-US">
                 <a:cs typeface="Calibri"/>
               </a:endParaRPr>
             </a:p>
             <a:p>
               <a:pPr algn="l"/>
-              <a:endParaRPr lang="en-US" dirty="0">
+              <a:endParaRPr lang="en-US">
                 <a:cs typeface="Calibri"/>
               </a:endParaRPr>
             </a:p>
@@ -10949,20 +10793,7 @@
                   <a:ea typeface="Fira Code Retina"/>
                   <a:cs typeface="Fira Code Retina"/>
                 </a:rPr>
-                <a:t>Weather</a:t>
-              </a:r>
-              <a:r>
-                <a:rPr lang="en-US" sz="1100" dirty="0">
-                  <a:solidFill>
-                    <a:schemeClr val="accent1">
-                      <a:lumMod val="50000"/>
-                    </a:schemeClr>
-                  </a:solidFill>
-                  <a:latin typeface="Fira Code Retina"/>
-                  <a:ea typeface="Fira Code Retina"/>
-                  <a:cs typeface="Fira Code Retina"/>
-                </a:rPr>
-                <a:t> API</a:t>
+                <a:t>Weather API</a:t>
               </a:r>
               <a:endParaRPr lang="en-US">
                 <a:solidFill>
@@ -11102,7 +10933,7 @@
           </a:lstStyle>
           <a:p>
             <a:r>
-              <a:rPr lang="en-US" sz="1100" b="1" dirty="0">
+              <a:rPr lang="en-US" sz="1100" b="1">
                 <a:solidFill>
                   <a:srgbClr val="1F3864"/>
                 </a:solidFill>
@@ -11257,7 +11088,7 @@
             <a:lstStyle/>
             <a:p>
               <a:r>
-                <a:rPr lang="en-US" sz="1100" dirty="0">
+                <a:rPr lang="en-US" sz="1100">
                   <a:solidFill>
                     <a:srgbClr val="0000FF"/>
                   </a:solidFill>
@@ -11271,7 +11102,7 @@
               <a:endParaRPr lang="en-US"/>
             </a:p>
             <a:p>
-              <a:endParaRPr lang="en-US" sz="1100" dirty="0">
+              <a:endParaRPr lang="en-US" sz="1100">
                 <a:solidFill>
                   <a:srgbClr val="A31515"/>
                 </a:solidFill>
@@ -11314,7 +11145,7 @@
             <a:lstStyle/>
             <a:p>
               <a:r>
-                <a:rPr lang="en-US" sz="1100" dirty="0">
+                <a:rPr lang="en-US" sz="1100">
                   <a:solidFill>
                     <a:schemeClr val="accent1">
                       <a:lumMod val="50000"/>
@@ -11722,7 +11553,7 @@
           </a:lstStyle>
           <a:p>
             <a:r>
-              <a:rPr lang="en-US" sz="4000" b="1" dirty="0">
+              <a:rPr lang="en-US" sz="4000" b="1">
                 <a:solidFill>
                   <a:srgbClr val="843C0C"/>
                 </a:solidFill>
@@ -11731,7 +11562,7 @@
               </a:rPr>
               <a:t>Additional Features</a:t>
             </a:r>
-            <a:endParaRPr lang="en-US" dirty="0"/>
+            <a:endParaRPr lang="en-US"/>
           </a:p>
         </p:txBody>
       </p:sp>
@@ -11801,12 +11632,6 @@
               </a:rPr>
               <a:t>18</a:t>
             </a:r>
-            <a:endParaRPr lang="en-US" dirty="0">
-              <a:solidFill>
-                <a:schemeClr val="bg1"/>
-              </a:solidFill>
-              <a:cs typeface="Calibri"/>
-            </a:endParaRPr>
           </a:p>
         </p:txBody>
       </p:sp>
@@ -11966,7 +11791,7 @@
           </a:lstStyle>
           <a:p>
             <a:r>
-              <a:rPr lang="en-US" sz="2800" b="1" dirty="0">
+              <a:rPr lang="en-US" sz="2800" b="1">
                 <a:solidFill>
                   <a:schemeClr val="accent1">
                     <a:lumMod val="50000"/>
@@ -11977,7 +11802,7 @@
               </a:rPr>
               <a:t>Time Series : Forecasting Net Sales Amount</a:t>
             </a:r>
-            <a:endParaRPr lang="en-US" dirty="0">
+            <a:endParaRPr lang="en-US">
               <a:solidFill>
                 <a:schemeClr val="accent1">
                   <a:lumMod val="50000"/>
@@ -12379,7 +12204,7 @@
           </a:lstStyle>
           <a:p>
             <a:r>
-              <a:rPr lang="en-US" sz="4000" b="1" dirty="0">
+              <a:rPr lang="en-US" sz="4000" b="1">
                 <a:solidFill>
                   <a:srgbClr val="843C0C"/>
                 </a:solidFill>
@@ -12457,12 +12282,6 @@
               </a:rPr>
               <a:t>19</a:t>
             </a:r>
-            <a:endParaRPr lang="en-US" dirty="0">
-              <a:solidFill>
-                <a:schemeClr val="bg1"/>
-              </a:solidFill>
-              <a:cs typeface="Calibri"/>
-            </a:endParaRPr>
           </a:p>
         </p:txBody>
       </p:sp>
@@ -12596,27 +12415,27 @@
               <a:buChar char="•"/>
             </a:pPr>
             <a:r>
-              <a:rPr lang="en-US" sz="2000" dirty="0">
+              <a:rPr lang="en-US" sz="2000">
                 <a:ea typeface="+mn-lt"/>
                 <a:cs typeface="+mn-lt"/>
               </a:rPr>
               <a:t>My </a:t>
             </a:r>
             <a:r>
-              <a:rPr lang="en-US" sz="2000" dirty="0" err="1">
+              <a:rPr lang="en-US" sz="2000" err="1">
                 <a:ea typeface="+mn-lt"/>
                 <a:cs typeface="+mn-lt"/>
               </a:rPr>
               <a:t>Sql</a:t>
             </a:r>
             <a:r>
-              <a:rPr lang="en-US" sz="2000" dirty="0">
+              <a:rPr lang="en-US" sz="2000">
                 <a:ea typeface="+mn-lt"/>
                 <a:cs typeface="+mn-lt"/>
               </a:rPr>
               <a:t> to Postgres Data Migration</a:t>
             </a:r>
-            <a:endParaRPr lang="en-US" sz="2000" dirty="0">
+            <a:endParaRPr lang="en-US" sz="2000">
               <a:cs typeface="Calibri"/>
             </a:endParaRPr>
           </a:p>
@@ -12625,7 +12444,7 @@
               <a:buFont typeface="Arial"/>
               <a:buChar char="•"/>
             </a:pPr>
-            <a:endParaRPr lang="en-US" sz="2000" dirty="0">
+            <a:endParaRPr lang="en-US" sz="2000">
               <a:cs typeface="Calibri"/>
             </a:endParaRPr>
           </a:p>
@@ -12635,13 +12454,13 @@
               <a:buChar char="•"/>
             </a:pPr>
             <a:r>
-              <a:rPr lang="en-US" sz="2000" dirty="0">
+              <a:rPr lang="en-US" sz="2000">
                 <a:ea typeface="+mn-lt"/>
                 <a:cs typeface="+mn-lt"/>
               </a:rPr>
               <a:t>Seasonal Trends using Weather API</a:t>
             </a:r>
-            <a:endParaRPr lang="en-US" sz="2000" dirty="0">
+            <a:endParaRPr lang="en-US" sz="2000">
               <a:cs typeface="Calibri"/>
             </a:endParaRPr>
           </a:p>
@@ -12650,7 +12469,7 @@
               <a:buFont typeface="Arial"/>
               <a:buChar char="•"/>
             </a:pPr>
-            <a:endParaRPr lang="en-US" sz="2000" dirty="0">
+            <a:endParaRPr lang="en-US" sz="2000">
               <a:cs typeface="Calibri"/>
             </a:endParaRPr>
           </a:p>
@@ -12660,7 +12479,7 @@
               <a:buChar char="•"/>
             </a:pPr>
             <a:r>
-              <a:rPr lang="en-US" sz="2000" dirty="0">
+              <a:rPr lang="en-US" sz="2000">
                 <a:cs typeface="Calibri"/>
               </a:rPr>
               <a:t>Domain Knowledge regarding sales </a:t>
@@ -12671,7 +12490,7 @@
               <a:buFont typeface="Arial"/>
               <a:buChar char="•"/>
             </a:pPr>
-            <a:endParaRPr lang="en-US" sz="2000" dirty="0">
+            <a:endParaRPr lang="en-US" sz="2000">
               <a:latin typeface="Calibri"/>
               <a:ea typeface="Fira Code Retina"/>
               <a:cs typeface="Calibri"/>
@@ -12679,7 +12498,7 @@
           </a:p>
           <a:p>
             <a:pPr algn="just"/>
-            <a:endParaRPr lang="en-US" sz="2000" dirty="0">
+            <a:endParaRPr lang="en-US" sz="2000">
               <a:cs typeface="Calibri"/>
             </a:endParaRPr>
           </a:p>
@@ -13077,7 +12896,7 @@
           </a:lstStyle>
           <a:p>
             <a:r>
-              <a:rPr lang="en-US" sz="4000" b="1" dirty="0">
+              <a:rPr lang="en-US" sz="4000" b="1">
                 <a:solidFill>
                   <a:srgbClr val="843C0C"/>
                 </a:solidFill>
@@ -13147,7 +12966,7 @@
           <a:lstStyle/>
           <a:p>
             <a:r>
-              <a:rPr lang="en-US" dirty="0">
+              <a:rPr lang="en-US">
                 <a:solidFill>
                   <a:schemeClr val="bg1"/>
                 </a:solidFill>
@@ -13196,25 +13015,25 @@
               <a:t>AtliQ</a:t>
             </a:r>
             <a:r>
-              <a:rPr lang="en-US" sz="2200" dirty="0">
+              <a:rPr lang="en-US" sz="2200">
                 <a:ea typeface="+mn-lt"/>
                 <a:cs typeface="+mn-lt"/>
               </a:rPr>
               <a:t> Hardware Technologies, established in 2017, is an IT services company operating in the United States and India. </a:t>
             </a:r>
-            <a:endParaRPr lang="en-US" sz="2200" dirty="0">
+            <a:endParaRPr lang="en-US" sz="2200">
               <a:cs typeface="Calibri"/>
             </a:endParaRPr>
           </a:p>
           <a:p>
-            <a:endParaRPr lang="en-US" sz="2200" dirty="0">
+            <a:endParaRPr lang="en-US" sz="2200">
               <a:ea typeface="+mn-lt"/>
               <a:cs typeface="+mn-lt"/>
             </a:endParaRPr>
           </a:p>
           <a:p>
             <a:r>
-              <a:rPr lang="en-US" sz="2200" dirty="0">
+              <a:rPr lang="en-US" sz="2200">
                 <a:ea typeface="+mn-lt"/>
                 <a:cs typeface="+mn-lt"/>
               </a:rPr>
@@ -13228,58 +13047,58 @@
               <a:t>AtliQ</a:t>
             </a:r>
             <a:r>
-              <a:rPr lang="en-US" sz="2200" dirty="0">
+              <a:rPr lang="en-US" sz="2200">
                 <a:ea typeface="+mn-lt"/>
                 <a:cs typeface="+mn-lt"/>
               </a:rPr>
               <a:t> has provided customized solutions to businesses worldwide, enhancing efficiency, reducing costs, and fostering growth. As a multinational firm, they prioritize data-driven decision-making and aim to embed analytical tools in their work culture. </a:t>
             </a:r>
-            <a:endParaRPr lang="en-US" sz="2200" dirty="0">
+            <a:endParaRPr lang="en-US" sz="2200">
               <a:cs typeface="Calibri"/>
             </a:endParaRPr>
           </a:p>
           <a:p>
-            <a:endParaRPr lang="en-US" sz="2200" dirty="0">
+            <a:endParaRPr lang="en-US" sz="2200">
               <a:cs typeface="Calibri"/>
             </a:endParaRPr>
           </a:p>
           <a:p>
             <a:r>
-              <a:rPr lang="en-US" sz="2200" dirty="0">
+              <a:rPr lang="en-US" sz="2200">
                 <a:ea typeface="+mn-lt"/>
                 <a:cs typeface="+mn-lt"/>
               </a:rPr>
               <a:t>To enhance their market strategies, </a:t>
             </a:r>
             <a:r>
-              <a:rPr lang="en-US" sz="2200" dirty="0" err="1">
+              <a:rPr lang="en-US" sz="2200" err="1">
                 <a:ea typeface="+mn-lt"/>
                 <a:cs typeface="+mn-lt"/>
               </a:rPr>
               <a:t>AtliQ</a:t>
             </a:r>
             <a:r>
-              <a:rPr lang="en-US" sz="2200" dirty="0">
+              <a:rPr lang="en-US" sz="2200">
                 <a:ea typeface="+mn-lt"/>
                 <a:cs typeface="+mn-lt"/>
               </a:rPr>
               <a:t> is undertaking a project to leverage data insights for smarter decision-making in the competitive tech industry. By exploring the potential impact of weather conditions on sales through data analysis, they seek to uncover correlations between weather patterns and sales performance. The ultimate goal is to empower </a:t>
             </a:r>
             <a:r>
-              <a:rPr lang="en-US" sz="2200" dirty="0" err="1">
+              <a:rPr lang="en-US" sz="2200" err="1">
                 <a:ea typeface="+mn-lt"/>
                 <a:cs typeface="+mn-lt"/>
               </a:rPr>
               <a:t>AtliQ</a:t>
             </a:r>
             <a:r>
-              <a:rPr lang="en-US" sz="2200" dirty="0">
+              <a:rPr lang="en-US" sz="2200">
                 <a:ea typeface="+mn-lt"/>
                 <a:cs typeface="+mn-lt"/>
               </a:rPr>
               <a:t> to make informed decisions, adapt to market changes, and foster innovation for sustained success. </a:t>
             </a:r>
-            <a:endParaRPr lang="en-US" sz="2200" dirty="0">
+            <a:endParaRPr lang="en-US" sz="2200">
               <a:cs typeface="Calibri"/>
             </a:endParaRPr>
           </a:p>
@@ -13677,7 +13496,7 @@
           </a:lstStyle>
           <a:p>
             <a:r>
-              <a:rPr lang="en-US" sz="4000" b="1" dirty="0">
+              <a:rPr lang="en-US" sz="4000" b="1">
                 <a:solidFill>
                   <a:srgbClr val="843C0C"/>
                 </a:solidFill>
@@ -13686,7 +13505,7 @@
               </a:rPr>
               <a:t>Conclusion</a:t>
             </a:r>
-            <a:endParaRPr lang="en-US" dirty="0"/>
+            <a:endParaRPr lang="en-US"/>
           </a:p>
         </p:txBody>
       </p:sp>
@@ -13756,12 +13575,6 @@
               </a:rPr>
               <a:t>20</a:t>
             </a:r>
-            <a:endParaRPr lang="en-US" dirty="0">
-              <a:solidFill>
-                <a:schemeClr val="bg1"/>
-              </a:solidFill>
-              <a:cs typeface="Calibri"/>
-            </a:endParaRPr>
           </a:p>
         </p:txBody>
       </p:sp>
@@ -13892,90 +13705,90 @@
           <a:p>
             <a:pPr algn="just"/>
             <a:r>
-              <a:rPr lang="en-US" sz="2000" dirty="0">
+              <a:rPr lang="en-US" sz="2000">
                 <a:ea typeface="+mn-lt"/>
                 <a:cs typeface="+mn-lt"/>
               </a:rPr>
               <a:t>Financial analysis (2018-2022) highlights consistent sales growth, improved profitability, and regional variations. Key products, customers, and divisions impact sales and profits, with Brick &amp; Mortar and Retailer channels dominating.</a:t>
             </a:r>
-            <a:endParaRPr lang="en-US" sz="2000" dirty="0">
+            <a:endParaRPr lang="en-US" sz="2000">
               <a:cs typeface="Calibri"/>
             </a:endParaRPr>
           </a:p>
           <a:p>
             <a:pPr algn="just"/>
-            <a:endParaRPr lang="en-US" sz="2000" dirty="0">
+            <a:endParaRPr lang="en-US" sz="2000">
               <a:cs typeface="Calibri"/>
             </a:endParaRPr>
           </a:p>
           <a:p>
             <a:pPr algn="just"/>
             <a:r>
-              <a:rPr lang="en-US" sz="2000" dirty="0">
+              <a:rPr lang="en-US" sz="2000">
                 <a:ea typeface="+mn-lt"/>
                 <a:cs typeface="+mn-lt"/>
               </a:rPr>
               <a:t>Budget sales analysis emphasizes leadership markets (USA, India) and influential customers (Amazon, </a:t>
             </a:r>
             <a:r>
-              <a:rPr lang="en-US" sz="2000" dirty="0" err="1">
+              <a:rPr lang="en-US" sz="2000" err="1">
                 <a:ea typeface="+mn-lt"/>
                 <a:cs typeface="+mn-lt"/>
               </a:rPr>
               <a:t>AltiQ</a:t>
             </a:r>
             <a:r>
-              <a:rPr lang="en-US" sz="2000" dirty="0">
+              <a:rPr lang="en-US" sz="2000">
                 <a:ea typeface="+mn-lt"/>
                 <a:cs typeface="+mn-lt"/>
               </a:rPr>
               <a:t> Exclusive). We prioritized top-performing product categories for strategic budget allocation.</a:t>
             </a:r>
-            <a:endParaRPr lang="en-US" sz="2000" dirty="0">
+            <a:endParaRPr lang="en-US" sz="2000">
               <a:cs typeface="Calibri"/>
             </a:endParaRPr>
           </a:p>
           <a:p>
             <a:pPr algn="just"/>
-            <a:endParaRPr lang="en-US" sz="2000" dirty="0">
+            <a:endParaRPr lang="en-US" sz="2000">
               <a:cs typeface="Calibri"/>
             </a:endParaRPr>
           </a:p>
           <a:p>
             <a:pPr algn="just"/>
             <a:r>
-              <a:rPr lang="en-US" sz="2000" dirty="0">
+              <a:rPr lang="en-US" sz="2000">
                 <a:ea typeface="+mn-lt"/>
                 <a:cs typeface="+mn-lt"/>
               </a:rPr>
               <a:t>For seasonal trends, we could not derive the outcomes based on the weather API results and the dataset. But we tried to provide high level insights based on our research.</a:t>
             </a:r>
-            <a:endParaRPr lang="en-US" dirty="0"/>
+            <a:endParaRPr lang="en-US"/>
           </a:p>
           <a:p>
             <a:pPr algn="just"/>
-            <a:endParaRPr lang="en-US" sz="2000" dirty="0">
+            <a:endParaRPr lang="en-US" sz="2000">
               <a:cs typeface="Calibri"/>
             </a:endParaRPr>
           </a:p>
           <a:p>
             <a:pPr algn="just"/>
             <a:r>
-              <a:rPr lang="en-US" sz="2000" dirty="0">
+              <a:rPr lang="en-US" sz="2000">
                 <a:latin typeface="Calibri"/>
                 <a:ea typeface="Fira Code Retina"/>
                 <a:cs typeface="Fira Code Retina"/>
               </a:rPr>
               <a:t>In summary, the analysis provides a concise understanding of sales dynamics, weather impacts, and external influences, offering actionable insights for businesses to enhance decision-making and strategic planning.</a:t>
             </a:r>
-            <a:endParaRPr lang="en-US" sz="2000" dirty="0">
+            <a:endParaRPr lang="en-US" sz="2000">
               <a:latin typeface="Calibri"/>
               <a:cs typeface="Calibri"/>
             </a:endParaRPr>
           </a:p>
           <a:p>
             <a:pPr algn="just"/>
-            <a:endParaRPr lang="en-US" sz="2000" dirty="0">
+            <a:endParaRPr lang="en-US" sz="2000">
               <a:cs typeface="Calibri"/>
             </a:endParaRPr>
           </a:p>
@@ -14374,7 +14187,7 @@
           <a:p>
             <a:pPr algn="ctr"/>
             <a:r>
-              <a:rPr lang="en-US" sz="4000" b="1" dirty="0">
+              <a:rPr lang="en-US" sz="4000" b="1">
                 <a:solidFill>
                   <a:srgbClr val="843C0C"/>
                 </a:solidFill>
@@ -14456,12 +14269,6 @@
               </a:rPr>
               <a:t>21</a:t>
             </a:r>
-            <a:endParaRPr lang="en-US" dirty="0">
-              <a:solidFill>
-                <a:schemeClr val="bg1"/>
-              </a:solidFill>
-              <a:cs typeface="Calibri"/>
-            </a:endParaRPr>
           </a:p>
         </p:txBody>
       </p:sp>
@@ -14857,7 +14664,7 @@
           </a:lstStyle>
           <a:p>
             <a:r>
-              <a:rPr lang="en-US" sz="4000" b="1" dirty="0">
+              <a:rPr lang="en-US" sz="4000" b="1">
                 <a:solidFill>
                   <a:srgbClr val="843C0C"/>
                 </a:solidFill>
@@ -14866,7 +14673,7 @@
               </a:rPr>
               <a:t>References</a:t>
             </a:r>
-            <a:endParaRPr lang="en-US" dirty="0"/>
+            <a:endParaRPr lang="en-US"/>
           </a:p>
         </p:txBody>
       </p:sp>
@@ -14936,12 +14743,6 @@
               </a:rPr>
               <a:t>22</a:t>
             </a:r>
-            <a:endParaRPr lang="en-US" dirty="0">
-              <a:solidFill>
-                <a:schemeClr val="bg1"/>
-              </a:solidFill>
-              <a:cs typeface="Calibri"/>
-            </a:endParaRPr>
           </a:p>
         </p:txBody>
       </p:sp>
@@ -15434,7 +15235,7 @@
           </a:lstStyle>
           <a:p>
             <a:r>
-              <a:rPr lang="en-US" sz="4000" b="1" dirty="0">
+              <a:rPr lang="en-US" sz="4000" b="1">
                 <a:solidFill>
                   <a:srgbClr val="843C0C"/>
                 </a:solidFill>
@@ -15443,7 +15244,7 @@
               </a:rPr>
               <a:t>Source Code</a:t>
             </a:r>
-            <a:endParaRPr lang="en-US" dirty="0"/>
+            <a:endParaRPr lang="en-US"/>
           </a:p>
         </p:txBody>
       </p:sp>
@@ -15513,12 +15314,6 @@
               </a:rPr>
               <a:t>23</a:t>
             </a:r>
-            <a:endParaRPr lang="en-US" dirty="0">
-              <a:solidFill>
-                <a:schemeClr val="bg1"/>
-              </a:solidFill>
-              <a:cs typeface="Calibri"/>
-            </a:endParaRPr>
           </a:p>
         </p:txBody>
       </p:sp>
@@ -15648,7 +15443,7 @@
           </a:lstStyle>
           <a:p>
             <a:r>
-              <a:rPr lang="en-US" sz="2800" b="1" dirty="0">
+              <a:rPr lang="en-US" sz="2800" b="1">
                 <a:solidFill>
                   <a:schemeClr val="accent1">
                     <a:lumMod val="50000"/>
@@ -15659,7 +15454,7 @@
               </a:rPr>
               <a:t>Git Hub Link</a:t>
             </a:r>
-            <a:endParaRPr lang="en-US" dirty="0"/>
+            <a:endParaRPr lang="en-US"/>
           </a:p>
         </p:txBody>
       </p:sp>
@@ -15695,12 +15490,12 @@
           <a:lstStyle/>
           <a:p>
             <a:r>
-              <a:rPr lang="en-US" dirty="0">
+              <a:rPr lang="en-US">
                 <a:hlinkClick r:id="rId2"/>
               </a:rPr>
               <a:t>https://github.com/Namrata-Patel/AIM-5001/tree/master/Final_Project</a:t>
             </a:r>
-            <a:endParaRPr lang="en-US" dirty="0"/>
+            <a:endParaRPr lang="en-US"/>
           </a:p>
         </p:txBody>
       </p:sp>
@@ -16097,7 +15892,7 @@
           <a:p>
             <a:pPr algn="ctr"/>
             <a:r>
-              <a:rPr lang="en-US" sz="4000" b="1" dirty="0">
+              <a:rPr lang="en-US" sz="4000" b="1">
                 <a:solidFill>
                   <a:srgbClr val="843C0C"/>
                 </a:solidFill>
@@ -16176,12 +15971,6 @@
               </a:rPr>
               <a:t>24</a:t>
             </a:r>
-            <a:endParaRPr lang="en-US" dirty="0">
-              <a:solidFill>
-                <a:schemeClr val="bg1"/>
-              </a:solidFill>
-              <a:cs typeface="Calibri"/>
-            </a:endParaRPr>
           </a:p>
         </p:txBody>
       </p:sp>
@@ -16577,7 +16366,7 @@
           </a:lstStyle>
           <a:p>
             <a:r>
-              <a:rPr lang="en-US" sz="4000" b="1" dirty="0">
+              <a:rPr lang="en-US" sz="4000" b="1">
                 <a:solidFill>
                   <a:srgbClr val="843C0C"/>
                 </a:solidFill>
@@ -16650,7 +16439,7 @@
           <a:lstStyle/>
           <a:p>
             <a:r>
-              <a:rPr lang="en-US" dirty="0">
+              <a:rPr lang="en-US">
                 <a:solidFill>
                   <a:schemeClr val="bg1"/>
                 </a:solidFill>
@@ -17082,7 +16871,7 @@
           </a:lstStyle>
           <a:p>
             <a:r>
-              <a:rPr lang="en-US" sz="4000" b="1" dirty="0">
+              <a:rPr lang="en-US" sz="4000" b="1">
                 <a:solidFill>
                   <a:srgbClr val="843C0C"/>
                 </a:solidFill>
@@ -17091,7 +16880,7 @@
               </a:rPr>
               <a:t>Project Objective</a:t>
             </a:r>
-            <a:endParaRPr lang="en-US" dirty="0"/>
+            <a:endParaRPr lang="en-US"/>
           </a:p>
         </p:txBody>
       </p:sp>
@@ -17153,7 +16942,7 @@
           <a:lstStyle/>
           <a:p>
             <a:r>
-              <a:rPr lang="en-US" dirty="0">
+              <a:rPr lang="en-US">
                 <a:solidFill>
                   <a:schemeClr val="bg1"/>
                 </a:solidFill>
@@ -17202,7 +16991,7 @@
               </a:rPr>
               <a:t>1. Financial Analysis </a:t>
             </a:r>
-            <a:endParaRPr lang="en-US" sz="2400">
+            <a:endParaRPr lang="en-US" sz="2400" dirty="0">
               <a:cs typeface="Calibri"/>
             </a:endParaRPr>
           </a:p>
@@ -17214,7 +17003,7 @@
               </a:rPr>
               <a:t>- Objective: Optimize performance through in-depth analysis. </a:t>
             </a:r>
-            <a:endParaRPr lang="en-US" sz="2400">
+            <a:endParaRPr lang="en-US" sz="2400" dirty="0">
               <a:cs typeface="Calibri"/>
             </a:endParaRPr>
           </a:p>
@@ -17224,9 +17013,9 @@
                 <a:ea typeface="+mn-lt"/>
                 <a:cs typeface="+mn-lt"/>
               </a:rPr>
-              <a:t>- Approach: Explore profit and loss across markets, products, regions. </a:t>
-            </a:r>
-            <a:endParaRPr lang="en-US" sz="2400">
+              <a:t>- Approach: Explore profit and loss across markets, customers, products, regions. </a:t>
+            </a:r>
+            <a:endParaRPr lang="en-US" sz="2400" dirty="0">
               <a:cs typeface="Calibri"/>
             </a:endParaRPr>
           </a:p>
@@ -17238,7 +17027,7 @@
               </a:rPr>
               <a:t>- Outcome: Targeted improvement strategies. </a:t>
             </a:r>
-            <a:endParaRPr lang="en-US" sz="2400">
+            <a:endParaRPr lang="en-US" sz="2400" dirty="0">
               <a:cs typeface="Calibri"/>
             </a:endParaRPr>
           </a:p>
@@ -17250,7 +17039,7 @@
               </a:rPr>
               <a:t>2. Budget Sales Analysis </a:t>
             </a:r>
-            <a:endParaRPr lang="en-US" sz="2400">
+            <a:endParaRPr lang="en-US" sz="2400" dirty="0">
               <a:cs typeface="Calibri"/>
             </a:endParaRPr>
           </a:p>
@@ -17260,9 +17049,9 @@
                 <a:ea typeface="+mn-lt"/>
                 <a:cs typeface="+mn-lt"/>
               </a:rPr>
-              <a:t>- Objective: Drive quick insights and informed decisions. </a:t>
-            </a:r>
-            <a:endParaRPr lang="en-US" sz="2400">
+              <a:t>- Objective: Derive quick insights and informed decisions. </a:t>
+            </a:r>
+            <a:endParaRPr lang="en-US" sz="2400" dirty="0">
               <a:cs typeface="Calibri"/>
             </a:endParaRPr>
           </a:p>
@@ -17274,7 +17063,7 @@
               </a:rPr>
               <a:t>- Approach: Analyze computer hardware manufacturing budget sales. </a:t>
             </a:r>
-            <a:endParaRPr lang="en-US" sz="2400">
+            <a:endParaRPr lang="en-US" sz="2400" dirty="0">
               <a:cs typeface="Calibri"/>
             </a:endParaRPr>
           </a:p>
@@ -17286,7 +17075,7 @@
               </a:rPr>
               <a:t>- Benefits: Strategic planning agility and adaptation to trends. </a:t>
             </a:r>
-            <a:endParaRPr lang="en-US" sz="2400">
+            <a:endParaRPr lang="en-US" sz="2400" dirty="0">
               <a:cs typeface="Calibri"/>
             </a:endParaRPr>
           </a:p>
@@ -17298,7 +17087,7 @@
               </a:rPr>
               <a:t>3. Weather and Hardware Sales </a:t>
             </a:r>
-            <a:endParaRPr lang="en-US" sz="2400">
+            <a:endParaRPr lang="en-US" sz="2400" dirty="0">
               <a:cs typeface="Calibri"/>
             </a:endParaRPr>
           </a:p>
@@ -17310,7 +17099,7 @@
               </a:rPr>
               <a:t>- Objective: Understand weather's impact on sales. </a:t>
             </a:r>
-            <a:endParaRPr lang="en-US" sz="2400">
+            <a:endParaRPr lang="en-US" sz="2400" dirty="0">
               <a:cs typeface="Calibri"/>
             </a:endParaRPr>
           </a:p>
@@ -17322,7 +17111,7 @@
               </a:rPr>
               <a:t>- Approach: Analyze historical sales with weather correlation. </a:t>
             </a:r>
-            <a:endParaRPr lang="en-US" sz="2400">
+            <a:endParaRPr lang="en-US" sz="2400" dirty="0">
               <a:cs typeface="Calibri"/>
             </a:endParaRPr>
           </a:p>
@@ -17334,12 +17123,12 @@
               </a:rPr>
               <a:t>- Outcome: Insights from the weather API correlation with the sales in USA and India</a:t>
             </a:r>
-            <a:endParaRPr lang="en-US" sz="2400">
+            <a:endParaRPr lang="en-US" sz="2400" dirty="0">
               <a:cs typeface="Calibri"/>
             </a:endParaRPr>
           </a:p>
           <a:p>
-            <a:endParaRPr lang="en-US" sz="2800" dirty="0">
+            <a:endParaRPr lang="en-US" sz="2800">
               <a:cs typeface="Calibri"/>
             </a:endParaRPr>
           </a:p>
@@ -17737,7 +17526,7 @@
           </a:lstStyle>
           <a:p>
             <a:r>
-              <a:rPr lang="en-US" sz="4000" b="1" dirty="0">
+              <a:rPr lang="en-US" sz="4000" b="1">
                 <a:solidFill>
                   <a:srgbClr val="843C0C"/>
                 </a:solidFill>
@@ -17746,7 +17535,7 @@
               </a:rPr>
               <a:t>EDA (Exploratory Data Analysis)</a:t>
             </a:r>
-            <a:endParaRPr lang="en-US" dirty="0"/>
+            <a:endParaRPr lang="en-US"/>
           </a:p>
         </p:txBody>
       </p:sp>
@@ -17863,121 +17652,121 @@
           <a:lstStyle/>
           <a:p>
             <a:r>
-              <a:rPr lang="en-US" sz="2400" dirty="0">
+              <a:rPr lang="en-US" sz="2400">
                 <a:ea typeface="+mn-lt"/>
                 <a:cs typeface="+mn-lt"/>
               </a:rPr>
               <a:t>1 Null Value Analysis</a:t>
             </a:r>
-            <a:endParaRPr lang="en-US" sz="2400" dirty="0">
+            <a:endParaRPr lang="en-US" sz="2400">
               <a:cs typeface="Calibri"/>
             </a:endParaRPr>
           </a:p>
           <a:p>
             <a:r>
-              <a:rPr lang="en-US" sz="2400" dirty="0">
+              <a:rPr lang="en-US" sz="2400">
                 <a:ea typeface="+mn-lt"/>
                 <a:cs typeface="+mn-lt"/>
               </a:rPr>
               <a:t>2 Summary Statistics</a:t>
             </a:r>
-            <a:endParaRPr lang="en-US" sz="2400" dirty="0">
+            <a:endParaRPr lang="en-US" sz="2400">
               <a:cs typeface="Calibri"/>
             </a:endParaRPr>
           </a:p>
           <a:p>
             <a:r>
-              <a:rPr lang="en-US" sz="2400" dirty="0">
+              <a:rPr lang="en-US" sz="2400">
                 <a:ea typeface="+mn-lt"/>
                 <a:cs typeface="+mn-lt"/>
               </a:rPr>
               <a:t>    2.1 Numerical Statistical Analysis</a:t>
             </a:r>
-            <a:endParaRPr lang="en-US" sz="2400" dirty="0">
+            <a:endParaRPr lang="en-US" sz="2400">
               <a:cs typeface="Calibri"/>
             </a:endParaRPr>
           </a:p>
           <a:p>
             <a:r>
-              <a:rPr lang="en-US" sz="2400" dirty="0">
+              <a:rPr lang="en-US" sz="2400">
                 <a:ea typeface="+mn-lt"/>
                 <a:cs typeface="+mn-lt"/>
               </a:rPr>
               <a:t>    2.2 Categorical Statistical Analysis</a:t>
             </a:r>
-            <a:endParaRPr lang="en-US" sz="2400" dirty="0">
+            <a:endParaRPr lang="en-US" sz="2400">
               <a:cs typeface="Calibri"/>
             </a:endParaRPr>
           </a:p>
           <a:p>
             <a:r>
-              <a:rPr lang="en-US" sz="2400" dirty="0">
+              <a:rPr lang="en-US" sz="2400">
                 <a:ea typeface="+mn-lt"/>
                 <a:cs typeface="+mn-lt"/>
               </a:rPr>
               <a:t>3 Duplicate Value Analysis</a:t>
             </a:r>
-            <a:endParaRPr lang="en-US" sz="2400" dirty="0">
+            <a:endParaRPr lang="en-US" sz="2400">
               <a:cs typeface="Calibri"/>
             </a:endParaRPr>
           </a:p>
           <a:p>
             <a:r>
-              <a:rPr lang="en-US" sz="2400" dirty="0">
+              <a:rPr lang="en-US" sz="2400">
                 <a:ea typeface="+mn-lt"/>
                 <a:cs typeface="+mn-lt"/>
               </a:rPr>
               <a:t>4 Univariate Analysis</a:t>
             </a:r>
-            <a:endParaRPr lang="en-US" sz="2400" dirty="0">
+            <a:endParaRPr lang="en-US" sz="2400">
               <a:cs typeface="Calibri"/>
             </a:endParaRPr>
           </a:p>
           <a:p>
             <a:r>
-              <a:rPr lang="en-US" sz="2400" dirty="0">
+              <a:rPr lang="en-US" sz="2400">
                 <a:ea typeface="+mn-lt"/>
                 <a:cs typeface="+mn-lt"/>
               </a:rPr>
               <a:t>    4.1 Categorical columns univariate analysis</a:t>
             </a:r>
-            <a:endParaRPr lang="en-US" sz="2400" dirty="0">
+            <a:endParaRPr lang="en-US" sz="2400">
               <a:cs typeface="Calibri"/>
             </a:endParaRPr>
           </a:p>
           <a:p>
             <a:r>
-              <a:rPr lang="en-US" sz="2400" dirty="0">
+              <a:rPr lang="en-US" sz="2400">
                 <a:ea typeface="+mn-lt"/>
                 <a:cs typeface="+mn-lt"/>
               </a:rPr>
               <a:t>    4.2 Numerical columns univariate analysis</a:t>
             </a:r>
-            <a:endParaRPr lang="en-US" sz="2400" dirty="0">
+            <a:endParaRPr lang="en-US" sz="2400">
               <a:cs typeface="Calibri"/>
             </a:endParaRPr>
           </a:p>
           <a:p>
             <a:r>
-              <a:rPr lang="en-US" sz="2400" dirty="0">
+              <a:rPr lang="en-US" sz="2400">
                 <a:ea typeface="+mn-lt"/>
                 <a:cs typeface="+mn-lt"/>
               </a:rPr>
               <a:t>5 Bivariate Analysis</a:t>
             </a:r>
-            <a:endParaRPr lang="en-US" sz="2400" dirty="0">
+            <a:endParaRPr lang="en-US" sz="2400">
               <a:cs typeface="Calibri"/>
             </a:endParaRPr>
           </a:p>
           <a:p>
             <a:r>
-              <a:rPr lang="en-US" sz="2400" dirty="0">
+              <a:rPr lang="en-US" sz="2400">
                 <a:ea typeface="+mn-lt"/>
                 <a:cs typeface="+mn-lt"/>
               </a:rPr>
               <a:t>6 Multivariate Analysis</a:t>
             </a:r>
-            <a:endParaRPr lang="en-US" sz="2400" dirty="0">
+            <a:endParaRPr lang="en-US" sz="2400">
               <a:cs typeface="Calibri"/>
             </a:endParaRPr>
           </a:p>
@@ -18375,7 +18164,7 @@
           </a:lstStyle>
           <a:p>
             <a:r>
-              <a:rPr lang="en-US" sz="4000" b="1" dirty="0">
+              <a:rPr lang="en-US" sz="4000" b="1">
                 <a:solidFill>
                   <a:srgbClr val="843C0C"/>
                 </a:solidFill>
@@ -18458,12 +18247,6 @@
               </a:rPr>
               <a:t>6</a:t>
             </a:r>
-            <a:endParaRPr lang="en-US" dirty="0">
-              <a:solidFill>
-                <a:schemeClr val="bg1"/>
-              </a:solidFill>
-              <a:cs typeface="Calibri"/>
-            </a:endParaRPr>
           </a:p>
         </p:txBody>
       </p:sp>
@@ -18889,7 +18672,7 @@
           </a:lstStyle>
           <a:p>
             <a:r>
-              <a:rPr lang="en-US" sz="4000" b="1" dirty="0">
+              <a:rPr lang="en-US" sz="4000" b="1">
                 <a:solidFill>
                   <a:srgbClr val="843C0C"/>
                 </a:solidFill>
@@ -18971,12 +18754,6 @@
               </a:rPr>
               <a:t>7</a:t>
             </a:r>
-            <a:endParaRPr lang="en-US" dirty="0">
-              <a:solidFill>
-                <a:schemeClr val="bg1"/>
-              </a:solidFill>
-              <a:cs typeface="Calibri"/>
-            </a:endParaRPr>
           </a:p>
         </p:txBody>
       </p:sp>
@@ -19402,7 +19179,7 @@
           </a:lstStyle>
           <a:p>
             <a:r>
-              <a:rPr lang="en-US" sz="4000" b="1" dirty="0">
+              <a:rPr lang="en-US" sz="4000" b="1">
                 <a:solidFill>
                   <a:srgbClr val="843C0C"/>
                 </a:solidFill>
@@ -19640,7 +19417,7 @@
           </a:lstStyle>
           <a:p>
             <a:r>
-              <a:rPr lang="en-US" sz="2800" b="1" dirty="0">
+              <a:rPr lang="en-US" sz="2800" b="1">
                 <a:solidFill>
                   <a:schemeClr val="accent1">
                     <a:lumMod val="50000"/>
@@ -19651,7 +19428,7 @@
               </a:rPr>
               <a:t>Country wise Profit and Loss Analysis</a:t>
             </a:r>
-            <a:endParaRPr lang="en-US" dirty="0">
+            <a:endParaRPr lang="en-US">
               <a:solidFill>
                 <a:schemeClr val="accent1">
                   <a:lumMod val="50000"/>
@@ -20053,7 +19830,7 @@
           </a:lstStyle>
           <a:p>
             <a:r>
-              <a:rPr lang="en-US" sz="4000" b="1" dirty="0">
+              <a:rPr lang="en-US" sz="4000" b="1">
                 <a:solidFill>
                   <a:srgbClr val="843C0C"/>
                 </a:solidFill>
@@ -20131,12 +19908,6 @@
               </a:rPr>
               <a:t>9</a:t>
             </a:r>
-            <a:endParaRPr lang="en-US" dirty="0">
-              <a:solidFill>
-                <a:schemeClr val="bg1"/>
-              </a:solidFill>
-              <a:cs typeface="Calibri"/>
-            </a:endParaRPr>
           </a:p>
         </p:txBody>
       </p:sp>
@@ -20296,7 +20067,7 @@
           </a:lstStyle>
           <a:p>
             <a:r>
-              <a:rPr lang="en-US" sz="2800" b="1" dirty="0">
+              <a:rPr lang="en-US" sz="2800" b="1">
                 <a:solidFill>
                   <a:schemeClr val="accent1">
                     <a:lumMod val="50000"/>
@@ -20308,7 +20079,7 @@
               <a:t>Customer wise </a:t>
             </a:r>
             <a:r>
-              <a:rPr lang="en-US" sz="2800" b="1" dirty="0">
+              <a:rPr lang="en-US" sz="2800" b="1">
                 <a:solidFill>
                   <a:schemeClr val="accent1">
                     <a:lumMod val="50000"/>
@@ -20319,7 +20090,7 @@
               </a:rPr>
               <a:t>Profit and Loss Analysis</a:t>
             </a:r>
-            <a:endParaRPr lang="en-US" dirty="0">
+            <a:endParaRPr lang="en-US">
               <a:solidFill>
                 <a:schemeClr val="accent1">
                   <a:lumMod val="50000"/>

</xml_diff>